<commit_message>
updates to presentation and UPER
</commit_message>
<xml_diff>
--- a/Capstone_2.pptx
+++ b/Capstone_2.pptx
@@ -5720,7 +5720,11 @@
             </a:pPr>
             <a:r>
               <a:rPr lang="en-US" sz="1600" b="1" dirty="0" smtClean="0"/>
-              <a:t> Day Four: Begin coding basic structure. </a:t>
+              <a:t>Day </a:t>
+            </a:r>
+            <a:r>
+              <a:rPr lang="en-US" sz="1600" b="1" dirty="0" smtClean="0"/>
+              <a:t>Four: Begin coding basic structure. </a:t>
             </a:r>
             <a:r>
               <a:rPr lang="en-US" sz="1600" dirty="0" smtClean="0"/>
@@ -6513,6 +6517,13 @@
   <p:clrMapOvr>
     <a:masterClrMapping/>
   </p:clrMapOvr>
+  <p:timing>
+    <p:tnLst>
+      <p:par>
+        <p:cTn xmlns:p14="http://schemas.microsoft.com/office/powerpoint/2010/main" id="1" dur="indefinite" restart="never" nodeType="tmRoot"/>
+      </p:par>
+    </p:tnLst>
+  </p:timing>
 </p:sld>
 </file>
 
@@ -7255,7 +7266,7 @@
         </p:nvSpPr>
         <p:spPr>
           <a:xfrm>
-            <a:off x="549275" y="2279602"/>
+            <a:off x="549275" y="2075913"/>
             <a:ext cx="8042276" cy="2713766"/>
           </a:xfrm>
         </p:spPr>
@@ -7301,14 +7312,42 @@
               </a:buBlip>
             </a:pPr>
             <a:r>
-              <a:rPr lang="en-US" sz="2000" dirty="0" smtClean="0"/>
-              <a:t>Customer: Eric and Denise </a:t>
-            </a:r>
-            <a:r>
-              <a:rPr lang="en-US" sz="2000" dirty="0" err="1" smtClean="0"/>
-              <a:t>Kliskey</a:t>
-            </a:r>
-            <a:endParaRPr lang="en-US" sz="2000" dirty="0" smtClean="0"/>
+              <a:rPr lang="en-US" sz="2000" i="1" dirty="0" smtClean="0"/>
+              <a:t>C</a:t>
+            </a:r>
+            <a:r>
+              <a:rPr lang="en-US" sz="2000" i="1" dirty="0" smtClean="0"/>
+              <a:t>reated </a:t>
+            </a:r>
+            <a:r>
+              <a:rPr lang="en-US" sz="2000" i="1" dirty="0"/>
+              <a:t>by Allan Alcorn for Atari, </a:t>
+            </a:r>
+            <a:r>
+              <a:rPr lang="en-US" sz="2000" i="1" dirty="0" smtClean="0"/>
+              <a:t>Pong is a </a:t>
+            </a:r>
+            <a:r>
+              <a:rPr lang="en-US" sz="2000" i="1" dirty="0"/>
+              <a:t>table tennis game featuring simple two-dimensional </a:t>
+            </a:r>
+            <a:r>
+              <a:rPr lang="en-US" sz="2000" i="1" dirty="0" smtClean="0"/>
+              <a:t>graphics. </a:t>
+            </a:r>
+            <a:r>
+              <a:rPr lang="en-US" sz="2000" i="1" dirty="0" smtClean="0"/>
+              <a:t>The game</a:t>
+            </a:r>
+            <a:r>
+              <a:rPr lang="en-US" sz="2000" i="1" dirty="0" smtClean="0"/>
+              <a:t> </a:t>
+            </a:r>
+            <a:r>
+              <a:rPr lang="en-US" sz="2000" i="1" dirty="0"/>
+              <a:t>was originally released in 1972. This special TEKcamp version was created in response to the need for a 4 Player version.</a:t>
+            </a:r>
+            <a:endParaRPr lang="en-US" sz="2000" dirty="0"/>
           </a:p>
           <a:p>
             <a:pPr>
@@ -7317,18 +7356,9 @@
               </a:buBlip>
             </a:pPr>
             <a:r>
-              <a:rPr lang="en-US" sz="2000" i="1" dirty="0"/>
-              <a:t>Pong was created by Allan Alcorn for Atari, a table tennis game featuring simple two-dimensional graphics which was originally released in 1972. This special </a:t>
-            </a:r>
-            <a:r>
-              <a:rPr lang="en-US" sz="2000" i="1" dirty="0" err="1"/>
-              <a:t>TEKcamp</a:t>
-            </a:r>
-            <a:r>
-              <a:rPr lang="en-US" sz="2000" i="1" dirty="0"/>
-              <a:t> version was created in response to the need for a 4 Player version.</a:t>
-            </a:r>
-            <a:endParaRPr lang="en-US" sz="2000" dirty="0"/>
+              <a:rPr lang="en-US" sz="2000" dirty="0"/>
+              <a:t>Customer: Eric and Denise Kliskey</a:t>
+            </a:r>
           </a:p>
           <a:p>
             <a:pPr>
@@ -7604,15 +7634,7 @@
             </a:r>
             <a:r>
               <a:rPr lang="en-US" dirty="0" smtClean="0"/>
-              <a:t>. The relationships I have already formed in </a:t>
-            </a:r>
-            <a:r>
-              <a:rPr lang="en-US" dirty="0" err="1" smtClean="0"/>
-              <a:t>TEKcamp</a:t>
-            </a:r>
-            <a:r>
-              <a:rPr lang="en-US" dirty="0" smtClean="0"/>
-              <a:t> deepened and </a:t>
+              <a:t>. The relationships I have already formed in TEKcamp deepened and </a:t>
             </a:r>
             <a:r>
               <a:rPr lang="en-US" dirty="0"/>
@@ -8250,15 +8272,7 @@
             </a:r>
             <a:r>
               <a:rPr lang="en-US" sz="1400" dirty="0"/>
-              <a:t>(“</a:t>
-            </a:r>
-            <a:r>
-              <a:rPr lang="en-US" sz="1400" dirty="0" err="1"/>
-              <a:t>TEKcamp</a:t>
-            </a:r>
-            <a:r>
-              <a:rPr lang="en-US" sz="1400" dirty="0"/>
-              <a:t> Pong!”);</a:t>
+              <a:t>(“TEKcamp Pong!”);</a:t>
             </a:r>
           </a:p>
           <a:p>
@@ -9191,8 +9205,13 @@
             </a:pPr>
             <a:r>
               <a:rPr lang="en-US" dirty="0" smtClean="0"/>
-              <a:t>Player Names display on GUI</a:t>
-            </a:r>
+              <a:t>Player Names display on </a:t>
+            </a:r>
+            <a:r>
+              <a:rPr lang="en-US" dirty="0" smtClean="0"/>
+              <a:t>the GUI</a:t>
+            </a:r>
+            <a:endParaRPr lang="en-US" dirty="0" smtClean="0"/>
           </a:p>
           <a:p>
             <a:pPr>
@@ -9202,7 +9221,19 @@
             </a:pPr>
             <a:r>
               <a:rPr lang="en-US" dirty="0" smtClean="0"/>
-              <a:t>Score displays on GUI and increments in real time</a:t>
+              <a:t>The Score </a:t>
+            </a:r>
+            <a:r>
+              <a:rPr lang="en-US" dirty="0" smtClean="0"/>
+              <a:t>displays on </a:t>
+            </a:r>
+            <a:r>
+              <a:rPr lang="en-US" dirty="0" smtClean="0"/>
+              <a:t>the GUI </a:t>
+            </a:r>
+            <a:r>
+              <a:rPr lang="en-US" dirty="0" smtClean="0"/>
+              <a:t>and increments in real time</a:t>
             </a:r>
           </a:p>
           <a:p>
@@ -9212,19 +9243,32 @@
               </a:buBlip>
             </a:pPr>
             <a:r>
-              <a:rPr lang="en-US" dirty="0" err="1" smtClean="0"/>
-              <a:t>TEKcamp</a:t>
-            </a:r>
-            <a:r>
               <a:rPr lang="en-US" dirty="0" smtClean="0"/>
-              <a:t> logo displayed on GUI and in dialogue boxes</a:t>
+              <a:t>The TEKcamp logo is </a:t>
+            </a:r>
+            <a:r>
+              <a:rPr lang="en-US" dirty="0" smtClean="0"/>
+              <a:t>displayed </a:t>
+            </a:r>
+            <a:r>
+              <a:rPr lang="en-US" dirty="0" smtClean="0"/>
+              <a:t>on the </a:t>
+            </a:r>
+            <a:r>
+              <a:rPr lang="en-US" dirty="0" smtClean="0"/>
+              <a:t>GUI and in dialogue boxes</a:t>
             </a:r>
           </a:p>
           <a:p>
             <a:r>
               <a:rPr lang="en-US" sz="1800" dirty="0" smtClean="0"/>
-              <a:t>Future Upgrades:</a:t>
-            </a:r>
+              <a:t>Future Upgrades</a:t>
+            </a:r>
+            <a:r>
+              <a:rPr lang="en-US" sz="1800" dirty="0" smtClean="0"/>
+              <a:t>: </a:t>
+            </a:r>
+            <a:endParaRPr lang="en-US" sz="1800" dirty="0" smtClean="0"/>
           </a:p>
           <a:p>
             <a:pPr>
@@ -9544,12 +9588,8 @@
               </a:buBlip>
             </a:pPr>
             <a:r>
-              <a:rPr lang="en-US" dirty="0" err="1" smtClean="0"/>
-              <a:t>TEKcamp</a:t>
-            </a:r>
-            <a:r>
               <a:rPr lang="en-US" dirty="0" smtClean="0"/>
-              <a:t> Logo for GUI (supplied by classmate Abigail </a:t>
+              <a:t>TEKcamp Logo for GUI (supplied by classmate Abigail </a:t>
             </a:r>
             <a:r>
               <a:rPr lang="en-US" dirty="0" err="1" smtClean="0"/>

</xml_diff>

<commit_message>
final tweaks on presentation
</commit_message>
<xml_diff>
--- a/Capstone_2.pptx
+++ b/Capstone_2.pptx
@@ -5,35 +5,34 @@
     <p:sldMasterId id="2147483673" r:id="rId1"/>
   </p:sldMasterIdLst>
   <p:notesMasterIdLst>
-    <p:notesMasterId r:id="rId28"/>
+    <p:notesMasterId r:id="rId27"/>
   </p:notesMasterIdLst>
   <p:sldIdLst>
     <p:sldId id="256" r:id="rId2"/>
     <p:sldId id="257" r:id="rId3"/>
     <p:sldId id="260" r:id="rId4"/>
     <p:sldId id="279" r:id="rId5"/>
-    <p:sldId id="278" r:id="rId6"/>
-    <p:sldId id="273" r:id="rId7"/>
-    <p:sldId id="261" r:id="rId8"/>
+    <p:sldId id="273" r:id="rId6"/>
+    <p:sldId id="261" r:id="rId7"/>
+    <p:sldId id="278" r:id="rId8"/>
     <p:sldId id="271" r:id="rId9"/>
     <p:sldId id="272" r:id="rId10"/>
-    <p:sldId id="280" r:id="rId11"/>
-    <p:sldId id="269" r:id="rId12"/>
-    <p:sldId id="258" r:id="rId13"/>
-    <p:sldId id="268" r:id="rId14"/>
-    <p:sldId id="276" r:id="rId15"/>
-    <p:sldId id="289" r:id="rId16"/>
-    <p:sldId id="281" r:id="rId17"/>
-    <p:sldId id="282" r:id="rId18"/>
-    <p:sldId id="275" r:id="rId19"/>
-    <p:sldId id="283" r:id="rId20"/>
-    <p:sldId id="259" r:id="rId21"/>
-    <p:sldId id="270" r:id="rId22"/>
-    <p:sldId id="284" r:id="rId23"/>
-    <p:sldId id="285" r:id="rId24"/>
-    <p:sldId id="286" r:id="rId25"/>
-    <p:sldId id="287" r:id="rId26"/>
-    <p:sldId id="288" r:id="rId27"/>
+    <p:sldId id="269" r:id="rId11"/>
+    <p:sldId id="258" r:id="rId12"/>
+    <p:sldId id="268" r:id="rId13"/>
+    <p:sldId id="276" r:id="rId14"/>
+    <p:sldId id="281" r:id="rId15"/>
+    <p:sldId id="282" r:id="rId16"/>
+    <p:sldId id="283" r:id="rId17"/>
+    <p:sldId id="259" r:id="rId18"/>
+    <p:sldId id="270" r:id="rId19"/>
+    <p:sldId id="289" r:id="rId20"/>
+    <p:sldId id="280" r:id="rId21"/>
+    <p:sldId id="284" r:id="rId22"/>
+    <p:sldId id="285" r:id="rId23"/>
+    <p:sldId id="286" r:id="rId24"/>
+    <p:sldId id="287" r:id="rId25"/>
+    <p:sldId id="288" r:id="rId26"/>
   </p:sldIdLst>
   <p:sldSz cx="9144000" cy="6858000" type="screen4x3"/>
   <p:notesSz cx="6858000" cy="9144000"/>
@@ -217,7 +216,7 @@
           <a:p>
             <a:fld id="{EBDF7B44-89A3-8742-BB5E-10328229F0CB}" type="datetimeFigureOut">
               <a:rPr lang="en-US" smtClean="0"/>
-              <a:t>7/13/20</a:t>
+              <a:t>7/14/20</a:t>
             </a:fld>
             <a:endParaRPr lang="en-US"/>
           </a:p>
@@ -550,7 +549,7 @@
           <a:p>
             <a:fld id="{65E8BB81-4096-A64B-8CB8-BACD4890256B}" type="slidenum">
               <a:rPr lang="en-US" smtClean="0"/>
-              <a:t>7</a:t>
+              <a:t>6</a:t>
             </a:fld>
             <a:endParaRPr lang="en-US"/>
           </a:p>
@@ -1037,7 +1036,7 @@
           <a:p>
             <a:fld id="{B01F9CA3-105E-4857-9057-6DB6197DA786}" type="datetimeFigureOut">
               <a:rPr lang="en-US" smtClean="0"/>
-              <a:t>7/13/20</a:t>
+              <a:t>7/14/20</a:t>
             </a:fld>
             <a:endParaRPr lang="en-US"/>
           </a:p>
@@ -1202,7 +1201,7 @@
           <a:p>
             <a:fld id="{B01F9CA3-105E-4857-9057-6DB6197DA786}" type="datetimeFigureOut">
               <a:rPr lang="en-US" smtClean="0"/>
-              <a:t>7/13/20</a:t>
+              <a:t>7/14/20</a:t>
             </a:fld>
             <a:endParaRPr lang="en-US"/>
           </a:p>
@@ -1377,7 +1376,7 @@
           <a:p>
             <a:fld id="{B01F9CA3-105E-4857-9057-6DB6197DA786}" type="datetimeFigureOut">
               <a:rPr lang="en-US" smtClean="0"/>
-              <a:t>7/13/20</a:t>
+              <a:t>7/14/20</a:t>
             </a:fld>
             <a:endParaRPr lang="en-US"/>
           </a:p>
@@ -1542,7 +1541,7 @@
           <a:p>
             <a:fld id="{B01F9CA3-105E-4857-9057-6DB6197DA786}" type="datetimeFigureOut">
               <a:rPr lang="en-US" smtClean="0"/>
-              <a:t>7/13/20</a:t>
+              <a:t>7/14/20</a:t>
             </a:fld>
             <a:endParaRPr lang="en-US"/>
           </a:p>
@@ -2095,7 +2094,7 @@
           <a:p>
             <a:fld id="{B01F9CA3-105E-4857-9057-6DB6197DA786}" type="datetimeFigureOut">
               <a:rPr lang="en-US" smtClean="0"/>
-              <a:t>7/13/20</a:t>
+              <a:t>7/14/20</a:t>
             </a:fld>
             <a:endParaRPr lang="en-US"/>
           </a:p>
@@ -2355,7 +2354,7 @@
           <a:p>
             <a:fld id="{B01F9CA3-105E-4857-9057-6DB6197DA786}" type="datetimeFigureOut">
               <a:rPr lang="en-US" smtClean="0"/>
-              <a:t>7/13/20</a:t>
+              <a:t>7/14/20</a:t>
             </a:fld>
             <a:endParaRPr lang="en-US"/>
           </a:p>
@@ -2843,7 +2842,7 @@
           <a:p>
             <a:fld id="{B01F9CA3-105E-4857-9057-6DB6197DA786}" type="datetimeFigureOut">
               <a:rPr lang="en-US" smtClean="0"/>
-              <a:t>7/13/20</a:t>
+              <a:t>7/14/20</a:t>
             </a:fld>
             <a:endParaRPr lang="en-US"/>
           </a:p>
@@ -2956,7 +2955,7 @@
           <a:p>
             <a:fld id="{B01F9CA3-105E-4857-9057-6DB6197DA786}" type="datetimeFigureOut">
               <a:rPr lang="en-US" smtClean="0"/>
-              <a:t>7/13/20</a:t>
+              <a:t>7/14/20</a:t>
             </a:fld>
             <a:endParaRPr lang="en-US"/>
           </a:p>
@@ -3046,7 +3045,7 @@
           <a:p>
             <a:fld id="{B01F9CA3-105E-4857-9057-6DB6197DA786}" type="datetimeFigureOut">
               <a:rPr lang="en-US" smtClean="0"/>
-              <a:t>7/13/20</a:t>
+              <a:t>7/14/20</a:t>
             </a:fld>
             <a:endParaRPr lang="en-US"/>
           </a:p>
@@ -3476,7 +3475,7 @@
           <a:p>
             <a:fld id="{B01F9CA3-105E-4857-9057-6DB6197DA786}" type="datetimeFigureOut">
               <a:rPr lang="en-US" smtClean="0"/>
-              <a:t>7/13/20</a:t>
+              <a:t>7/14/20</a:t>
             </a:fld>
             <a:endParaRPr lang="en-US"/>
           </a:p>
@@ -4009,7 +4008,7 @@
           <a:p>
             <a:fld id="{B01F9CA3-105E-4857-9057-6DB6197DA786}" type="datetimeFigureOut">
               <a:rPr lang="en-US" smtClean="0"/>
-              <a:t>7/13/20</a:t>
+              <a:t>7/14/20</a:t>
             </a:fld>
             <a:endParaRPr lang="en-US"/>
           </a:p>
@@ -4849,7 +4848,7 @@
           <a:p>
             <a:fld id="{B01F9CA3-105E-4857-9057-6DB6197DA786}" type="datetimeFigureOut">
               <a:rPr lang="en-US" smtClean="0"/>
-              <a:t>7/13/20</a:t>
+              <a:t>7/14/20</a:t>
             </a:fld>
             <a:endParaRPr lang="en-US"/>
           </a:p>
@@ -5464,57 +5463,226 @@
         </p:nvSpPr>
         <p:spPr>
           <a:xfrm>
-            <a:off x="822960" y="91440"/>
-            <a:ext cx="7520940" cy="548640"/>
+            <a:off x="549275" y="-430097"/>
+            <a:ext cx="8042276" cy="1336956"/>
           </a:xfrm>
         </p:spPr>
         <p:txBody>
           <a:bodyPr/>
           <a:lstStyle/>
           <a:p>
-            <a:pPr algn="ctr"/>
-            <a:r>
-              <a:rPr lang="en-US" sz="2400" dirty="0" smtClean="0"/>
-              <a:t>Game Instructions</a:t>
-            </a:r>
-            <a:endParaRPr lang="en-US" sz="2400" dirty="0"/>
-          </a:p>
-        </p:txBody>
-      </p:sp>
-      <p:pic>
-        <p:nvPicPr>
-          <p:cNvPr id="4" name="Content Placeholder 3" descr="Screen Shot 2020-07-13 at 10.36.22 AM.png"/>
-          <p:cNvPicPr>
-            <a:picLocks noGrp="1" noChangeAspect="1"/>
-          </p:cNvPicPr>
+            <a:r>
+              <a:rPr lang="en-US" dirty="0" smtClean="0"/>
+              <a:t>Preliminary Planning</a:t>
+            </a:r>
+            <a:endParaRPr lang="en-US" dirty="0"/>
+          </a:p>
+        </p:txBody>
+      </p:sp>
+      <p:sp>
+        <p:nvSpPr>
+          <p:cNvPr id="3" name="Content Placeholder 2"/>
+          <p:cNvSpPr>
+            <a:spLocks noGrp="1"/>
+          </p:cNvSpPr>
           <p:nvPr>
             <p:ph idx="1"/>
           </p:nvPr>
-        </p:nvPicPr>
-        <p:blipFill>
-          <a:blip r:embed="rId2">
-            <a:extLst>
-              <a:ext uri="{28A0092B-C50C-407E-A947-70E740481C1C}">
-                <a14:useLocalDpi xmlns:a14="http://schemas.microsoft.com/office/drawing/2010/main" val="0"/>
-              </a:ext>
-            </a:extLst>
-          </a:blip>
-          <a:srcRect l="-86266" r="-86266"/>
-          <a:stretch>
-            <a:fillRect/>
-          </a:stretch>
-        </p:blipFill>
+        </p:nvSpPr>
         <p:spPr>
           <a:xfrm>
-            <a:off x="-1851546" y="640080"/>
-            <a:ext cx="12987203" cy="6181704"/>
+            <a:off x="549275" y="443922"/>
+            <a:ext cx="8245757" cy="4343400"/>
           </a:xfrm>
         </p:spPr>
-      </p:pic>
+        <p:txBody>
+          <a:bodyPr>
+            <a:noAutofit/>
+          </a:bodyPr>
+          <a:lstStyle/>
+          <a:p>
+            <a:pPr marL="0" indent="0">
+              <a:buNone/>
+            </a:pPr>
+            <a:r>
+              <a:rPr lang="en-US" sz="1600" b="1" dirty="0" smtClean="0"/>
+              <a:t>Projected Daily Goals:</a:t>
+            </a:r>
+          </a:p>
+          <a:p>
+            <a:pPr marL="285750" indent="-285750">
+              <a:buBlip>
+                <a:blip r:embed="rId2"/>
+              </a:buBlip>
+            </a:pPr>
+            <a:r>
+              <a:rPr lang="en-US" sz="1600" b="1" dirty="0" smtClean="0"/>
+              <a:t>Day One: </a:t>
+            </a:r>
+            <a:r>
+              <a:rPr lang="en-US" sz="1600" dirty="0" smtClean="0"/>
+              <a:t>Review </a:t>
+            </a:r>
+            <a:r>
+              <a:rPr lang="en-US" sz="1600" dirty="0"/>
+              <a:t>Capstone Documentation provided by instructor. </a:t>
+            </a:r>
+            <a:r>
+              <a:rPr lang="en-US" sz="1600" dirty="0" smtClean="0"/>
+              <a:t>Research games and </a:t>
+            </a:r>
+            <a:r>
+              <a:rPr lang="en-US" dirty="0"/>
+              <a:t>e</a:t>
+            </a:r>
+            <a:r>
+              <a:rPr lang="en-US" sz="1600" dirty="0" smtClean="0"/>
+              <a:t>xamine existing code to understand how </a:t>
+            </a:r>
+            <a:r>
+              <a:rPr lang="en-US" dirty="0" smtClean="0"/>
+              <a:t>to implement functionality.</a:t>
+            </a:r>
+            <a:r>
+              <a:rPr lang="en-US" sz="1600" dirty="0" smtClean="0"/>
+              <a:t> Locate resources to aid in creating </a:t>
+            </a:r>
+            <a:r>
+              <a:rPr lang="en-US" dirty="0"/>
+              <a:t>game. </a:t>
+            </a:r>
+            <a:r>
+              <a:rPr lang="en-US" dirty="0" smtClean="0"/>
+              <a:t>Finalize </a:t>
+            </a:r>
+            <a:r>
+              <a:rPr lang="en-US" dirty="0"/>
+              <a:t>game selection. </a:t>
+            </a:r>
+            <a:endParaRPr lang="en-US" sz="1600" dirty="0" smtClean="0"/>
+          </a:p>
+          <a:p>
+            <a:pPr marL="285750" indent="-285750">
+              <a:buBlip>
+                <a:blip r:embed="rId2"/>
+              </a:buBlip>
+            </a:pPr>
+            <a:r>
+              <a:rPr lang="en-US" sz="1600" b="1" dirty="0" smtClean="0"/>
+              <a:t>Day Two: </a:t>
+            </a:r>
+            <a:r>
+              <a:rPr lang="en-US" sz="1600" dirty="0" smtClean="0"/>
+              <a:t>Define </a:t>
+            </a:r>
+            <a:r>
+              <a:rPr lang="en-US" sz="1600" dirty="0"/>
+              <a:t>problem and begin to plan how to solve it</a:t>
+            </a:r>
+            <a:r>
+              <a:rPr lang="en-US" sz="1600" dirty="0" smtClean="0"/>
+              <a:t>. Complete </a:t>
+            </a:r>
+            <a:r>
+              <a:rPr lang="en-US" sz="1600" dirty="0"/>
+              <a:t>Step One </a:t>
+            </a:r>
+            <a:r>
+              <a:rPr lang="en-US" sz="1600" dirty="0" smtClean="0"/>
+              <a:t>and Two of UPER. Work on OOP documentation per capstone requirements.</a:t>
+            </a:r>
+          </a:p>
+          <a:p>
+            <a:pPr marL="285750" indent="-285750">
+              <a:buBlip>
+                <a:blip r:embed="rId2"/>
+              </a:buBlip>
+            </a:pPr>
+            <a:r>
+              <a:rPr lang="en-US" sz="1600" b="1" dirty="0" smtClean="0"/>
+              <a:t>Day Three: </a:t>
+            </a:r>
+            <a:r>
+              <a:rPr lang="en-US" sz="1600" dirty="0" smtClean="0"/>
+              <a:t>Review Feature List from Customer Requirements. Brainstorm Structure with </a:t>
+            </a:r>
+            <a:r>
+              <a:rPr lang="en-US" sz="1600" dirty="0"/>
+              <a:t>C</a:t>
+            </a:r>
+            <a:r>
+              <a:rPr lang="en-US" sz="1600" dirty="0" smtClean="0"/>
+              <a:t>lasses/Objects needed to fulfill MVP. Continue to work on OOP documentation. Research pong code and try to understand how it works. Identify trouble areas and research.</a:t>
+            </a:r>
+          </a:p>
+          <a:p>
+            <a:pPr marL="285750" indent="-285750">
+              <a:buBlip>
+                <a:blip r:embed="rId2"/>
+              </a:buBlip>
+            </a:pPr>
+            <a:r>
+              <a:rPr lang="en-US" sz="1600" b="1" dirty="0" smtClean="0"/>
+              <a:t>Day Four: Begin coding basic structure. </a:t>
+            </a:r>
+            <a:r>
+              <a:rPr lang="en-US" sz="1600" dirty="0" smtClean="0"/>
+              <a:t>identify problem areas and prioritize time according to what can be accomplished while waiting on resources needed to accomplish tasks in the queue. Research what is needed to accomplish Features Wish List</a:t>
+            </a:r>
+          </a:p>
+          <a:p>
+            <a:pPr marL="285750" indent="-285750">
+              <a:buBlip>
+                <a:blip r:embed="rId2"/>
+              </a:buBlip>
+            </a:pPr>
+            <a:r>
+              <a:rPr lang="en-US" sz="1600" b="1" dirty="0" smtClean="0"/>
+              <a:t>Day Five – Six: </a:t>
+            </a:r>
+            <a:r>
+              <a:rPr lang="en-US" sz="1600" dirty="0"/>
+              <a:t>C</a:t>
+            </a:r>
+            <a:r>
+              <a:rPr lang="en-US" sz="1600" dirty="0" smtClean="0"/>
+              <a:t>ontinue coding and </a:t>
+            </a:r>
+            <a:r>
+              <a:rPr lang="en-US" dirty="0" smtClean="0"/>
+              <a:t>work </a:t>
+            </a:r>
+            <a:r>
+              <a:rPr lang="en-US" dirty="0"/>
+              <a:t>on coding items from Features Wish List in order of </a:t>
+            </a:r>
+            <a:r>
+              <a:rPr lang="en-US" dirty="0" smtClean="0"/>
+              <a:t>priority. Work on refactoring and debugging.</a:t>
+            </a:r>
+          </a:p>
+          <a:p>
+            <a:pPr marL="285750" indent="-285750">
+              <a:buBlip>
+                <a:blip r:embed="rId2"/>
+              </a:buBlip>
+            </a:pPr>
+            <a:r>
+              <a:rPr lang="en-US" sz="1600" b="1" dirty="0" smtClean="0"/>
+              <a:t>Day Seven: </a:t>
+            </a:r>
+            <a:r>
+              <a:rPr lang="en-US" sz="1600" dirty="0" smtClean="0"/>
+              <a:t>Address and Resolve any Coding Issues. Complete Documentation. Prepare slides from notes and practice presentation.</a:t>
+            </a:r>
+            <a:endParaRPr lang="en-US" sz="1600" dirty="0"/>
+          </a:p>
+        </p:txBody>
+      </p:sp>
     </p:spTree>
     <p:extLst>
       <p:ext uri="{BB962C8B-B14F-4D97-AF65-F5344CB8AC3E}">
-        <p14:creationId xmlns:p14="http://schemas.microsoft.com/office/powerpoint/2010/main" val="1782544920"/>
+        <p14:creationId xmlns:p14="http://schemas.microsoft.com/office/powerpoint/2010/main" val="785421245"/>
       </p:ext>
     </p:extLst>
   </p:cSld>
@@ -5558,232 +5726,150 @@
             <p:ph type="title"/>
           </p:nvPr>
         </p:nvSpPr>
+        <p:spPr/>
+        <p:txBody>
+          <a:bodyPr/>
+          <a:lstStyle/>
+          <a:p>
+            <a:r>
+              <a:rPr lang="en-US" dirty="0" smtClean="0"/>
+              <a:t>Tools/Resources Available</a:t>
+            </a:r>
+            <a:endParaRPr lang="en-US" dirty="0"/>
+          </a:p>
+        </p:txBody>
+      </p:sp>
+      <p:sp>
+        <p:nvSpPr>
+          <p:cNvPr id="3" name="Content Placeholder 2"/>
+          <p:cNvSpPr>
+            <a:spLocks noGrp="1"/>
+          </p:cNvSpPr>
+          <p:nvPr>
+            <p:ph idx="1"/>
+          </p:nvPr>
+        </p:nvSpPr>
         <p:spPr>
           <a:xfrm>
-            <a:off x="549275" y="-430097"/>
-            <a:ext cx="8042276" cy="1336956"/>
+            <a:off x="549275" y="1967571"/>
+            <a:ext cx="8042276" cy="4343400"/>
           </a:xfrm>
         </p:spPr>
         <p:txBody>
           <a:bodyPr/>
           <a:lstStyle/>
           <a:p>
-            <a:r>
-              <a:rPr lang="en-US" dirty="0" smtClean="0"/>
-              <a:t>Preliminary Planning</a:t>
-            </a:r>
-            <a:endParaRPr lang="en-US" dirty="0"/>
-          </a:p>
-        </p:txBody>
-      </p:sp>
-      <p:sp>
-        <p:nvSpPr>
-          <p:cNvPr id="3" name="Content Placeholder 2"/>
-          <p:cNvSpPr>
-            <a:spLocks noGrp="1"/>
-          </p:cNvSpPr>
-          <p:nvPr>
-            <p:ph idx="1"/>
-          </p:nvPr>
-        </p:nvSpPr>
-        <p:spPr>
-          <a:xfrm>
-            <a:off x="549275" y="443922"/>
-            <a:ext cx="8245757" cy="4343400"/>
-          </a:xfrm>
-        </p:spPr>
-        <p:txBody>
-          <a:bodyPr>
-            <a:noAutofit/>
-          </a:bodyPr>
-          <a:lstStyle/>
-          <a:p>
-            <a:pPr marL="0" indent="0">
-              <a:buNone/>
-            </a:pPr>
-            <a:r>
-              <a:rPr lang="en-US" sz="1600" b="1" dirty="0" smtClean="0"/>
-              <a:t>Projected Daily Goals:</a:t>
-            </a:r>
-          </a:p>
-          <a:p>
-            <a:pPr marL="285750" indent="-285750">
+            <a:pPr>
               <a:buBlip>
                 <a:blip r:embed="rId2"/>
               </a:buBlip>
             </a:pPr>
-            <a:r>
-              <a:rPr lang="en-US" sz="1600" b="1" dirty="0" smtClean="0"/>
-              <a:t>Day One: </a:t>
-            </a:r>
-            <a:r>
-              <a:rPr lang="en-US" sz="1600" dirty="0" smtClean="0"/>
-              <a:t>Review </a:t>
-            </a:r>
-            <a:r>
-              <a:rPr lang="en-US" sz="1600" dirty="0"/>
-              <a:t>Capstone Documentation provided by instructor. </a:t>
-            </a:r>
-            <a:r>
-              <a:rPr lang="en-US" sz="1600" dirty="0" smtClean="0"/>
-              <a:t>Research games and </a:t>
-            </a:r>
-            <a:r>
-              <a:rPr lang="en-US" dirty="0"/>
-              <a:t>e</a:t>
-            </a:r>
-            <a:r>
-              <a:rPr lang="en-US" sz="1600" dirty="0" smtClean="0"/>
-              <a:t>xamine existing code to understand how </a:t>
-            </a:r>
-            <a:r>
-              <a:rPr lang="en-US" dirty="0" smtClean="0"/>
-              <a:t>to implement functionality.</a:t>
-            </a:r>
-            <a:r>
-              <a:rPr lang="en-US" sz="1600" dirty="0" smtClean="0"/>
-              <a:t> Locate resources to aid in creating </a:t>
-            </a:r>
-            <a:r>
-              <a:rPr lang="en-US" dirty="0"/>
-              <a:t>game. </a:t>
-            </a:r>
-            <a:r>
-              <a:rPr lang="en-US" dirty="0" smtClean="0"/>
-              <a:t>Finalize </a:t>
-            </a:r>
-            <a:r>
-              <a:rPr lang="en-US" dirty="0"/>
-              <a:t>game selection. </a:t>
-            </a:r>
-            <a:endParaRPr lang="en-US" sz="1600" dirty="0" smtClean="0"/>
-          </a:p>
-          <a:p>
-            <a:pPr marL="285750" indent="-285750">
+            <a:endParaRPr lang="en-US" dirty="0" smtClean="0"/>
+          </a:p>
+          <a:p>
+            <a:pPr>
               <a:buBlip>
                 <a:blip r:embed="rId2"/>
               </a:buBlip>
             </a:pPr>
             <a:r>
-              <a:rPr lang="en-US" sz="1600" b="1" dirty="0" smtClean="0"/>
-              <a:t>Day Two: </a:t>
-            </a:r>
-            <a:r>
-              <a:rPr lang="en-US" sz="1600" dirty="0" smtClean="0"/>
-              <a:t>Define </a:t>
-            </a:r>
-            <a:r>
-              <a:rPr lang="en-US" sz="1600" dirty="0"/>
-              <a:t>problem and begin to plan how to solve it</a:t>
-            </a:r>
-            <a:r>
-              <a:rPr lang="en-US" sz="1600" dirty="0" smtClean="0"/>
-              <a:t>. Complete </a:t>
-            </a:r>
-            <a:r>
-              <a:rPr lang="en-US" sz="1600" dirty="0"/>
-              <a:t>Step One </a:t>
-            </a:r>
-            <a:r>
-              <a:rPr lang="en-US" sz="1600" dirty="0" smtClean="0"/>
-              <a:t>and Two of UPER. Work on OOP documentation per capstone requirements.</a:t>
-            </a:r>
-          </a:p>
-          <a:p>
-            <a:pPr marL="285750" indent="-285750">
+              <a:rPr lang="en-US" dirty="0" smtClean="0"/>
+              <a:t>Collaboration with other students/friends</a:t>
+            </a:r>
+          </a:p>
+          <a:p>
+            <a:pPr>
               <a:buBlip>
                 <a:blip r:embed="rId2"/>
               </a:buBlip>
             </a:pPr>
             <a:r>
-              <a:rPr lang="en-US" sz="1600" b="1" dirty="0" smtClean="0"/>
-              <a:t>Day Three: </a:t>
-            </a:r>
-            <a:r>
-              <a:rPr lang="en-US" sz="1600" dirty="0" smtClean="0"/>
-              <a:t>Review Feature List from Customer Requirements. Brainstorm Structure with </a:t>
-            </a:r>
-            <a:r>
-              <a:rPr lang="en-US" sz="1600" dirty="0"/>
-              <a:t>C</a:t>
-            </a:r>
-            <a:r>
-              <a:rPr lang="en-US" sz="1600" dirty="0" smtClean="0"/>
-              <a:t>lasses/Objects needed to fulfill MVP. Continue to work on OOP documentation. Research pong code and try to understand how it works. Identify trouble areas and research.</a:t>
-            </a:r>
-          </a:p>
-          <a:p>
-            <a:pPr marL="285750" indent="-285750">
+              <a:rPr lang="en-US" dirty="0" smtClean="0"/>
+              <a:t>Support Sessions led by TEKacademy Faculty</a:t>
+            </a:r>
+          </a:p>
+          <a:p>
+            <a:pPr>
               <a:buBlip>
                 <a:blip r:embed="rId2"/>
               </a:buBlip>
             </a:pPr>
             <a:r>
-              <a:rPr lang="en-US" sz="1600" b="1" dirty="0" smtClean="0"/>
-              <a:t>Day </a:t>
-            </a:r>
-            <a:r>
-              <a:rPr lang="en-US" sz="1600" b="1" dirty="0" smtClean="0"/>
-              <a:t>Four: Begin coding basic structure. </a:t>
-            </a:r>
-            <a:r>
-              <a:rPr lang="en-US" sz="1600" dirty="0" smtClean="0"/>
-              <a:t>identify problem areas and prioritize time according to what can be accomplished while waiting on resources needed to accomplish tasks in the queue. Research what is needed to accomplish Features Wish List</a:t>
-            </a:r>
-          </a:p>
-          <a:p>
-            <a:pPr marL="285750" indent="-285750">
+              <a:rPr lang="en-US" dirty="0" smtClean="0"/>
+              <a:t>Help Channel and Resources Channel on TEKacademy Slack</a:t>
+            </a:r>
+          </a:p>
+          <a:p>
+            <a:pPr>
               <a:buBlip>
                 <a:blip r:embed="rId2"/>
               </a:buBlip>
             </a:pPr>
             <a:r>
-              <a:rPr lang="en-US" sz="1600" b="1" dirty="0" smtClean="0"/>
-              <a:t>Day Five – Six: </a:t>
-            </a:r>
-            <a:r>
-              <a:rPr lang="en-US" sz="1600" dirty="0"/>
-              <a:t>C</a:t>
-            </a:r>
-            <a:r>
-              <a:rPr lang="en-US" sz="1600" dirty="0" smtClean="0"/>
-              <a:t>ontinue coding and </a:t>
-            </a:r>
-            <a:r>
               <a:rPr lang="en-US" dirty="0" smtClean="0"/>
-              <a:t>work </a:t>
+              <a:t>Extensive Online Documentation including many </a:t>
             </a:r>
             <a:r>
               <a:rPr lang="en-US" dirty="0"/>
-              <a:t>on coding items from Features Wish List in order of </a:t>
+              <a:t>O</a:t>
             </a:r>
             <a:r>
               <a:rPr lang="en-US" dirty="0" smtClean="0"/>
-              <a:t>priority. Work on refactoring and debugging.</a:t>
-            </a:r>
-          </a:p>
-          <a:p>
-            <a:pPr marL="285750" indent="-285750">
+              <a:t>nline </a:t>
+            </a:r>
+            <a:r>
+              <a:rPr lang="en-US" dirty="0"/>
+              <a:t>B</a:t>
+            </a:r>
+            <a:r>
+              <a:rPr lang="en-US" dirty="0" smtClean="0"/>
+              <a:t>log </a:t>
+            </a:r>
+            <a:r>
+              <a:rPr lang="en-US" dirty="0"/>
+              <a:t>A</a:t>
+            </a:r>
+            <a:r>
+              <a:rPr lang="en-US" dirty="0" smtClean="0"/>
+              <a:t>rticles by SW Developers, Stack Overflow, Geeks for Geeks, javadocs, and Udemy and You Tube tutorials </a:t>
+            </a:r>
+          </a:p>
+          <a:p>
+            <a:pPr>
               <a:buBlip>
                 <a:blip r:embed="rId2"/>
               </a:buBlip>
             </a:pPr>
             <a:r>
-              <a:rPr lang="en-US" sz="1600" b="1" dirty="0" smtClean="0"/>
-              <a:t>Day Seven: </a:t>
-            </a:r>
-            <a:r>
-              <a:rPr lang="en-US" sz="1600" dirty="0" smtClean="0"/>
-              <a:t>Address and Resolve any Coding Issues. Complete Documentation. Prepare slides from notes and practice presentation.</a:t>
-            </a:r>
-            <a:endParaRPr lang="en-US" sz="1600" dirty="0"/>
+              <a:rPr lang="en-US" dirty="0" smtClean="0"/>
+              <a:t>Previous </a:t>
+            </a:r>
+            <a:r>
+              <a:rPr lang="en-US" dirty="0" err="1" smtClean="0"/>
+              <a:t>TEKAcademy</a:t>
+            </a:r>
+            <a:r>
+              <a:rPr lang="en-US" dirty="0" smtClean="0"/>
+              <a:t> exercises that can be related to current task</a:t>
+            </a:r>
+          </a:p>
+          <a:p>
+            <a:pPr>
+              <a:buBlip>
+                <a:blip r:embed="rId2"/>
+              </a:buBlip>
+            </a:pPr>
+            <a:endParaRPr lang="en-US" dirty="0" smtClean="0"/>
+          </a:p>
+          <a:p>
+            <a:endParaRPr lang="en-US" dirty="0"/>
           </a:p>
         </p:txBody>
       </p:sp>
     </p:spTree>
     <p:extLst>
       <p:ext uri="{BB962C8B-B14F-4D97-AF65-F5344CB8AC3E}">
-        <p14:creationId xmlns:p14="http://schemas.microsoft.com/office/powerpoint/2010/main" val="785421245"/>
+        <p14:creationId xmlns:p14="http://schemas.microsoft.com/office/powerpoint/2010/main" val="1895834553"/>
       </p:ext>
     </p:extLst>
   </p:cSld>
@@ -5827,158 +5913,149 @@
             <p:ph type="title"/>
           </p:nvPr>
         </p:nvSpPr>
-        <p:spPr/>
-        <p:txBody>
-          <a:bodyPr/>
-          <a:lstStyle/>
-          <a:p>
-            <a:r>
-              <a:rPr lang="en-US" dirty="0" smtClean="0"/>
-              <a:t>Tools/Resources Available</a:t>
-            </a:r>
-            <a:endParaRPr lang="en-US" dirty="0"/>
-          </a:p>
-        </p:txBody>
-      </p:sp>
-      <p:sp>
-        <p:nvSpPr>
-          <p:cNvPr id="3" name="Content Placeholder 2"/>
-          <p:cNvSpPr>
-            <a:spLocks noGrp="1"/>
-          </p:cNvSpPr>
-          <p:nvPr>
-            <p:ph idx="1"/>
-          </p:nvPr>
-        </p:nvSpPr>
         <p:spPr>
           <a:xfrm>
-            <a:off x="549275" y="1967571"/>
-            <a:ext cx="8042276" cy="4343400"/>
+            <a:off x="549275" y="107576"/>
+            <a:ext cx="8042276" cy="1057510"/>
           </a:xfrm>
         </p:spPr>
         <p:txBody>
           <a:bodyPr/>
           <a:lstStyle/>
           <a:p>
-            <a:pPr>
-              <a:buBlip>
-                <a:blip r:embed="rId2"/>
-              </a:buBlip>
+            <a:r>
+              <a:rPr lang="en-US" dirty="0" smtClean="0"/>
+              <a:t>3. Executing the Plan</a:t>
+            </a:r>
+            <a:endParaRPr lang="en-US" dirty="0"/>
+          </a:p>
+        </p:txBody>
+      </p:sp>
+      <p:sp>
+        <p:nvSpPr>
+          <p:cNvPr id="3" name="Content Placeholder 2"/>
+          <p:cNvSpPr>
+            <a:spLocks noGrp="1"/>
+          </p:cNvSpPr>
+          <p:nvPr>
+            <p:ph idx="1"/>
+          </p:nvPr>
+        </p:nvSpPr>
+        <p:spPr>
+          <a:xfrm>
+            <a:off x="549275" y="1054667"/>
+            <a:ext cx="8042276" cy="5022945"/>
+          </a:xfrm>
+        </p:spPr>
+        <p:txBody>
+          <a:bodyPr>
+            <a:normAutofit/>
+          </a:bodyPr>
+          <a:lstStyle/>
+          <a:p>
+            <a:pPr marL="0" indent="0">
+              <a:buNone/>
             </a:pPr>
-            <a:endParaRPr lang="en-US" dirty="0" smtClean="0"/>
-          </a:p>
-          <a:p>
-            <a:pPr>
-              <a:buBlip>
-                <a:blip r:embed="rId2"/>
-              </a:buBlip>
+            <a:r>
+              <a:rPr lang="en-US" dirty="0" smtClean="0"/>
+              <a:t>My first exposure to java was two weeks ago and </a:t>
+            </a:r>
+            <a:r>
+              <a:rPr lang="en-US" dirty="0"/>
+              <a:t>m</a:t>
+            </a:r>
+            <a:r>
+              <a:rPr lang="en-US" dirty="0" smtClean="0"/>
+              <a:t>y learning curve for the software coding required was my biggest blocker. I prioritized my coding time (what I worked on) according to: </a:t>
+            </a:r>
+          </a:p>
+          <a:p>
+            <a:pPr marL="0" indent="0">
+              <a:buNone/>
             </a:pPr>
             <a:r>
               <a:rPr lang="en-US" dirty="0" smtClean="0"/>
-              <a:t>Collaboration with other students/friends</a:t>
-            </a:r>
-          </a:p>
-          <a:p>
-            <a:pPr>
-              <a:buBlip>
-                <a:blip r:embed="rId2"/>
-              </a:buBlip>
+              <a:t>A. MVP</a:t>
+            </a:r>
+          </a:p>
+          <a:p>
+            <a:pPr marL="0" indent="0">
+              <a:buNone/>
             </a:pPr>
             <a:r>
               <a:rPr lang="en-US" dirty="0" smtClean="0"/>
-              <a:t>Support Sessions led by </a:t>
-            </a:r>
-            <a:r>
-              <a:rPr lang="en-US" dirty="0" err="1" smtClean="0"/>
-              <a:t>TEKacademy</a:t>
-            </a:r>
+              <a:t>B. Current technical ability and how much research required to implement the task</a:t>
+            </a:r>
+          </a:p>
+          <a:p>
+            <a:pPr marL="0" indent="0">
+              <a:buNone/>
+            </a:pPr>
             <a:r>
               <a:rPr lang="en-US" dirty="0" smtClean="0"/>
-              <a:t> Faculty</a:t>
-            </a:r>
-          </a:p>
-          <a:p>
-            <a:pPr>
-              <a:buBlip>
-                <a:blip r:embed="rId2"/>
-              </a:buBlip>
+              <a:t>C. Length of time of blocker (which leads to D.)</a:t>
+            </a:r>
+          </a:p>
+          <a:p>
+            <a:pPr marL="0" indent="0">
+              <a:buNone/>
             </a:pPr>
             <a:r>
+              <a:rPr lang="en-US" dirty="0"/>
+              <a:t>D</a:t>
+            </a:r>
+            <a:r>
               <a:rPr lang="en-US" dirty="0" smtClean="0"/>
-              <a:t>Help Channel and Resources Channel on </a:t>
-            </a:r>
-            <a:r>
-              <a:rPr lang="en-US" dirty="0" err="1" smtClean="0"/>
-              <a:t>TEKacademy</a:t>
-            </a:r>
+              <a:t>. Availability of support and other students for collaboration</a:t>
+            </a:r>
+          </a:p>
+          <a:p>
+            <a:pPr marL="0" indent="0"/>
             <a:r>
               <a:rPr lang="en-US" dirty="0" smtClean="0"/>
-              <a:t> Slack</a:t>
-            </a:r>
-          </a:p>
-          <a:p>
-            <a:pPr>
-              <a:buBlip>
-                <a:blip r:embed="rId2"/>
-              </a:buBlip>
+              <a:t> </a:t>
+            </a:r>
+            <a:r>
+              <a:rPr lang="en-US" i="1" dirty="0" smtClean="0"/>
+              <a:t>Thank you to everyone at </a:t>
+            </a:r>
+            <a:r>
+              <a:rPr lang="en-US" i="1" dirty="0" smtClean="0"/>
+              <a:t>TEKacademy </a:t>
+            </a:r>
+            <a:r>
+              <a:rPr lang="en-US" i="1" dirty="0" smtClean="0"/>
+              <a:t>and our cohort – just as in Capstone 1,  the responsiveness of the TEKacademy faculty, the spirit of collaboration among students, and everyone’s desire to help each other succeed was amazing! I especially appreciate the folks from TEKsystems who offered their time and knowledge freely, well-past normal working hours, to anyone who needed help. </a:t>
+            </a:r>
+            <a:r>
+              <a:rPr lang="en-US" i="1" dirty="0"/>
+              <a:t>Special Thanks to my friend, </a:t>
+            </a:r>
+            <a:r>
+              <a:rPr lang="en-US" i="1" dirty="0" err="1"/>
+              <a:t>Jamil</a:t>
+            </a:r>
+            <a:r>
+              <a:rPr lang="en-US" i="1" dirty="0"/>
+              <a:t>, for his patience with all of my questions, his great explanations, and for his guidance as I worked on the code.</a:t>
+            </a:r>
+          </a:p>
+          <a:p>
+            <a:pPr marL="0" indent="0"/>
+            <a:endParaRPr lang="en-US" dirty="0"/>
+          </a:p>
+          <a:p>
+            <a:pPr marL="0" indent="0">
+              <a:buNone/>
             </a:pPr>
-            <a:r>
-              <a:rPr lang="en-US" dirty="0" smtClean="0"/>
-              <a:t>Extensive Online Documentation including many </a:t>
-            </a:r>
-            <a:r>
-              <a:rPr lang="en-US" dirty="0"/>
-              <a:t>O</a:t>
-            </a:r>
-            <a:r>
-              <a:rPr lang="en-US" dirty="0" smtClean="0"/>
-              <a:t>nline </a:t>
-            </a:r>
-            <a:r>
-              <a:rPr lang="en-US" dirty="0"/>
-              <a:t>B</a:t>
-            </a:r>
-            <a:r>
-              <a:rPr lang="en-US" dirty="0" smtClean="0"/>
-              <a:t>log </a:t>
-            </a:r>
-            <a:r>
-              <a:rPr lang="en-US" dirty="0"/>
-              <a:t>A</a:t>
-            </a:r>
-            <a:r>
-              <a:rPr lang="en-US" dirty="0" smtClean="0"/>
-              <a:t>rticles by SW Developers, Stack Overflow, Geeks for Geeks, javadocs, and Udemy and You Tube tutorials </a:t>
-            </a:r>
-          </a:p>
-          <a:p>
-            <a:pPr>
-              <a:buBlip>
-                <a:blip r:embed="rId2"/>
-              </a:buBlip>
-            </a:pPr>
-            <a:r>
-              <a:rPr lang="en-US" dirty="0" smtClean="0"/>
-              <a:t>Previous TEKAcademy exercises that can be related to current task</a:t>
-            </a:r>
-          </a:p>
-          <a:p>
-            <a:pPr>
-              <a:buBlip>
-                <a:blip r:embed="rId2"/>
-              </a:buBlip>
-            </a:pPr>
-            <a:endParaRPr lang="en-US" dirty="0" smtClean="0"/>
-          </a:p>
-          <a:p>
-            <a:endParaRPr lang="en-US" dirty="0"/>
+            <a:endParaRPr lang="en-US" i="1" dirty="0"/>
           </a:p>
         </p:txBody>
       </p:sp>
     </p:spTree>
     <p:extLst>
       <p:ext uri="{BB962C8B-B14F-4D97-AF65-F5344CB8AC3E}">
-        <p14:creationId xmlns:p14="http://schemas.microsoft.com/office/powerpoint/2010/main" val="1895834553"/>
+        <p14:creationId xmlns:p14="http://schemas.microsoft.com/office/powerpoint/2010/main" val="2395010513"/>
       </p:ext>
     </p:extLst>
   </p:cSld>
@@ -6024,174 +6101,7 @@
         </p:nvSpPr>
         <p:spPr>
           <a:xfrm>
-            <a:off x="549275" y="107576"/>
-            <a:ext cx="8042276" cy="1057510"/>
-          </a:xfrm>
-        </p:spPr>
-        <p:txBody>
-          <a:bodyPr/>
-          <a:lstStyle/>
-          <a:p>
-            <a:r>
-              <a:rPr lang="en-US" dirty="0" smtClean="0"/>
-              <a:t>3. Executing the Plan</a:t>
-            </a:r>
-            <a:endParaRPr lang="en-US" dirty="0"/>
-          </a:p>
-        </p:txBody>
-      </p:sp>
-      <p:sp>
-        <p:nvSpPr>
-          <p:cNvPr id="3" name="Content Placeholder 2"/>
-          <p:cNvSpPr>
-            <a:spLocks noGrp="1"/>
-          </p:cNvSpPr>
-          <p:nvPr>
-            <p:ph idx="1"/>
-          </p:nvPr>
-        </p:nvSpPr>
-        <p:spPr>
-          <a:xfrm>
-            <a:off x="549275" y="1054667"/>
-            <a:ext cx="8042276" cy="5022945"/>
-          </a:xfrm>
-        </p:spPr>
-        <p:txBody>
-          <a:bodyPr>
-            <a:normAutofit/>
-          </a:bodyPr>
-          <a:lstStyle/>
-          <a:p>
-            <a:pPr marL="0" indent="0">
-              <a:buNone/>
-            </a:pPr>
-            <a:r>
-              <a:rPr lang="en-US" dirty="0" smtClean="0"/>
-              <a:t>The process for implementing my plan was very fluid, making adjustments as needed. I needed to study a lot of code and spend time with my friend who is a java developer – he patiently explained concepts that would help me understand and implement my code. My learning curve for the software coding required was my biggest blocker. I prioritized my coding time (what I worked on) according to: </a:t>
-            </a:r>
-          </a:p>
-          <a:p>
-            <a:pPr marL="0" indent="0">
-              <a:buNone/>
-            </a:pPr>
-            <a:r>
-              <a:rPr lang="en-US" dirty="0" smtClean="0"/>
-              <a:t>A. MVP</a:t>
-            </a:r>
-          </a:p>
-          <a:p>
-            <a:pPr marL="0" indent="0">
-              <a:buNone/>
-            </a:pPr>
-            <a:r>
-              <a:rPr lang="en-US" dirty="0" smtClean="0"/>
-              <a:t>B. Current technical ability and how much research required to implement the task</a:t>
-            </a:r>
-          </a:p>
-          <a:p>
-            <a:pPr marL="0" indent="0">
-              <a:buNone/>
-            </a:pPr>
-            <a:r>
-              <a:rPr lang="en-US" dirty="0" smtClean="0"/>
-              <a:t>C. Length of time of blocker (which leads to D.)</a:t>
-            </a:r>
-          </a:p>
-          <a:p>
-            <a:pPr marL="0" indent="0">
-              <a:buNone/>
-            </a:pPr>
-            <a:r>
-              <a:rPr lang="en-US" dirty="0"/>
-              <a:t>D</a:t>
-            </a:r>
-            <a:r>
-              <a:rPr lang="en-US" dirty="0" smtClean="0"/>
-              <a:t>. Availability of support and other students for collaboration</a:t>
-            </a:r>
-          </a:p>
-          <a:p>
-            <a:pPr marL="0" indent="0">
-              <a:buNone/>
-            </a:pPr>
-            <a:r>
-              <a:rPr lang="en-US" dirty="0" smtClean="0"/>
-              <a:t> </a:t>
-            </a:r>
-            <a:r>
-              <a:rPr lang="en-US" i="1" dirty="0" smtClean="0"/>
-              <a:t>Thank you to everyone at TEKAcademy and our cohort – just as in Capstone 1,  the responsiveness of the </a:t>
-            </a:r>
-            <a:r>
-              <a:rPr lang="en-US" i="1" dirty="0" err="1" smtClean="0"/>
-              <a:t>TEKacademy</a:t>
-            </a:r>
-            <a:r>
-              <a:rPr lang="en-US" i="1" dirty="0" smtClean="0"/>
-              <a:t> faculty, the spirit of collaboration among students, and everyone’s desire to help each other succeed was amazing! I especially appreciate the folks from </a:t>
-            </a:r>
-            <a:r>
-              <a:rPr lang="en-US" i="1" dirty="0" err="1" smtClean="0"/>
-              <a:t>TEKsystems</a:t>
-            </a:r>
-            <a:r>
-              <a:rPr lang="en-US" i="1" dirty="0" smtClean="0"/>
-              <a:t> who offered their time and knowledge freely, well-past normal working hours, to anyone who needed help.</a:t>
-            </a:r>
-            <a:endParaRPr lang="en-US" i="1" dirty="0"/>
-          </a:p>
-        </p:txBody>
-      </p:sp>
-    </p:spTree>
-    <p:extLst>
-      <p:ext uri="{BB962C8B-B14F-4D97-AF65-F5344CB8AC3E}">
-        <p14:creationId xmlns:p14="http://schemas.microsoft.com/office/powerpoint/2010/main" val="2395010513"/>
-      </p:ext>
-    </p:extLst>
-  </p:cSld>
-  <p:clrMapOvr>
-    <a:masterClrMapping/>
-  </p:clrMapOvr>
-  <p:timing>
-    <p:tnLst>
-      <p:par>
-        <p:cTn xmlns:p14="http://schemas.microsoft.com/office/powerpoint/2010/main" id="1" dur="indefinite" restart="never" nodeType="tmRoot"/>
-      </p:par>
-    </p:tnLst>
-  </p:timing>
-</p:sld>
-</file>
-
-<file path=ppt/slides/slide14.xml><?xml version="1.0" encoding="utf-8"?>
-<p:sld xmlns:a="http://schemas.openxmlformats.org/drawingml/2006/main" xmlns:r="http://schemas.openxmlformats.org/officeDocument/2006/relationships" xmlns:p="http://schemas.openxmlformats.org/presentationml/2006/main">
-  <p:cSld>
-    <p:spTree>
-      <p:nvGrpSpPr>
-        <p:cNvPr id="1" name=""/>
-        <p:cNvGrpSpPr/>
-        <p:nvPr/>
-      </p:nvGrpSpPr>
-      <p:grpSpPr>
-        <a:xfrm>
-          <a:off x="0" y="0"/>
-          <a:ext cx="0" cy="0"/>
-          <a:chOff x="0" y="0"/>
-          <a:chExt cx="0" cy="0"/>
-        </a:xfrm>
-      </p:grpSpPr>
-      <p:sp>
-        <p:nvSpPr>
-          <p:cNvPr id="2" name="Title 1"/>
-          <p:cNvSpPr>
-            <a:spLocks noGrp="1"/>
-          </p:cNvSpPr>
-          <p:nvPr>
-            <p:ph type="title"/>
-          </p:nvPr>
-        </p:nvSpPr>
-        <p:spPr>
-          <a:xfrm>
-            <a:off x="549275" y="107576"/>
+            <a:off x="549275" y="239374"/>
             <a:ext cx="8042276" cy="569025"/>
           </a:xfrm>
         </p:spPr>
@@ -6200,10 +6110,10 @@
           <a:lstStyle/>
           <a:p>
             <a:r>
-              <a:rPr lang="en-US" sz="3200" dirty="0" smtClean="0"/>
+              <a:rPr lang="en-US" dirty="0" smtClean="0"/>
               <a:t>3. Executing the Plan</a:t>
             </a:r>
-            <a:endParaRPr lang="en-US" sz="3200" dirty="0"/>
+            <a:endParaRPr lang="en-US" dirty="0"/>
           </a:p>
         </p:txBody>
       </p:sp>
@@ -6219,15 +6129,25 @@
         </p:nvSpPr>
         <p:spPr>
           <a:xfrm>
-            <a:off x="83087" y="1187019"/>
+            <a:off x="83087" y="1060014"/>
             <a:ext cx="8942217" cy="4047733"/>
           </a:xfrm>
         </p:spPr>
         <p:txBody>
           <a:bodyPr>
-            <a:normAutofit/>
+            <a:normAutofit lnSpcReduction="10000"/>
           </a:bodyPr>
           <a:lstStyle/>
+          <a:p>
+            <a:r>
+              <a:rPr lang="en-US" dirty="0"/>
+              <a:t>MY SOLUTION TO CODING AND EVERYTHING IN LIFE: </a:t>
+            </a:r>
+            <a:r>
+              <a:rPr lang="en-US" i="1" dirty="0"/>
+              <a:t>You don’t need to know everything, you just need to know how to find out what you need to know...</a:t>
+            </a:r>
+          </a:p>
           <a:p>
             <a:r>
               <a:rPr lang="en-US" dirty="0" smtClean="0"/>
@@ -6255,6 +6175,9 @@
               <a:rPr lang="en-US" dirty="0" smtClean="0"/>
               <a:t>. </a:t>
             </a:r>
+          </a:p>
+          <a:p>
+            <a:endParaRPr lang="en-US" dirty="0" smtClean="0"/>
           </a:p>
           <a:p>
             <a:endParaRPr lang="en-US" dirty="0"/>
@@ -6284,250 +6207,7 @@
 </p:sld>
 </file>
 
-<file path=ppt/slides/slide15.xml><?xml version="1.0" encoding="utf-8"?>
-<p:sld xmlns:a="http://schemas.openxmlformats.org/drawingml/2006/main" xmlns:r="http://schemas.openxmlformats.org/officeDocument/2006/relationships" xmlns:p="http://schemas.openxmlformats.org/presentationml/2006/main">
-  <p:cSld>
-    <p:spTree>
-      <p:nvGrpSpPr>
-        <p:cNvPr id="1" name=""/>
-        <p:cNvGrpSpPr/>
-        <p:nvPr/>
-      </p:nvGrpSpPr>
-      <p:grpSpPr>
-        <a:xfrm>
-          <a:off x="0" y="0"/>
-          <a:ext cx="0" cy="0"/>
-          <a:chOff x="0" y="0"/>
-          <a:chExt cx="0" cy="0"/>
-        </a:xfrm>
-      </p:grpSpPr>
-      <p:sp>
-        <p:nvSpPr>
-          <p:cNvPr id="2" name="Title 1"/>
-          <p:cNvSpPr>
-            <a:spLocks noGrp="1"/>
-          </p:cNvSpPr>
-          <p:nvPr>
-            <p:ph type="title"/>
-          </p:nvPr>
-        </p:nvSpPr>
-        <p:spPr>
-          <a:xfrm>
-            <a:off x="822960" y="91440"/>
-            <a:ext cx="7520940" cy="548640"/>
-          </a:xfrm>
-        </p:spPr>
-        <p:txBody>
-          <a:bodyPr/>
-          <a:lstStyle/>
-          <a:p>
-            <a:r>
-              <a:rPr lang="en-US" dirty="0" smtClean="0"/>
-              <a:t>Program Structure</a:t>
-            </a:r>
-            <a:endParaRPr lang="en-US" dirty="0"/>
-          </a:p>
-        </p:txBody>
-      </p:sp>
-      <p:pic>
-        <p:nvPicPr>
-          <p:cNvPr id="4" name="Content Placeholder 3" descr="Screen Shot 2020-07-13 at 7.50.19 PM.png"/>
-          <p:cNvPicPr>
-            <a:picLocks noGrp="1" noChangeAspect="1"/>
-          </p:cNvPicPr>
-          <p:nvPr>
-            <p:ph idx="1"/>
-          </p:nvPr>
-        </p:nvPicPr>
-        <p:blipFill rotWithShape="1">
-          <a:blip r:embed="rId2">
-            <a:extLst>
-              <a:ext uri="{28A0092B-C50C-407E-A947-70E740481C1C}">
-                <a14:useLocalDpi xmlns:a14="http://schemas.microsoft.com/office/drawing/2010/main" val="0"/>
-              </a:ext>
-            </a:extLst>
-          </a:blip>
-          <a:srcRect l="-125101" r="-223048"/>
-          <a:stretch/>
-        </p:blipFill>
-        <p:spPr>
-          <a:xfrm>
-            <a:off x="-3221177" y="1148651"/>
-            <a:ext cx="11733867" cy="5585136"/>
-          </a:xfrm>
-        </p:spPr>
-      </p:pic>
-      <p:pic>
-        <p:nvPicPr>
-          <p:cNvPr id="5" name="Picture 4" descr="Screen Shot 2020-07-13 at 7.50.40 PM.png"/>
-          <p:cNvPicPr>
-            <a:picLocks noChangeAspect="1"/>
-          </p:cNvPicPr>
-          <p:nvPr/>
-        </p:nvPicPr>
-        <p:blipFill>
-          <a:blip r:embed="rId3">
-            <a:extLst>
-              <a:ext uri="{28A0092B-C50C-407E-A947-70E740481C1C}">
-                <a14:useLocalDpi xmlns:a14="http://schemas.microsoft.com/office/drawing/2010/main" val="0"/>
-              </a:ext>
-            </a:extLst>
-          </a:blip>
-          <a:stretch>
-            <a:fillRect/>
-          </a:stretch>
-        </p:blipFill>
-        <p:spPr>
-          <a:xfrm>
-            <a:off x="2839759" y="1148651"/>
-            <a:ext cx="2955710" cy="5324068"/>
-          </a:xfrm>
-          <a:prstGeom prst="rect">
-            <a:avLst/>
-          </a:prstGeom>
-        </p:spPr>
-      </p:pic>
-      <p:pic>
-        <p:nvPicPr>
-          <p:cNvPr id="7" name="Picture 6" descr="Screen Shot 2020-07-13 at 7.57.05 PM.png"/>
-          <p:cNvPicPr>
-            <a:picLocks noChangeAspect="1"/>
-          </p:cNvPicPr>
-          <p:nvPr/>
-        </p:nvPicPr>
-        <p:blipFill>
-          <a:blip r:embed="rId4">
-            <a:extLst>
-              <a:ext uri="{28A0092B-C50C-407E-A947-70E740481C1C}">
-                <a14:useLocalDpi xmlns:a14="http://schemas.microsoft.com/office/drawing/2010/main" val="0"/>
-              </a:ext>
-            </a:extLst>
-          </a:blip>
-          <a:stretch>
-            <a:fillRect/>
-          </a:stretch>
-        </p:blipFill>
-        <p:spPr>
-          <a:xfrm>
-            <a:off x="5929442" y="1148651"/>
-            <a:ext cx="3101825" cy="5245557"/>
-          </a:xfrm>
-          <a:prstGeom prst="rect">
-            <a:avLst/>
-          </a:prstGeom>
-        </p:spPr>
-      </p:pic>
-      <p:sp>
-        <p:nvSpPr>
-          <p:cNvPr id="8" name="TextBox 7"/>
-          <p:cNvSpPr txBox="1"/>
-          <p:nvPr/>
-        </p:nvSpPr>
-        <p:spPr>
-          <a:xfrm>
-            <a:off x="443869" y="766990"/>
-            <a:ext cx="1919854" cy="369332"/>
-          </a:xfrm>
-          <a:prstGeom prst="rect">
-            <a:avLst/>
-          </a:prstGeom>
-          <a:noFill/>
-        </p:spPr>
-        <p:txBody>
-          <a:bodyPr wrap="none" rtlCol="0">
-            <a:spAutoFit/>
-          </a:bodyPr>
-          <a:lstStyle/>
-          <a:p>
-            <a:r>
-              <a:rPr lang="en-US" dirty="0" smtClean="0"/>
-              <a:t>Class GameDriver</a:t>
-            </a:r>
-            <a:endParaRPr lang="en-US" dirty="0"/>
-          </a:p>
-        </p:txBody>
-      </p:sp>
-      <p:sp>
-        <p:nvSpPr>
-          <p:cNvPr id="9" name="TextBox 8"/>
-          <p:cNvSpPr txBox="1"/>
-          <p:nvPr/>
-        </p:nvSpPr>
-        <p:spPr>
-          <a:xfrm>
-            <a:off x="3809871" y="766990"/>
-            <a:ext cx="1133130" cy="369332"/>
-          </a:xfrm>
-          <a:prstGeom prst="rect">
-            <a:avLst/>
-          </a:prstGeom>
-          <a:noFill/>
-        </p:spPr>
-        <p:txBody>
-          <a:bodyPr wrap="none" rtlCol="0">
-            <a:spAutoFit/>
-          </a:bodyPr>
-          <a:lstStyle/>
-          <a:p>
-            <a:r>
-              <a:rPr lang="en-US" dirty="0" smtClean="0"/>
-              <a:t>Class Ball</a:t>
-            </a:r>
-            <a:endParaRPr lang="en-US" dirty="0"/>
-          </a:p>
-        </p:txBody>
-      </p:sp>
-      <p:sp>
-        <p:nvSpPr>
-          <p:cNvPr id="10" name="TextBox 9"/>
-          <p:cNvSpPr txBox="1"/>
-          <p:nvPr/>
-        </p:nvSpPr>
-        <p:spPr>
-          <a:xfrm>
-            <a:off x="6744336" y="752337"/>
-            <a:ext cx="1437225" cy="369332"/>
-          </a:xfrm>
-          <a:prstGeom prst="rect">
-            <a:avLst/>
-          </a:prstGeom>
-          <a:noFill/>
-        </p:spPr>
-        <p:txBody>
-          <a:bodyPr wrap="none" rtlCol="0">
-            <a:spAutoFit/>
-          </a:bodyPr>
-          <a:lstStyle/>
-          <a:p>
-            <a:r>
-              <a:rPr lang="en-US" dirty="0" smtClean="0"/>
-              <a:t>Class Paddle</a:t>
-            </a:r>
-            <a:endParaRPr lang="en-US" dirty="0"/>
-          </a:p>
-        </p:txBody>
-      </p:sp>
-    </p:spTree>
-    <p:extLst>
-      <p:ext uri="{BB962C8B-B14F-4D97-AF65-F5344CB8AC3E}">
-        <p14:creationId xmlns:p14="http://schemas.microsoft.com/office/powerpoint/2010/main" val="3076197000"/>
-      </p:ext>
-    </p:extLst>
-  </p:cSld>
-  <p:clrMapOvr>
-    <a:masterClrMapping/>
-  </p:clrMapOvr>
-  <p:timing>
-    <p:tnLst>
-      <p:par>
-        <p:cTn xmlns:p14="http://schemas.microsoft.com/office/powerpoint/2010/main" id="1" dur="indefinite" restart="never" nodeType="tmRoot"/>
-      </p:par>
-    </p:tnLst>
-  </p:timing>
-</p:sld>
-</file>
-
-<file path=ppt/slides/slide16.xml><?xml version="1.0" encoding="utf-8"?>
+<file path=ppt/slides/slide14.xml><?xml version="1.0" encoding="utf-8"?>
 <p:sld xmlns:a="http://schemas.openxmlformats.org/drawingml/2006/main" xmlns:r="http://schemas.openxmlformats.org/officeDocument/2006/relationships" xmlns:p="http://schemas.openxmlformats.org/presentationml/2006/main">
   <p:cSld>
     <p:spTree>
@@ -6712,7 +6392,7 @@
 </p:sld>
 </file>
 
-<file path=ppt/slides/slide17.xml><?xml version="1.0" encoding="utf-8"?>
+<file path=ppt/slides/slide15.xml><?xml version="1.0" encoding="utf-8"?>
 <p:sld xmlns:a="http://schemas.openxmlformats.org/drawingml/2006/main" xmlns:r="http://schemas.openxmlformats.org/officeDocument/2006/relationships" xmlns:p="http://schemas.openxmlformats.org/presentationml/2006/main">
   <p:cSld>
     <p:spTree>
@@ -6926,157 +6606,7 @@
 </p:sld>
 </file>
 
-<file path=ppt/slides/slide18.xml><?xml version="1.0" encoding="utf-8"?>
-<p:sld xmlns:a="http://schemas.openxmlformats.org/drawingml/2006/main" xmlns:r="http://schemas.openxmlformats.org/officeDocument/2006/relationships" xmlns:p="http://schemas.openxmlformats.org/presentationml/2006/main">
-  <p:cSld>
-    <p:spTree>
-      <p:nvGrpSpPr>
-        <p:cNvPr id="1" name=""/>
-        <p:cNvGrpSpPr/>
-        <p:nvPr/>
-      </p:nvGrpSpPr>
-      <p:grpSpPr>
-        <a:xfrm>
-          <a:off x="0" y="0"/>
-          <a:ext cx="0" cy="0"/>
-          <a:chOff x="0" y="0"/>
-          <a:chExt cx="0" cy="0"/>
-        </a:xfrm>
-      </p:grpSpPr>
-      <p:sp>
-        <p:nvSpPr>
-          <p:cNvPr id="2" name="Title 1"/>
-          <p:cNvSpPr>
-            <a:spLocks noGrp="1"/>
-          </p:cNvSpPr>
-          <p:nvPr>
-            <p:ph type="title"/>
-          </p:nvPr>
-        </p:nvSpPr>
-        <p:spPr>
-          <a:xfrm>
-            <a:off x="193188" y="275115"/>
-            <a:ext cx="8815795" cy="1336956"/>
-          </a:xfrm>
-        </p:spPr>
-        <p:txBody>
-          <a:bodyPr/>
-          <a:lstStyle/>
-          <a:p>
-            <a:r>
-              <a:rPr lang="en-US" sz="2400" dirty="0" smtClean="0"/>
-              <a:t>MY SOLUTION TO CODING AND EVERYTHING IN LIFE: You don’t </a:t>
-            </a:r>
-            <a:r>
-              <a:rPr lang="en-US" sz="2400" dirty="0"/>
-              <a:t>n</a:t>
-            </a:r>
-            <a:r>
-              <a:rPr lang="en-US" sz="2400" dirty="0" smtClean="0"/>
-              <a:t>eed to </a:t>
-            </a:r>
-            <a:r>
-              <a:rPr lang="en-US" sz="2400" dirty="0"/>
-              <a:t>k</a:t>
-            </a:r>
-            <a:r>
-              <a:rPr lang="en-US" sz="2400" dirty="0" smtClean="0"/>
-              <a:t>now </a:t>
-            </a:r>
-            <a:r>
-              <a:rPr lang="en-US" sz="2400" dirty="0"/>
-              <a:t>e</a:t>
-            </a:r>
-            <a:r>
-              <a:rPr lang="en-US" sz="2400" dirty="0" smtClean="0"/>
-              <a:t>verything, you just need to know how to find out what you need to know...</a:t>
-            </a:r>
-            <a:endParaRPr lang="en-US" sz="2400" dirty="0"/>
-          </a:p>
-        </p:txBody>
-      </p:sp>
-      <p:sp>
-        <p:nvSpPr>
-          <p:cNvPr id="3" name="Content Placeholder 2"/>
-          <p:cNvSpPr>
-            <a:spLocks noGrp="1"/>
-          </p:cNvSpPr>
-          <p:nvPr>
-            <p:ph idx="1"/>
-          </p:nvPr>
-        </p:nvSpPr>
-        <p:spPr>
-          <a:xfrm>
-            <a:off x="549275" y="1612071"/>
-            <a:ext cx="8042276" cy="4343400"/>
-          </a:xfrm>
-        </p:spPr>
-        <p:txBody>
-          <a:bodyPr>
-            <a:normAutofit/>
-          </a:bodyPr>
-          <a:lstStyle/>
-          <a:p>
-            <a:pPr marL="0" indent="0">
-              <a:buNone/>
-            </a:pPr>
-            <a:r>
-              <a:rPr lang="en-US" sz="1600" dirty="0" smtClean="0"/>
-              <a:t>I struggled for many hours studying examples, trying to code this game and implement the items on my Features Wish List and knew I needed help. I needed to understand how to instantiate a class better – how to create new objects from the ”blueprint” to implement the functionality  I needed. I decided to ask a friend who is a java developer to help me understand the important concepts I needed to know to get the code to work. My Daddy always said, “If you don’t know it’s simply awful and if you do know it’s awfully simple.” He understood my desire to write the code myself with some needed guidance. We met via Zoom and reviewed the code together, discussing the importance of OOP concepts and program structure. When I got stuck he provided some direction. I am thrilled to say that through our collaboration I was able to complete the capstone and I learned so much along the way! None of us are an island - we are better together! </a:t>
-            </a:r>
-          </a:p>
-          <a:p>
-            <a:pPr marL="0" indent="0">
-              <a:buNone/>
-            </a:pPr>
-            <a:r>
-              <a:rPr lang="en-US" sz="1600" dirty="0" smtClean="0"/>
-              <a:t>Special Thanks to my friend, </a:t>
-            </a:r>
-            <a:r>
-              <a:rPr lang="en-US" sz="1600" dirty="0" err="1" smtClean="0"/>
-              <a:t>Jamil</a:t>
-            </a:r>
-            <a:r>
-              <a:rPr lang="en-US" sz="1600" dirty="0" smtClean="0"/>
-              <a:t>, for his patience with all of my questions, his great explanations, and for his guidance as I worked on the code.</a:t>
-            </a:r>
-          </a:p>
-          <a:p>
-            <a:pPr marL="0" indent="0">
-              <a:buNone/>
-            </a:pPr>
-            <a:endParaRPr lang="en-US" sz="1600" dirty="0"/>
-          </a:p>
-          <a:p>
-            <a:pPr marL="0" indent="0">
-              <a:buNone/>
-            </a:pPr>
-            <a:endParaRPr lang="en-US" sz="1600" dirty="0"/>
-          </a:p>
-        </p:txBody>
-      </p:sp>
-    </p:spTree>
-    <p:extLst>
-      <p:ext uri="{BB962C8B-B14F-4D97-AF65-F5344CB8AC3E}">
-        <p14:creationId xmlns:p14="http://schemas.microsoft.com/office/powerpoint/2010/main" val="3004435037"/>
-      </p:ext>
-    </p:extLst>
-  </p:cSld>
-  <p:clrMapOvr>
-    <a:masterClrMapping/>
-  </p:clrMapOvr>
-  <p:timing>
-    <p:tnLst>
-      <p:par>
-        <p:cTn xmlns:p14="http://schemas.microsoft.com/office/powerpoint/2010/main" id="1" dur="indefinite" restart="never" nodeType="tmRoot"/>
-      </p:par>
-    </p:tnLst>
-  </p:timing>
-</p:sld>
-</file>
-
-<file path=ppt/slides/slide19.xml><?xml version="1.0" encoding="utf-8"?>
+<file path=ppt/slides/slide16.xml><?xml version="1.0" encoding="utf-8"?>
 <p:sld xmlns:a="http://schemas.openxmlformats.org/drawingml/2006/main" xmlns:r="http://schemas.openxmlformats.org/officeDocument/2006/relationships" xmlns:p="http://schemas.openxmlformats.org/presentationml/2006/main">
   <p:cSld>
     <p:spTree>
@@ -7209,6 +6739,584 @@
 </p:sld>
 </file>
 
+<file path=ppt/slides/slide17.xml><?xml version="1.0" encoding="utf-8"?>
+<p:sld xmlns:a="http://schemas.openxmlformats.org/drawingml/2006/main" xmlns:r="http://schemas.openxmlformats.org/officeDocument/2006/relationships" xmlns:p="http://schemas.openxmlformats.org/presentationml/2006/main">
+  <p:cSld>
+    <p:spTree>
+      <p:nvGrpSpPr>
+        <p:cNvPr id="1" name=""/>
+        <p:cNvGrpSpPr/>
+        <p:nvPr/>
+      </p:nvGrpSpPr>
+      <p:grpSpPr>
+        <a:xfrm>
+          <a:off x="0" y="0"/>
+          <a:ext cx="0" cy="0"/>
+          <a:chOff x="0" y="0"/>
+          <a:chExt cx="0" cy="0"/>
+        </a:xfrm>
+      </p:grpSpPr>
+      <p:sp>
+        <p:nvSpPr>
+          <p:cNvPr id="2" name="Title 1"/>
+          <p:cNvSpPr>
+            <a:spLocks noGrp="1"/>
+          </p:cNvSpPr>
+          <p:nvPr>
+            <p:ph type="title"/>
+          </p:nvPr>
+        </p:nvSpPr>
+        <p:spPr>
+          <a:xfrm>
+            <a:off x="370856" y="149280"/>
+            <a:ext cx="8042276" cy="954647"/>
+          </a:xfrm>
+        </p:spPr>
+        <p:txBody>
+          <a:bodyPr/>
+          <a:lstStyle/>
+          <a:p>
+            <a:r>
+              <a:rPr lang="en-US" dirty="0" smtClean="0"/>
+              <a:t>4. Reflection / Refactor</a:t>
+            </a:r>
+            <a:br>
+              <a:rPr lang="en-US" dirty="0" smtClean="0"/>
+            </a:br>
+            <a:endParaRPr lang="en-US" dirty="0"/>
+          </a:p>
+        </p:txBody>
+      </p:sp>
+      <p:sp>
+        <p:nvSpPr>
+          <p:cNvPr id="3" name="Content Placeholder 2"/>
+          <p:cNvSpPr>
+            <a:spLocks noGrp="1"/>
+          </p:cNvSpPr>
+          <p:nvPr>
+            <p:ph idx="1"/>
+          </p:nvPr>
+        </p:nvSpPr>
+        <p:spPr>
+          <a:xfrm>
+            <a:off x="549274" y="689287"/>
+            <a:ext cx="8341013" cy="5206151"/>
+          </a:xfrm>
+        </p:spPr>
+        <p:txBody>
+          <a:bodyPr>
+            <a:normAutofit/>
+          </a:bodyPr>
+          <a:lstStyle/>
+          <a:p>
+            <a:pPr marL="0" indent="0">
+              <a:buNone/>
+            </a:pPr>
+            <a:r>
+              <a:rPr lang="en-US" sz="1700" dirty="0" smtClean="0"/>
+              <a:t>Capstone 2 has been a great learning opportunity. The intensity of the boot camp doesn’t permit students the luxury of repetition on learning concepts  and to say these past weeks have been challenging is an understatement. But there is a lot to be said regarding being challenged. It is through challenges that we learn to find our strength, to dig deeper than we have in the past, and to persevere even when it hurts. It is also an opportunity to reach out and support and encourage those around us. I love people and I love technology and I got to deepen some relationships and begin new ones while beginning to learn a very fun new language. It has been an incredible experience.</a:t>
+            </a:r>
+            <a:endParaRPr lang="en-US" sz="1700" b="1" dirty="0" smtClean="0"/>
+          </a:p>
+          <a:p>
+            <a:pPr marL="0" indent="0">
+              <a:buNone/>
+            </a:pPr>
+            <a:r>
+              <a:rPr lang="en-US" sz="2800" b="1" dirty="0" smtClean="0"/>
+              <a:t>Measurable outcomes</a:t>
+            </a:r>
+          </a:p>
+          <a:p>
+            <a:pPr marL="0" indent="0">
+              <a:buNone/>
+            </a:pPr>
+            <a:r>
+              <a:rPr lang="en-US" sz="2200" b="1" dirty="0" smtClean="0"/>
+              <a:t>Tangible:</a:t>
+            </a:r>
+          </a:p>
+          <a:p>
+            <a:pPr marL="0" indent="0">
+              <a:buNone/>
+            </a:pPr>
+            <a:r>
+              <a:rPr lang="en-US" sz="1700" dirty="0" smtClean="0"/>
+              <a:t>Was the criteria set forth in the assignment met? The 2D terminal game Pong meets the basic criteria for the assignment. </a:t>
+            </a:r>
+          </a:p>
+          <a:p>
+            <a:pPr marL="0" indent="0">
+              <a:buNone/>
+            </a:pPr>
+            <a:r>
+              <a:rPr lang="en-US" sz="1700" dirty="0" smtClean="0"/>
+              <a:t>The Kliskey family is very happy at having a pong computer game that all four of their children can play simultaneously </a:t>
+            </a:r>
+            <a:r>
+              <a:rPr lang="en-US" sz="1700" dirty="0" smtClean="0">
+                <a:sym typeface="Wingdings"/>
+              </a:rPr>
+              <a:t></a:t>
+            </a:r>
+            <a:endParaRPr lang="en-US" sz="1700" dirty="0"/>
+          </a:p>
+        </p:txBody>
+      </p:sp>
+    </p:spTree>
+    <p:extLst>
+      <p:ext uri="{BB962C8B-B14F-4D97-AF65-F5344CB8AC3E}">
+        <p14:creationId xmlns:p14="http://schemas.microsoft.com/office/powerpoint/2010/main" val="2327609854"/>
+      </p:ext>
+    </p:extLst>
+  </p:cSld>
+  <p:clrMapOvr>
+    <a:masterClrMapping/>
+  </p:clrMapOvr>
+  <p:timing>
+    <p:tnLst>
+      <p:par>
+        <p:cTn xmlns:p14="http://schemas.microsoft.com/office/powerpoint/2010/main" id="1" dur="indefinite" restart="never" nodeType="tmRoot"/>
+      </p:par>
+    </p:tnLst>
+  </p:timing>
+</p:sld>
+</file>
+
+<file path=ppt/slides/slide18.xml><?xml version="1.0" encoding="utf-8"?>
+<p:sld xmlns:a="http://schemas.openxmlformats.org/drawingml/2006/main" xmlns:r="http://schemas.openxmlformats.org/officeDocument/2006/relationships" xmlns:p="http://schemas.openxmlformats.org/presentationml/2006/main">
+  <p:cSld>
+    <p:spTree>
+      <p:nvGrpSpPr>
+        <p:cNvPr id="1" name=""/>
+        <p:cNvGrpSpPr/>
+        <p:nvPr/>
+      </p:nvGrpSpPr>
+      <p:grpSpPr>
+        <a:xfrm>
+          <a:off x="0" y="0"/>
+          <a:ext cx="0" cy="0"/>
+          <a:chOff x="0" y="0"/>
+          <a:chExt cx="0" cy="0"/>
+        </a:xfrm>
+      </p:grpSpPr>
+      <p:sp>
+        <p:nvSpPr>
+          <p:cNvPr id="2" name="Title 1"/>
+          <p:cNvSpPr>
+            <a:spLocks noGrp="1"/>
+          </p:cNvSpPr>
+          <p:nvPr>
+            <p:ph type="title"/>
+          </p:nvPr>
+        </p:nvSpPr>
+        <p:spPr>
+          <a:xfrm>
+            <a:off x="465313" y="441682"/>
+            <a:ext cx="8042276" cy="1336956"/>
+          </a:xfrm>
+        </p:spPr>
+        <p:txBody>
+          <a:bodyPr/>
+          <a:lstStyle/>
+          <a:p>
+            <a:r>
+              <a:rPr lang="en-US" dirty="0"/>
+              <a:t>4. Reflection / </a:t>
+            </a:r>
+            <a:r>
+              <a:rPr lang="en-US" dirty="0" smtClean="0"/>
+              <a:t>Refactor</a:t>
+            </a:r>
+            <a:br>
+              <a:rPr lang="en-US" dirty="0" smtClean="0"/>
+            </a:br>
+            <a:r>
+              <a:rPr lang="en-US" dirty="0" smtClean="0"/>
+              <a:t>Continued</a:t>
+            </a:r>
+            <a:endParaRPr lang="en-US" dirty="0"/>
+          </a:p>
+        </p:txBody>
+      </p:sp>
+      <p:sp>
+        <p:nvSpPr>
+          <p:cNvPr id="3" name="Content Placeholder 2"/>
+          <p:cNvSpPr>
+            <a:spLocks noGrp="1"/>
+          </p:cNvSpPr>
+          <p:nvPr>
+            <p:ph idx="1"/>
+          </p:nvPr>
+        </p:nvSpPr>
+        <p:spPr>
+          <a:xfrm>
+            <a:off x="549275" y="1680006"/>
+            <a:ext cx="8042276" cy="4343400"/>
+          </a:xfrm>
+        </p:spPr>
+        <p:txBody>
+          <a:bodyPr>
+            <a:normAutofit lnSpcReduction="10000"/>
+          </a:bodyPr>
+          <a:lstStyle/>
+          <a:p>
+            <a:pPr marL="0" indent="0">
+              <a:buNone/>
+            </a:pPr>
+            <a:r>
+              <a:rPr lang="en-US" sz="2800" b="1" dirty="0"/>
+              <a:t>Intangible:</a:t>
+            </a:r>
+            <a:r>
+              <a:rPr lang="en-US" sz="2800" dirty="0"/>
+              <a:t> </a:t>
+            </a:r>
+          </a:p>
+          <a:p>
+            <a:pPr marL="0" indent="0">
+              <a:buNone/>
+            </a:pPr>
+            <a:r>
+              <a:rPr lang="en-US" dirty="0"/>
+              <a:t>It was a tremendous learning opportunity that also has me very excited about future learning and growth</a:t>
+            </a:r>
+            <a:r>
+              <a:rPr lang="en-US" dirty="0" smtClean="0"/>
+              <a:t>. The relationships I have already formed in TEKcamp deepened and </a:t>
+            </a:r>
+            <a:r>
+              <a:rPr lang="en-US" dirty="0"/>
+              <a:t>I made some </a:t>
+            </a:r>
+            <a:r>
+              <a:rPr lang="en-US" dirty="0" smtClean="0"/>
+              <a:t>new wonderful </a:t>
+            </a:r>
+            <a:r>
+              <a:rPr lang="en-US" dirty="0"/>
+              <a:t>relationships </a:t>
+            </a:r>
+            <a:r>
+              <a:rPr lang="en-US" dirty="0" smtClean="0"/>
+              <a:t>as well.</a:t>
+            </a:r>
+            <a:endParaRPr lang="en-US" dirty="0"/>
+          </a:p>
+          <a:p>
+            <a:pPr marL="0" indent="0">
+              <a:buNone/>
+            </a:pPr>
+            <a:r>
+              <a:rPr lang="en-US" dirty="0" smtClean="0"/>
+              <a:t>I have to say it again because it is so true...“</a:t>
+            </a:r>
+            <a:r>
+              <a:rPr lang="en-US" dirty="0"/>
+              <a:t>If you don’t know it’s simply awful, if you do know, it’s awfully simple.” I will never forget this experience. It was challenging, exhausting, exhilarating, frustrating, exciting. I also found that I had reserves within me that I didn’t know existed when it came time to make a choice of persevering or giving up. The right answer always is: If I don’t know, I can find out.</a:t>
+            </a:r>
+          </a:p>
+          <a:p>
+            <a:pPr marL="0" indent="0">
+              <a:buNone/>
+            </a:pPr>
+            <a:r>
+              <a:rPr lang="en-US" dirty="0"/>
+              <a:t>What would I do different? Not so much different but I will definitely continue to learn, continue to grow, and continue to develop relationships so that we can help each other to succeed. I know that the code I wrote this week is not the code I will be able to write next week, the week after, or two years from now. Having a flexible mindset and learning from my mistakes is a lifelong characteristic I will try my best to cultivate. I will not settle for ordinary but in regards to my rather ordinary-looking </a:t>
+            </a:r>
+            <a:r>
+              <a:rPr lang="en-US" dirty="0" smtClean="0"/>
+              <a:t>2D game, </a:t>
+            </a:r>
+            <a:r>
+              <a:rPr lang="en-US" dirty="0"/>
+              <a:t>I have much to celebrate regarding the learning, the investment by other students and TEK Academy faculty </a:t>
+            </a:r>
+            <a:r>
+              <a:rPr lang="en-US" dirty="0" smtClean="0"/>
+              <a:t>and friends that </a:t>
+            </a:r>
+            <a:r>
+              <a:rPr lang="en-US" dirty="0"/>
+              <a:t>brought me to a place I could never have imagined a scant </a:t>
+            </a:r>
+            <a:r>
+              <a:rPr lang="en-US" dirty="0" smtClean="0"/>
+              <a:t>nine </a:t>
+            </a:r>
+            <a:r>
+              <a:rPr lang="en-US" dirty="0"/>
+              <a:t>weeks ago.</a:t>
+            </a:r>
+          </a:p>
+          <a:p>
+            <a:endParaRPr lang="en-US" dirty="0"/>
+          </a:p>
+        </p:txBody>
+      </p:sp>
+    </p:spTree>
+    <p:extLst>
+      <p:ext uri="{BB962C8B-B14F-4D97-AF65-F5344CB8AC3E}">
+        <p14:creationId xmlns:p14="http://schemas.microsoft.com/office/powerpoint/2010/main" val="3853384013"/>
+      </p:ext>
+    </p:extLst>
+  </p:cSld>
+  <p:clrMapOvr>
+    <a:masterClrMapping/>
+  </p:clrMapOvr>
+  <p:timing>
+    <p:tnLst>
+      <p:par>
+        <p:cTn xmlns:p14="http://schemas.microsoft.com/office/powerpoint/2010/main" id="1" dur="indefinite" restart="never" nodeType="tmRoot"/>
+      </p:par>
+    </p:tnLst>
+  </p:timing>
+</p:sld>
+</file>
+
+<file path=ppt/slides/slide19.xml><?xml version="1.0" encoding="utf-8"?>
+<p:sld xmlns:a="http://schemas.openxmlformats.org/drawingml/2006/main" xmlns:r="http://schemas.openxmlformats.org/officeDocument/2006/relationships" xmlns:p="http://schemas.openxmlformats.org/presentationml/2006/main">
+  <p:cSld>
+    <p:spTree>
+      <p:nvGrpSpPr>
+        <p:cNvPr id="1" name=""/>
+        <p:cNvGrpSpPr/>
+        <p:nvPr/>
+      </p:nvGrpSpPr>
+      <p:grpSpPr>
+        <a:xfrm>
+          <a:off x="0" y="0"/>
+          <a:ext cx="0" cy="0"/>
+          <a:chOff x="0" y="0"/>
+          <a:chExt cx="0" cy="0"/>
+        </a:xfrm>
+      </p:grpSpPr>
+      <p:sp>
+        <p:nvSpPr>
+          <p:cNvPr id="2" name="Title 1"/>
+          <p:cNvSpPr>
+            <a:spLocks noGrp="1"/>
+          </p:cNvSpPr>
+          <p:nvPr>
+            <p:ph type="title"/>
+          </p:nvPr>
+        </p:nvSpPr>
+        <p:spPr>
+          <a:xfrm>
+            <a:off x="822960" y="91440"/>
+            <a:ext cx="7520940" cy="548640"/>
+          </a:xfrm>
+        </p:spPr>
+        <p:txBody>
+          <a:bodyPr/>
+          <a:lstStyle/>
+          <a:p>
+            <a:r>
+              <a:rPr lang="en-US" dirty="0" smtClean="0"/>
+              <a:t>Program Structure</a:t>
+            </a:r>
+            <a:endParaRPr lang="en-US" dirty="0"/>
+          </a:p>
+        </p:txBody>
+      </p:sp>
+      <p:pic>
+        <p:nvPicPr>
+          <p:cNvPr id="4" name="Content Placeholder 3" descr="Screen Shot 2020-07-13 at 7.50.19 PM.png"/>
+          <p:cNvPicPr>
+            <a:picLocks noGrp="1" noChangeAspect="1"/>
+          </p:cNvPicPr>
+          <p:nvPr>
+            <p:ph idx="1"/>
+          </p:nvPr>
+        </p:nvPicPr>
+        <p:blipFill rotWithShape="1">
+          <a:blip r:embed="rId2">
+            <a:extLst>
+              <a:ext uri="{28A0092B-C50C-407E-A947-70E740481C1C}">
+                <a14:useLocalDpi xmlns:a14="http://schemas.microsoft.com/office/drawing/2010/main" val="0"/>
+              </a:ext>
+            </a:extLst>
+          </a:blip>
+          <a:srcRect l="-125101" r="-223048"/>
+          <a:stretch/>
+        </p:blipFill>
+        <p:spPr>
+          <a:xfrm>
+            <a:off x="-3221177" y="1148651"/>
+            <a:ext cx="11733867" cy="5585136"/>
+          </a:xfrm>
+        </p:spPr>
+      </p:pic>
+      <p:pic>
+        <p:nvPicPr>
+          <p:cNvPr id="5" name="Picture 4" descr="Screen Shot 2020-07-13 at 7.50.40 PM.png"/>
+          <p:cNvPicPr>
+            <a:picLocks noChangeAspect="1"/>
+          </p:cNvPicPr>
+          <p:nvPr/>
+        </p:nvPicPr>
+        <p:blipFill>
+          <a:blip r:embed="rId3">
+            <a:extLst>
+              <a:ext uri="{28A0092B-C50C-407E-A947-70E740481C1C}">
+                <a14:useLocalDpi xmlns:a14="http://schemas.microsoft.com/office/drawing/2010/main" val="0"/>
+              </a:ext>
+            </a:extLst>
+          </a:blip>
+          <a:stretch>
+            <a:fillRect/>
+          </a:stretch>
+        </p:blipFill>
+        <p:spPr>
+          <a:xfrm>
+            <a:off x="2839759" y="1148651"/>
+            <a:ext cx="2955710" cy="5324068"/>
+          </a:xfrm>
+          <a:prstGeom prst="rect">
+            <a:avLst/>
+          </a:prstGeom>
+        </p:spPr>
+      </p:pic>
+      <p:pic>
+        <p:nvPicPr>
+          <p:cNvPr id="7" name="Picture 6" descr="Screen Shot 2020-07-13 at 7.57.05 PM.png"/>
+          <p:cNvPicPr>
+            <a:picLocks noChangeAspect="1"/>
+          </p:cNvPicPr>
+          <p:nvPr/>
+        </p:nvPicPr>
+        <p:blipFill>
+          <a:blip r:embed="rId4">
+            <a:extLst>
+              <a:ext uri="{28A0092B-C50C-407E-A947-70E740481C1C}">
+                <a14:useLocalDpi xmlns:a14="http://schemas.microsoft.com/office/drawing/2010/main" val="0"/>
+              </a:ext>
+            </a:extLst>
+          </a:blip>
+          <a:stretch>
+            <a:fillRect/>
+          </a:stretch>
+        </p:blipFill>
+        <p:spPr>
+          <a:xfrm>
+            <a:off x="5929442" y="1148651"/>
+            <a:ext cx="3101825" cy="5245557"/>
+          </a:xfrm>
+          <a:prstGeom prst="rect">
+            <a:avLst/>
+          </a:prstGeom>
+        </p:spPr>
+      </p:pic>
+      <p:sp>
+        <p:nvSpPr>
+          <p:cNvPr id="8" name="TextBox 7"/>
+          <p:cNvSpPr txBox="1"/>
+          <p:nvPr/>
+        </p:nvSpPr>
+        <p:spPr>
+          <a:xfrm>
+            <a:off x="443869" y="766990"/>
+            <a:ext cx="1919854" cy="369332"/>
+          </a:xfrm>
+          <a:prstGeom prst="rect">
+            <a:avLst/>
+          </a:prstGeom>
+          <a:noFill/>
+        </p:spPr>
+        <p:txBody>
+          <a:bodyPr wrap="none" rtlCol="0">
+            <a:spAutoFit/>
+          </a:bodyPr>
+          <a:lstStyle/>
+          <a:p>
+            <a:r>
+              <a:rPr lang="en-US" dirty="0" smtClean="0"/>
+              <a:t>Class GameDriver</a:t>
+            </a:r>
+            <a:endParaRPr lang="en-US" dirty="0"/>
+          </a:p>
+        </p:txBody>
+      </p:sp>
+      <p:sp>
+        <p:nvSpPr>
+          <p:cNvPr id="9" name="TextBox 8"/>
+          <p:cNvSpPr txBox="1"/>
+          <p:nvPr/>
+        </p:nvSpPr>
+        <p:spPr>
+          <a:xfrm>
+            <a:off x="3809871" y="766990"/>
+            <a:ext cx="1133130" cy="369332"/>
+          </a:xfrm>
+          <a:prstGeom prst="rect">
+            <a:avLst/>
+          </a:prstGeom>
+          <a:noFill/>
+        </p:spPr>
+        <p:txBody>
+          <a:bodyPr wrap="none" rtlCol="0">
+            <a:spAutoFit/>
+          </a:bodyPr>
+          <a:lstStyle/>
+          <a:p>
+            <a:r>
+              <a:rPr lang="en-US" dirty="0" smtClean="0"/>
+              <a:t>Class Ball</a:t>
+            </a:r>
+            <a:endParaRPr lang="en-US" dirty="0"/>
+          </a:p>
+        </p:txBody>
+      </p:sp>
+      <p:sp>
+        <p:nvSpPr>
+          <p:cNvPr id="10" name="TextBox 9"/>
+          <p:cNvSpPr txBox="1"/>
+          <p:nvPr/>
+        </p:nvSpPr>
+        <p:spPr>
+          <a:xfrm>
+            <a:off x="6744336" y="752337"/>
+            <a:ext cx="1437225" cy="369332"/>
+          </a:xfrm>
+          <a:prstGeom prst="rect">
+            <a:avLst/>
+          </a:prstGeom>
+          <a:noFill/>
+        </p:spPr>
+        <p:txBody>
+          <a:bodyPr wrap="none" rtlCol="0">
+            <a:spAutoFit/>
+          </a:bodyPr>
+          <a:lstStyle/>
+          <a:p>
+            <a:r>
+              <a:rPr lang="en-US" dirty="0" smtClean="0"/>
+              <a:t>Class Paddle</a:t>
+            </a:r>
+            <a:endParaRPr lang="en-US" dirty="0"/>
+          </a:p>
+        </p:txBody>
+      </p:sp>
+    </p:spTree>
+    <p:extLst>
+      <p:ext uri="{BB962C8B-B14F-4D97-AF65-F5344CB8AC3E}">
+        <p14:creationId xmlns:p14="http://schemas.microsoft.com/office/powerpoint/2010/main" val="3076197000"/>
+      </p:ext>
+    </p:extLst>
+  </p:cSld>
+  <p:clrMapOvr>
+    <a:masterClrMapping/>
+  </p:clrMapOvr>
+  <p:timing>
+    <p:tnLst>
+      <p:par>
+        <p:cTn xmlns:p14="http://schemas.microsoft.com/office/powerpoint/2010/main" id="1" dur="indefinite" restart="never" nodeType="tmRoot"/>
+      </p:par>
+    </p:tnLst>
+  </p:timing>
+</p:sld>
+</file>
+
 <file path=ppt/slides/slide2.xml><?xml version="1.0" encoding="utf-8"?>
 <p:sld xmlns:a="http://schemas.openxmlformats.org/drawingml/2006/main" xmlns:r="http://schemas.openxmlformats.org/officeDocument/2006/relationships" xmlns:p="http://schemas.openxmlformats.org/presentationml/2006/main">
   <p:cSld>
@@ -7313,11 +7421,7 @@
             </a:pPr>
             <a:r>
               <a:rPr lang="en-US" sz="2000" i="1" dirty="0" smtClean="0"/>
-              <a:t>C</a:t>
-            </a:r>
-            <a:r>
-              <a:rPr lang="en-US" sz="2000" i="1" dirty="0" smtClean="0"/>
-              <a:t>reated </a:t>
+              <a:t>Created </a:t>
             </a:r>
             <a:r>
               <a:rPr lang="en-US" sz="2000" i="1" dirty="0"/>
@@ -7333,15 +7437,7 @@
             </a:r>
             <a:r>
               <a:rPr lang="en-US" sz="2000" i="1" dirty="0" smtClean="0"/>
-              <a:t>graphics. </a:t>
-            </a:r>
-            <a:r>
-              <a:rPr lang="en-US" sz="2000" i="1" dirty="0" smtClean="0"/>
-              <a:t>The game</a:t>
-            </a:r>
-            <a:r>
-              <a:rPr lang="en-US" sz="2000" i="1" dirty="0" smtClean="0"/>
-              <a:t> </a:t>
+              <a:t>graphics. The game </a:t>
             </a:r>
             <a:r>
               <a:rPr lang="en-US" sz="2000" i="1" dirty="0"/>
@@ -7419,105 +7515,57 @@
         </p:nvSpPr>
         <p:spPr>
           <a:xfrm>
-            <a:off x="370856" y="149280"/>
-            <a:ext cx="8042276" cy="954647"/>
+            <a:off x="822960" y="91440"/>
+            <a:ext cx="7520940" cy="548640"/>
           </a:xfrm>
         </p:spPr>
         <p:txBody>
           <a:bodyPr/>
           <a:lstStyle/>
           <a:p>
-            <a:r>
-              <a:rPr lang="en-US" dirty="0" smtClean="0"/>
-              <a:t>4. Reflection / Refactor</a:t>
-            </a:r>
-            <a:br>
-              <a:rPr lang="en-US" dirty="0" smtClean="0"/>
-            </a:br>
-            <a:endParaRPr lang="en-US" dirty="0"/>
-          </a:p>
-        </p:txBody>
-      </p:sp>
-      <p:sp>
-        <p:nvSpPr>
-          <p:cNvPr id="3" name="Content Placeholder 2"/>
-          <p:cNvSpPr>
-            <a:spLocks noGrp="1"/>
-          </p:cNvSpPr>
+            <a:pPr algn="ctr"/>
+            <a:r>
+              <a:rPr lang="en-US" sz="2400" dirty="0" smtClean="0"/>
+              <a:t>Game Instructions</a:t>
+            </a:r>
+            <a:endParaRPr lang="en-US" sz="2400" dirty="0"/>
+          </a:p>
+        </p:txBody>
+      </p:sp>
+      <p:pic>
+        <p:nvPicPr>
+          <p:cNvPr id="4" name="Content Placeholder 3" descr="Screen Shot 2020-07-13 at 10.36.22 AM.png"/>
+          <p:cNvPicPr>
+            <a:picLocks noGrp="1" noChangeAspect="1"/>
+          </p:cNvPicPr>
           <p:nvPr>
             <p:ph idx="1"/>
           </p:nvPr>
-        </p:nvSpPr>
+        </p:nvPicPr>
+        <p:blipFill>
+          <a:blip r:embed="rId2">
+            <a:extLst>
+              <a:ext uri="{28A0092B-C50C-407E-A947-70E740481C1C}">
+                <a14:useLocalDpi xmlns:a14="http://schemas.microsoft.com/office/drawing/2010/main" val="0"/>
+              </a:ext>
+            </a:extLst>
+          </a:blip>
+          <a:srcRect l="-86266" r="-86266"/>
+          <a:stretch>
+            <a:fillRect/>
+          </a:stretch>
+        </p:blipFill>
         <p:spPr>
           <a:xfrm>
-            <a:off x="549274" y="689287"/>
-            <a:ext cx="8341013" cy="5206151"/>
+            <a:off x="-1851546" y="640080"/>
+            <a:ext cx="12987203" cy="6181704"/>
           </a:xfrm>
         </p:spPr>
-        <p:txBody>
-          <a:bodyPr>
-            <a:normAutofit/>
-          </a:bodyPr>
-          <a:lstStyle/>
-          <a:p>
-            <a:pPr marL="0" indent="0">
-              <a:buNone/>
-            </a:pPr>
-            <a:r>
-              <a:rPr lang="en-US" sz="1700" dirty="0" smtClean="0"/>
-              <a:t>Capstone 2 has been a great learning opportunity. The intensity of the boot camp doesn’t permit students the luxury of repetition on learning concepts  and to say these past weeks have been challenging is an understatement. But there is a lot to be said regarding being challenged. It is through challenges that we learn to find our strength, to dig deeper than we have in the past, and to persevere even when it hurts. It is also an opportunity to reach out and support and encourage those around us. I love people and I love technology and I got to deepen some relationships and begin new ones while beginning to learn a very fun new language. It has been an incredible experience.</a:t>
-            </a:r>
-            <a:endParaRPr lang="en-US" sz="1700" b="1" dirty="0" smtClean="0"/>
-          </a:p>
-          <a:p>
-            <a:pPr marL="0" indent="0">
-              <a:buNone/>
-            </a:pPr>
-            <a:r>
-              <a:rPr lang="en-US" sz="2800" b="1" dirty="0" smtClean="0"/>
-              <a:t>Measurable outcomes</a:t>
-            </a:r>
-          </a:p>
-          <a:p>
-            <a:pPr marL="0" indent="0">
-              <a:buNone/>
-            </a:pPr>
-            <a:r>
-              <a:rPr lang="en-US" sz="2200" b="1" dirty="0" smtClean="0"/>
-              <a:t>Tangible:</a:t>
-            </a:r>
-          </a:p>
-          <a:p>
-            <a:pPr marL="0" indent="0">
-              <a:buNone/>
-            </a:pPr>
-            <a:r>
-              <a:rPr lang="en-US" sz="1700" dirty="0" smtClean="0"/>
-              <a:t>Was the criteria set forth in the assignment met? The 2D terminal game Pong meets the basic criteria for the assignment. </a:t>
-            </a:r>
-          </a:p>
-          <a:p>
-            <a:pPr marL="0" indent="0">
-              <a:buNone/>
-            </a:pPr>
-            <a:r>
-              <a:rPr lang="en-US" sz="1700" dirty="0" smtClean="0"/>
-              <a:t>The Kliskey family is very happy at having a pong computer game that all four of their children can play simultaneously </a:t>
-            </a:r>
-            <a:r>
-              <a:rPr lang="en-US" sz="1700" dirty="0" smtClean="0">
-                <a:sym typeface="Wingdings"/>
-              </a:rPr>
-              <a:t></a:t>
-            </a:r>
-            <a:endParaRPr lang="en-US" sz="1700" dirty="0"/>
-          </a:p>
-        </p:txBody>
-      </p:sp>
+      </p:pic>
     </p:spTree>
     <p:extLst>
       <p:ext uri="{BB962C8B-B14F-4D97-AF65-F5344CB8AC3E}">
-        <p14:creationId xmlns:p14="http://schemas.microsoft.com/office/powerpoint/2010/main" val="2327609854"/>
+        <p14:creationId xmlns:p14="http://schemas.microsoft.com/office/powerpoint/2010/main" val="1782544920"/>
       </p:ext>
     </p:extLst>
   </p:cSld>
@@ -7561,146 +7609,117 @@
             <p:ph type="title"/>
           </p:nvPr>
         </p:nvSpPr>
+        <p:spPr/>
+        <p:txBody>
+          <a:bodyPr/>
+          <a:lstStyle/>
+          <a:p>
+            <a:r>
+              <a:rPr lang="en-US" dirty="0" smtClean="0"/>
+              <a:t>Object Oriented programming</a:t>
+            </a:r>
+            <a:endParaRPr lang="en-US" dirty="0"/>
+          </a:p>
+        </p:txBody>
+      </p:sp>
+      <p:sp>
+        <p:nvSpPr>
+          <p:cNvPr id="3" name="Content Placeholder 2"/>
+          <p:cNvSpPr>
+            <a:spLocks noGrp="1"/>
+          </p:cNvSpPr>
+          <p:nvPr>
+            <p:ph idx="1"/>
+          </p:nvPr>
+        </p:nvSpPr>
+        <p:spPr/>
+        <p:txBody>
+          <a:bodyPr/>
+          <a:lstStyle/>
+          <a:p>
+            <a:r>
+              <a:rPr lang="en-US" dirty="0" smtClean="0"/>
+              <a:t>A programming paradigm that leverages classes and objects and utilizes four programming principles (pillars): encapsulation, inheritance, abstraction and polymorphism.</a:t>
+            </a:r>
+          </a:p>
+          <a:p>
+            <a:endParaRPr lang="en-US" dirty="0"/>
+          </a:p>
+          <a:p>
+            <a:endParaRPr lang="en-US" dirty="0"/>
+          </a:p>
+        </p:txBody>
+      </p:sp>
+      <p:pic>
+        <p:nvPicPr>
+          <p:cNvPr id="4" name="Picture 3" descr="java-oops.png"/>
+          <p:cNvPicPr>
+            <a:picLocks noChangeAspect="1"/>
+          </p:cNvPicPr>
+          <p:nvPr/>
+        </p:nvPicPr>
+        <p:blipFill>
+          <a:blip r:embed="rId2">
+            <a:extLst>
+              <a:ext uri="{28A0092B-C50C-407E-A947-70E740481C1C}">
+                <a14:useLocalDpi xmlns:a14="http://schemas.microsoft.com/office/drawing/2010/main" val="0"/>
+              </a:ext>
+            </a:extLst>
+          </a:blip>
+          <a:stretch>
+            <a:fillRect/>
+          </a:stretch>
+        </p:blipFill>
         <p:spPr>
           <a:xfrm>
-            <a:off x="465313" y="441682"/>
-            <a:ext cx="8042276" cy="1336956"/>
+            <a:off x="1951879" y="2066761"/>
+            <a:ext cx="5401790" cy="4159378"/>
           </a:xfrm>
+          <a:prstGeom prst="rect">
+            <a:avLst/>
+          </a:prstGeom>
         </p:spPr>
-        <p:txBody>
-          <a:bodyPr/>
-          <a:lstStyle/>
-          <a:p>
-            <a:r>
-              <a:rPr lang="en-US" dirty="0"/>
-              <a:t>4. Reflection / </a:t>
-            </a:r>
-            <a:r>
-              <a:rPr lang="en-US" dirty="0" smtClean="0"/>
-              <a:t>Refactor</a:t>
-            </a:r>
-            <a:br>
-              <a:rPr lang="en-US" dirty="0" smtClean="0"/>
-            </a:br>
-            <a:r>
-              <a:rPr lang="en-US" dirty="0" smtClean="0"/>
-              <a:t>Continued</a:t>
-            </a:r>
-            <a:endParaRPr lang="en-US" dirty="0"/>
-          </a:p>
-        </p:txBody>
-      </p:sp>
-      <p:sp>
-        <p:nvSpPr>
-          <p:cNvPr id="3" name="Content Placeholder 2"/>
-          <p:cNvSpPr>
-            <a:spLocks noGrp="1"/>
-          </p:cNvSpPr>
-          <p:nvPr>
-            <p:ph idx="1"/>
-          </p:nvPr>
+      </p:pic>
+      <p:sp>
+        <p:nvSpPr>
+          <p:cNvPr id="5" name="TextBox 4"/>
+          <p:cNvSpPr txBox="1"/>
+          <p:nvPr/>
         </p:nvSpPr>
         <p:spPr>
           <a:xfrm>
-            <a:off x="549275" y="1680006"/>
-            <a:ext cx="8042276" cy="4343400"/>
+            <a:off x="6379146" y="5604466"/>
+            <a:ext cx="1949046" cy="646331"/>
           </a:xfrm>
+          <a:prstGeom prst="rect">
+            <a:avLst/>
+          </a:prstGeom>
+          <a:noFill/>
         </p:spPr>
         <p:txBody>
-          <a:bodyPr>
-            <a:normAutofit lnSpcReduction="10000"/>
+          <a:bodyPr wrap="none" rtlCol="0">
+            <a:spAutoFit/>
           </a:bodyPr>
           <a:lstStyle/>
           <a:p>
-            <a:pPr marL="0" indent="0">
-              <a:buNone/>
-            </a:pPr>
-            <a:r>
-              <a:rPr lang="en-US" sz="2800" b="1" dirty="0"/>
-              <a:t>Intangible:</a:t>
-            </a:r>
-            <a:r>
-              <a:rPr lang="en-US" sz="2800" dirty="0"/>
+            <a:r>
+              <a:rPr lang="en-US" dirty="0"/>
+              <a:t>p</a:t>
+            </a:r>
+            <a:r>
+              <a:rPr lang="en-US" dirty="0" smtClean="0"/>
+              <a:t>icture credit:</a:t>
+            </a:r>
+          </a:p>
+          <a:p>
+            <a:r>
+              <a:rPr lang="en-US" dirty="0" smtClean="0"/>
               <a:t> </a:t>
             </a:r>
-          </a:p>
-          <a:p>
-            <a:pPr marL="0" indent="0">
-              <a:buNone/>
-            </a:pPr>
-            <a:r>
-              <a:rPr lang="en-US" dirty="0"/>
-              <a:t>It was a tremendous learning opportunity that also has me very excited about future learning and growth</a:t>
-            </a:r>
-            <a:r>
-              <a:rPr lang="en-US" dirty="0" smtClean="0"/>
-              <a:t>. The relationships I have already formed in TEKcamp deepened and </a:t>
-            </a:r>
-            <a:r>
-              <a:rPr lang="en-US" dirty="0"/>
-              <a:t>I made some </a:t>
-            </a:r>
-            <a:r>
-              <a:rPr lang="en-US" dirty="0" smtClean="0"/>
-              <a:t>new wonderful </a:t>
-            </a:r>
-            <a:r>
-              <a:rPr lang="en-US" dirty="0"/>
-              <a:t>relationships </a:t>
-            </a:r>
-            <a:r>
-              <a:rPr lang="en-US" dirty="0" smtClean="0"/>
-              <a:t>as well.</a:t>
-            </a:r>
-            <a:endParaRPr lang="en-US" dirty="0"/>
-          </a:p>
-          <a:p>
-            <a:pPr marL="0" indent="0">
-              <a:buNone/>
-            </a:pPr>
-            <a:r>
-              <a:rPr lang="en-US" dirty="0" smtClean="0"/>
-              <a:t>I have to say it again because it is so true...“</a:t>
-            </a:r>
-            <a:r>
-              <a:rPr lang="en-US" dirty="0"/>
-              <a:t>If you don’t know it’s simply awful, if you do know, it’s awfully simple.” I will never forget this experience. It was challenging, exhausting, exhilarating, frustrating, exciting. I also found that I had reserves within me that I didn’t know existed when it came time to make a choice of persevering or giving up. The right answer always is: If I don’t know, I can find out.</a:t>
-            </a:r>
-          </a:p>
-          <a:p>
-            <a:pPr marL="0" indent="0">
-              <a:buNone/>
-            </a:pPr>
-            <a:r>
-              <a:rPr lang="en-US" dirty="0"/>
-              <a:t>What would I do different? Not so much different but I will definitely continue to learn, continue to grow, and continue to develop relationships so that we can help each other to succeed. I know that the code I wrote this week is not the code I will be able to write next week, the week after, or two years from now. Having a flexible mindset and learning from my mistakes is a lifelong characteristic I will try my best to cultivate. I will not settle for ordinary but in regards to my rather ordinary-looking </a:t>
-            </a:r>
-            <a:r>
-              <a:rPr lang="en-US" dirty="0" smtClean="0"/>
-              <a:t>2D game, </a:t>
-            </a:r>
-            <a:r>
-              <a:rPr lang="en-US" dirty="0"/>
-              <a:t>I have much to celebrate regarding the learning, the investment by other students and TEK Academy faculty </a:t>
-            </a:r>
-            <a:r>
-              <a:rPr lang="en-US" dirty="0" smtClean="0"/>
-              <a:t>and friends that </a:t>
-            </a:r>
-            <a:r>
-              <a:rPr lang="en-US" dirty="0"/>
-              <a:t>brought me to a place I could never have imagined a scant </a:t>
-            </a:r>
-            <a:r>
-              <a:rPr lang="en-US" dirty="0" smtClean="0"/>
-              <a:t>nine </a:t>
-            </a:r>
-            <a:r>
-              <a:rPr lang="en-US" dirty="0"/>
-              <a:t>weeks ago.</a:t>
-            </a:r>
-          </a:p>
-          <a:p>
+            <a:r>
+              <a:rPr lang="en-US" dirty="0" err="1" smtClean="0"/>
+              <a:t>francescolelli.info</a:t>
+            </a:r>
             <a:endParaRPr lang="en-US" dirty="0"/>
           </a:p>
         </p:txBody>
@@ -7708,7 +7727,7 @@
     </p:spTree>
     <p:extLst>
       <p:ext uri="{BB962C8B-B14F-4D97-AF65-F5344CB8AC3E}">
-        <p14:creationId xmlns:p14="http://schemas.microsoft.com/office/powerpoint/2010/main" val="3853384013"/>
+        <p14:creationId xmlns:p14="http://schemas.microsoft.com/office/powerpoint/2010/main" val="3051053249"/>
       </p:ext>
     </p:extLst>
   </p:cSld>
@@ -7752,125 +7771,204 @@
             <p:ph type="title"/>
           </p:nvPr>
         </p:nvSpPr>
-        <p:spPr/>
-        <p:txBody>
-          <a:bodyPr/>
-          <a:lstStyle/>
-          <a:p>
-            <a:r>
-              <a:rPr lang="en-US" dirty="0" smtClean="0"/>
-              <a:t>Object Oriented programming</a:t>
-            </a:r>
-            <a:endParaRPr lang="en-US" dirty="0"/>
-          </a:p>
-        </p:txBody>
-      </p:sp>
-      <p:sp>
-        <p:nvSpPr>
-          <p:cNvPr id="3" name="Content Placeholder 2"/>
-          <p:cNvSpPr>
-            <a:spLocks noGrp="1"/>
-          </p:cNvSpPr>
-          <p:nvPr>
-            <p:ph idx="1"/>
-          </p:nvPr>
-        </p:nvSpPr>
-        <p:spPr/>
-        <p:txBody>
-          <a:bodyPr/>
-          <a:lstStyle/>
-          <a:p>
-            <a:r>
-              <a:rPr lang="en-US" dirty="0" smtClean="0"/>
-              <a:t>A programming paradigm that leverages classes and objects and utilizes four programming principles (pillars): encapsulation, inheritance, abstraction and polymorphism.</a:t>
-            </a:r>
-          </a:p>
-          <a:p>
-            <a:endParaRPr lang="en-US" dirty="0"/>
-          </a:p>
-          <a:p>
-            <a:endParaRPr lang="en-US" dirty="0"/>
-          </a:p>
-        </p:txBody>
-      </p:sp>
-      <p:pic>
-        <p:nvPicPr>
-          <p:cNvPr id="4" name="Picture 3" descr="java-oops.png"/>
-          <p:cNvPicPr>
-            <a:picLocks noChangeAspect="1"/>
-          </p:cNvPicPr>
-          <p:nvPr/>
-        </p:nvPicPr>
-        <p:blipFill>
-          <a:blip r:embed="rId2">
-            <a:extLst>
-              <a:ext uri="{28A0092B-C50C-407E-A947-70E740481C1C}">
-                <a14:useLocalDpi xmlns:a14="http://schemas.microsoft.com/office/drawing/2010/main" val="0"/>
-              </a:ext>
-            </a:extLst>
-          </a:blip>
-          <a:stretch>
-            <a:fillRect/>
-          </a:stretch>
-        </p:blipFill>
         <p:spPr>
           <a:xfrm>
-            <a:off x="1951879" y="2066761"/>
-            <a:ext cx="5401790" cy="4159378"/>
+            <a:off x="822960" y="91440"/>
+            <a:ext cx="7520940" cy="548640"/>
           </a:xfrm>
-          <a:prstGeom prst="rect">
-            <a:avLst/>
-          </a:prstGeom>
         </p:spPr>
-      </p:pic>
-      <p:sp>
-        <p:nvSpPr>
-          <p:cNvPr id="5" name="TextBox 4"/>
-          <p:cNvSpPr txBox="1"/>
-          <p:nvPr/>
+        <p:txBody>
+          <a:bodyPr/>
+          <a:lstStyle/>
+          <a:p>
+            <a:r>
+              <a:rPr lang="en-US" dirty="0" smtClean="0"/>
+              <a:t>EnCapsulation</a:t>
+            </a:r>
+            <a:endParaRPr lang="en-US" dirty="0"/>
+          </a:p>
+        </p:txBody>
+      </p:sp>
+      <p:sp>
+        <p:nvSpPr>
+          <p:cNvPr id="3" name="Content Placeholder 2"/>
+          <p:cNvSpPr>
+            <a:spLocks noGrp="1"/>
+          </p:cNvSpPr>
+          <p:nvPr>
+            <p:ph idx="1"/>
+          </p:nvPr>
         </p:nvSpPr>
         <p:spPr>
           <a:xfrm>
-            <a:off x="6379146" y="5604466"/>
-            <a:ext cx="1949046" cy="646331"/>
+            <a:off x="822960" y="700698"/>
+            <a:ext cx="7520940" cy="3579849"/>
           </a:xfrm>
-          <a:prstGeom prst="rect">
-            <a:avLst/>
-          </a:prstGeom>
-          <a:noFill/>
         </p:spPr>
         <p:txBody>
-          <a:bodyPr wrap="none" rtlCol="0">
-            <a:spAutoFit/>
+          <a:bodyPr>
+            <a:noAutofit/>
           </a:bodyPr>
           <a:lstStyle/>
           <a:p>
             <a:r>
-              <a:rPr lang="en-US" dirty="0"/>
-              <a:t>p</a:t>
-            </a:r>
-            <a:r>
-              <a:rPr lang="en-US" dirty="0" smtClean="0"/>
-              <a:t>icture credit:</a:t>
-            </a:r>
-          </a:p>
-          <a:p>
-            <a:r>
-              <a:rPr lang="en-US" dirty="0" smtClean="0"/>
+              <a:rPr lang="en-US" sz="1400" dirty="0"/>
+              <a:t>Encapsulation is the idea that we want to keep data private. We use the principle of encapsulation so that users will be unable to access and modify the code. By using encapsulation, we can provide security to the application and prevent misuse. </a:t>
+            </a:r>
+          </a:p>
+          <a:p>
+            <a:r>
+              <a:rPr lang="en-US" sz="1400" dirty="0"/>
+              <a:t>The access modifier private declares a field or member variable as private and will only be able to be accessed within the class, unless public getter methods (a getter is a method that reads the value of a variable) are present in the class.</a:t>
+            </a:r>
+          </a:p>
+          <a:p>
+            <a:r>
+              <a:rPr lang="en-US" sz="1400" dirty="0"/>
+              <a:t>Example from program: This makes it so that no one can </a:t>
+            </a:r>
+            <a:r>
+              <a:rPr lang="en-US" sz="1400" dirty="0" smtClean="0"/>
+              <a:t>modify </a:t>
+            </a:r>
+            <a:r>
+              <a:rPr lang="en-US" sz="1400" dirty="0"/>
+              <a:t>the size of the GUI window</a:t>
+            </a:r>
+            <a:r>
+              <a:rPr lang="en-US" sz="1400" dirty="0" smtClean="0"/>
+              <a:t>.</a:t>
+            </a:r>
+            <a:endParaRPr lang="en-US" sz="1400" dirty="0"/>
+          </a:p>
+          <a:p>
+            <a:r>
+              <a:rPr lang="en-US" sz="1400" dirty="0"/>
+              <a:t>From the GameDriver class:</a:t>
+            </a:r>
+          </a:p>
+          <a:p>
+            <a:r>
+              <a:rPr lang="en-US" sz="1400" dirty="0"/>
+              <a:t>//window size variables:</a:t>
+            </a:r>
+          </a:p>
+          <a:p>
+            <a:r>
+              <a:rPr lang="en-US" sz="1400" dirty="0" err="1"/>
+              <a:t>privare</a:t>
+            </a:r>
+            <a:r>
+              <a:rPr lang="en-US" sz="1400" dirty="0"/>
+              <a:t> final </a:t>
+            </a:r>
+            <a:r>
+              <a:rPr lang="en-US" sz="1400" dirty="0" err="1"/>
+              <a:t>int</a:t>
+            </a:r>
+            <a:r>
+              <a:rPr lang="en-US" sz="1400" dirty="0"/>
               <a:t> </a:t>
             </a:r>
             <a:r>
-              <a:rPr lang="en-US" dirty="0" err="1" smtClean="0"/>
-              <a:t>francescolelli.info</a:t>
-            </a:r>
-            <a:endParaRPr lang="en-US" dirty="0"/>
+              <a:rPr lang="en-US" sz="1400" dirty="0" err="1"/>
+              <a:t>gameWindowWidth</a:t>
+            </a:r>
+            <a:r>
+              <a:rPr lang="en-US" sz="1400" dirty="0"/>
+              <a:t> = 1000; //private encapsulates this variable so it is only available in the GameDriver class</a:t>
+            </a:r>
+          </a:p>
+          <a:p>
+            <a:r>
+              <a:rPr lang="en-US" sz="1400" dirty="0"/>
+              <a:t>private final </a:t>
+            </a:r>
+            <a:r>
+              <a:rPr lang="en-US" sz="1400" dirty="0" err="1"/>
+              <a:t>int</a:t>
+            </a:r>
+            <a:r>
+              <a:rPr lang="en-US" sz="1400" dirty="0"/>
+              <a:t> </a:t>
+            </a:r>
+            <a:r>
+              <a:rPr lang="en-US" sz="1400" dirty="0" err="1"/>
+              <a:t>gameWindowHeight</a:t>
+            </a:r>
+            <a:r>
+              <a:rPr lang="en-US" sz="1400" dirty="0"/>
+              <a:t> = 800; //final prevents the field from being changed</a:t>
+            </a:r>
+          </a:p>
+          <a:p>
+            <a:r>
+              <a:rPr lang="en-US" sz="1400" dirty="0"/>
+              <a:t>private final Dimension </a:t>
+            </a:r>
+            <a:r>
+              <a:rPr lang="en-US" sz="1400" dirty="0" err="1"/>
+              <a:t>screenSize</a:t>
+            </a:r>
+            <a:r>
+              <a:rPr lang="en-US" sz="1400" dirty="0"/>
+              <a:t> = new Dimension (</a:t>
+            </a:r>
+            <a:r>
+              <a:rPr lang="en-US" sz="1400" dirty="0" err="1"/>
+              <a:t>gameWindowWidth</a:t>
+            </a:r>
+            <a:r>
+              <a:rPr lang="en-US" sz="1400" dirty="0"/>
+              <a:t>, </a:t>
+            </a:r>
+            <a:r>
+              <a:rPr lang="en-US" sz="1400" dirty="0" err="1"/>
+              <a:t>gameWindowHeight</a:t>
+            </a:r>
+            <a:r>
+              <a:rPr lang="en-US" sz="1400" dirty="0"/>
+              <a:t>); //creates a new instance of Dimension called </a:t>
+            </a:r>
+            <a:r>
+              <a:rPr lang="en-US" sz="1400" dirty="0" err="1"/>
+              <a:t>screenSize</a:t>
+            </a:r>
+            <a:r>
+              <a:rPr lang="en-US" sz="1400" dirty="0"/>
+              <a:t> with </a:t>
+            </a:r>
+            <a:r>
+              <a:rPr lang="en-US" sz="1400" dirty="0" err="1"/>
+              <a:t>gameWindowWidth</a:t>
+            </a:r>
+            <a:r>
+              <a:rPr lang="en-US" sz="1400" dirty="0"/>
+              <a:t> and </a:t>
+            </a:r>
+            <a:r>
+              <a:rPr lang="en-US" sz="1400" dirty="0" err="1"/>
+              <a:t>gameWindowHeight</a:t>
+            </a:r>
+            <a:r>
+              <a:rPr lang="en-US" sz="1400" dirty="0"/>
+              <a:t> as its parameters. Dimension is a class from </a:t>
+            </a:r>
+            <a:r>
+              <a:rPr lang="en-US" sz="1400" dirty="0" err="1"/>
+              <a:t>java.awt</a:t>
+            </a:r>
+            <a:endParaRPr lang="en-US" sz="1400" dirty="0"/>
+          </a:p>
+          <a:p>
+            <a:endParaRPr lang="en-US" sz="1400" dirty="0"/>
           </a:p>
         </p:txBody>
       </p:sp>
     </p:spTree>
     <p:extLst>
       <p:ext uri="{BB962C8B-B14F-4D97-AF65-F5344CB8AC3E}">
-        <p14:creationId xmlns:p14="http://schemas.microsoft.com/office/powerpoint/2010/main" val="3051053249"/>
+        <p14:creationId xmlns:p14="http://schemas.microsoft.com/office/powerpoint/2010/main" val="761110671"/>
       </p:ext>
     </p:extLst>
   </p:cSld>
@@ -7914,37 +8012,32 @@
             <p:ph type="title"/>
           </p:nvPr>
         </p:nvSpPr>
+        <p:spPr/>
+        <p:txBody>
+          <a:bodyPr/>
+          <a:lstStyle/>
+          <a:p>
+            <a:r>
+              <a:rPr lang="en-US" dirty="0" smtClean="0"/>
+              <a:t>inheritance</a:t>
+            </a:r>
+            <a:endParaRPr lang="en-US" dirty="0"/>
+          </a:p>
+        </p:txBody>
+      </p:sp>
+      <p:sp>
+        <p:nvSpPr>
+          <p:cNvPr id="3" name="Content Placeholder 2"/>
+          <p:cNvSpPr>
+            <a:spLocks noGrp="1"/>
+          </p:cNvSpPr>
+          <p:nvPr>
+            <p:ph idx="1"/>
+          </p:nvPr>
+        </p:nvSpPr>
         <p:spPr>
           <a:xfrm>
-            <a:off x="822960" y="91440"/>
-            <a:ext cx="7520940" cy="548640"/>
-          </a:xfrm>
-        </p:spPr>
-        <p:txBody>
-          <a:bodyPr/>
-          <a:lstStyle/>
-          <a:p>
-            <a:r>
-              <a:rPr lang="en-US" dirty="0" smtClean="0"/>
-              <a:t>EnCapsulation</a:t>
-            </a:r>
-            <a:endParaRPr lang="en-US" dirty="0"/>
-          </a:p>
-        </p:txBody>
-      </p:sp>
-      <p:sp>
-        <p:nvSpPr>
-          <p:cNvPr id="3" name="Content Placeholder 2"/>
-          <p:cNvSpPr>
-            <a:spLocks noGrp="1"/>
-          </p:cNvSpPr>
-          <p:nvPr>
-            <p:ph idx="1"/>
-          </p:nvPr>
-        </p:nvSpPr>
-        <p:spPr>
-          <a:xfrm>
-            <a:off x="822960" y="700698"/>
+            <a:off x="822960" y="917748"/>
             <a:ext cx="7520940" cy="3579849"/>
           </a:xfrm>
         </p:spPr>
@@ -7956,27 +8049,27 @@
           <a:p>
             <a:r>
               <a:rPr lang="en-US" sz="1400" dirty="0"/>
-              <a:t>Encapsulation is the idea that we want to keep data private. We use the principle of encapsulation so that users will be unable to access and modify the code. By using encapsulation, we can provide security to the application and prevent misuse. </a:t>
+              <a:t>Inheritance is the concept that we can take the functionality that is available in an already existing class and extend it to a new class. This allows us to reuse code, thereby reducing the amount of code needing to be written to achieve a desired outcome.</a:t>
             </a:r>
           </a:p>
           <a:p>
             <a:r>
               <a:rPr lang="en-US" sz="1400" dirty="0"/>
-              <a:t>The access modifier private declares a field or member variable as private and will only be able to be accessed within the class, unless public getter methods (a getter is a method that reads the value of a variable) are present in the class.</a:t>
+              <a:t>This is a very powerful concept in OOP because it allows us to access the properties of an existing class and implement them quickly and easily. </a:t>
             </a:r>
           </a:p>
           <a:p>
             <a:r>
               <a:rPr lang="en-US" sz="1400" dirty="0"/>
-              <a:t>Example from program: This makes it so that no one can </a:t>
-            </a:r>
-            <a:r>
-              <a:rPr lang="en-US" sz="1400" dirty="0" smtClean="0"/>
-              <a:t>modify </a:t>
+              <a:t>Example from program: This uses </a:t>
+            </a:r>
+            <a:r>
+              <a:rPr lang="en-US" sz="1400" dirty="0" err="1"/>
+              <a:t>Jframe</a:t>
             </a:r>
             <a:r>
               <a:rPr lang="en-US" sz="1400" dirty="0"/>
-              <a:t>the size of the GUI window</a:t>
+              <a:t> functionality to build the window of the GUI</a:t>
             </a:r>
             <a:r>
               <a:rPr lang="en-US" sz="1400" dirty="0" smtClean="0"/>
@@ -7987,67 +8080,66 @@
           <a:p>
             <a:r>
               <a:rPr lang="en-US" sz="1400" dirty="0"/>
-              <a:t>From the GameDriver class:</a:t>
-            </a:r>
-          </a:p>
-          <a:p>
+              <a:t>Public class </a:t>
+            </a:r>
+            <a:r>
+              <a:rPr lang="en-US" sz="1400" dirty="0" err="1"/>
+              <a:t>Gamedriver</a:t>
+            </a:r>
             <a:r>
               <a:rPr lang="en-US" sz="1400" dirty="0"/>
-              <a:t>//window size variables:</a:t>
-            </a:r>
-          </a:p>
-          <a:p>
+              <a:t> extends </a:t>
+            </a:r>
             <a:r>
               <a:rPr lang="en-US" sz="1400" dirty="0" err="1"/>
-              <a:t>privare</a:t>
-            </a:r>
-            <a:r>
-              <a:rPr lang="en-US" sz="1400" dirty="0"/>
-              <a:t> final </a:t>
-            </a:r>
-            <a:r>
-              <a:rPr lang="en-US" sz="1400" dirty="0" err="1"/>
-              <a:t>int</a:t>
+              <a:t>JFrame</a:t>
             </a:r>
             <a:r>
               <a:rPr lang="en-US" sz="1400" dirty="0"/>
               <a:t> </a:t>
             </a:r>
             <a:r>
+              <a:rPr lang="en-US" sz="1400" dirty="0" smtClean="0"/>
+              <a:t>{</a:t>
+            </a:r>
+            <a:endParaRPr lang="en-US" sz="1400" dirty="0"/>
+          </a:p>
+          <a:p>
+            <a:r>
+              <a:rPr lang="en-US" sz="1400" dirty="0" smtClean="0"/>
+              <a:t>Code </a:t>
+            </a:r>
+            <a:r>
+              <a:rPr lang="en-US" sz="1400" dirty="0"/>
+              <a:t>that initializes </a:t>
+            </a:r>
+            <a:r>
               <a:rPr lang="en-US" sz="1400" dirty="0" err="1"/>
-              <a:t>gameWindowWidth</a:t>
+              <a:t>JFrame</a:t>
             </a:r>
             <a:r>
               <a:rPr lang="en-US" sz="1400" dirty="0"/>
-              <a:t> = 1000; //private encapsulates this variable so it is only available in the GameDriver class</a:t>
-            </a:r>
-          </a:p>
-          <a:p>
+              <a:t>:</a:t>
+            </a:r>
+          </a:p>
+          <a:p>
+            <a:r>
+              <a:rPr lang="en-US" sz="1400" dirty="0" err="1"/>
+              <a:t>this.setTitle</a:t>
+            </a:r>
             <a:r>
               <a:rPr lang="en-US" sz="1400" dirty="0"/>
-              <a:t>private final </a:t>
-            </a:r>
+              <a:t>(“TEKcamp Pong!”);</a:t>
+            </a:r>
+          </a:p>
+          <a:p>
             <a:r>
               <a:rPr lang="en-US" sz="1400" dirty="0" err="1"/>
-              <a:t>int</a:t>
+              <a:t>this.setSize</a:t>
             </a:r>
             <a:r>
               <a:rPr lang="en-US" sz="1400" dirty="0"/>
-              <a:t> </a:t>
-            </a:r>
-            <a:r>
-              <a:rPr lang="en-US" sz="1400" dirty="0" err="1"/>
-              <a:t>gameWindowHeight</a:t>
-            </a:r>
-            <a:r>
-              <a:rPr lang="en-US" sz="1400" dirty="0"/>
-              <a:t> = 800; //final prevents the field from being changed</a:t>
-            </a:r>
-          </a:p>
-          <a:p>
-            <a:r>
-              <a:rPr lang="en-US" sz="1400" dirty="0"/>
-              <a:t>private final Dimension </a:t>
+              <a:t>(</a:t>
             </a:r>
             <a:r>
               <a:rPr lang="en-US" sz="1400" dirty="0" err="1"/>
@@ -8055,53 +8147,64 @@
             </a:r>
             <a:r>
               <a:rPr lang="en-US" sz="1400" dirty="0"/>
-              <a:t> = new Dimension (</a:t>
-            </a:r>
+              <a:t>);</a:t>
+            </a:r>
+          </a:p>
+          <a:p>
             <a:r>
               <a:rPr lang="en-US" sz="1400" dirty="0" err="1"/>
-              <a:t>gameWindowWidth</a:t>
+              <a:t>this.setResizable</a:t>
             </a:r>
             <a:r>
               <a:rPr lang="en-US" sz="1400" dirty="0"/>
-              <a:t>, </a:t>
-            </a:r>
+              <a:t>(false);</a:t>
+            </a:r>
+          </a:p>
+          <a:p>
             <a:r>
               <a:rPr lang="en-US" sz="1400" dirty="0" err="1"/>
-              <a:t>gameWindowHeight</a:t>
+              <a:t>this.setVisible</a:t>
             </a:r>
             <a:r>
               <a:rPr lang="en-US" sz="1400" dirty="0"/>
-              <a:t>); //creates a new instance of Dimension called </a:t>
-            </a:r>
+              <a:t>(true);</a:t>
+            </a:r>
+          </a:p>
+          <a:p>
             <a:r>
               <a:rPr lang="en-US" sz="1400" dirty="0" err="1"/>
-              <a:t>screenSize</a:t>
+              <a:t>this.setBackground</a:t>
             </a:r>
             <a:r>
               <a:rPr lang="en-US" sz="1400" dirty="0"/>
-              <a:t> with </a:t>
+              <a:t>(</a:t>
             </a:r>
             <a:r>
               <a:rPr lang="en-US" sz="1400" dirty="0" err="1"/>
-              <a:t>gameWindowWidth</a:t>
+              <a:t>Color.CYAN</a:t>
             </a:r>
             <a:r>
               <a:rPr lang="en-US" sz="1400" dirty="0"/>
-              <a:t> and </a:t>
-            </a:r>
+              <a:t>);</a:t>
+            </a:r>
+          </a:p>
+          <a:p>
             <a:r>
               <a:rPr lang="en-US" sz="1400" dirty="0" err="1"/>
-              <a:t>gameWindowHeight</a:t>
+              <a:t>setDefaultCloseOperation</a:t>
             </a:r>
             <a:r>
               <a:rPr lang="en-US" sz="1400" dirty="0"/>
-              <a:t> as its parameters. Dimension is a class from </a:t>
+              <a:t>(</a:t>
             </a:r>
             <a:r>
               <a:rPr lang="en-US" sz="1400" dirty="0" err="1"/>
-              <a:t>java.awt</a:t>
-            </a:r>
-            <a:endParaRPr lang="en-US" sz="1400" dirty="0"/>
+              <a:t>JFrame.EXIT_ON_CLOSE</a:t>
+            </a:r>
+            <a:r>
+              <a:rPr lang="en-US" sz="1400" dirty="0"/>
+              <a:t>);</a:t>
+            </a:r>
           </a:p>
           <a:p>
             <a:endParaRPr lang="en-US" sz="1400" dirty="0"/>
@@ -8111,7 +8214,7 @@
     </p:spTree>
     <p:extLst>
       <p:ext uri="{BB962C8B-B14F-4D97-AF65-F5344CB8AC3E}">
-        <p14:creationId xmlns:p14="http://schemas.microsoft.com/office/powerpoint/2010/main" val="761110671"/>
+        <p14:creationId xmlns:p14="http://schemas.microsoft.com/office/powerpoint/2010/main" val="639105503"/>
       </p:ext>
     </p:extLst>
   </p:cSld>
@@ -8155,252 +8258,6 @@
             <p:ph type="title"/>
           </p:nvPr>
         </p:nvSpPr>
-        <p:spPr/>
-        <p:txBody>
-          <a:bodyPr/>
-          <a:lstStyle/>
-          <a:p>
-            <a:r>
-              <a:rPr lang="en-US" dirty="0" smtClean="0"/>
-              <a:t>inheritance</a:t>
-            </a:r>
-            <a:endParaRPr lang="en-US" dirty="0"/>
-          </a:p>
-        </p:txBody>
-      </p:sp>
-      <p:sp>
-        <p:nvSpPr>
-          <p:cNvPr id="3" name="Content Placeholder 2"/>
-          <p:cNvSpPr>
-            <a:spLocks noGrp="1"/>
-          </p:cNvSpPr>
-          <p:nvPr>
-            <p:ph idx="1"/>
-          </p:nvPr>
-        </p:nvSpPr>
-        <p:spPr>
-          <a:xfrm>
-            <a:off x="822960" y="917748"/>
-            <a:ext cx="7520940" cy="3579849"/>
-          </a:xfrm>
-        </p:spPr>
-        <p:txBody>
-          <a:bodyPr>
-            <a:noAutofit/>
-          </a:bodyPr>
-          <a:lstStyle/>
-          <a:p>
-            <a:r>
-              <a:rPr lang="en-US" sz="1400" dirty="0"/>
-              <a:t>Inheritance is the concept that we can take the functionality that is available in an already existing class and extend it to a new class. This allows us to reuse code, thereby reducing the amount of code needing to be written to achieve a desired outcome.</a:t>
-            </a:r>
-          </a:p>
-          <a:p>
-            <a:r>
-              <a:rPr lang="en-US" sz="1400" dirty="0"/>
-              <a:t>This is a very powerful concept in OOP because it allows us to access the properties of an existing class and implement them quickly and easily. </a:t>
-            </a:r>
-          </a:p>
-          <a:p>
-            <a:r>
-              <a:rPr lang="en-US" sz="1400" dirty="0"/>
-              <a:t>Example from program: This uses </a:t>
-            </a:r>
-            <a:r>
-              <a:rPr lang="en-US" sz="1400" dirty="0" err="1"/>
-              <a:t>Jframe</a:t>
-            </a:r>
-            <a:r>
-              <a:rPr lang="en-US" sz="1400" dirty="0"/>
-              <a:t> functionality to build the window of the GUI</a:t>
-            </a:r>
-            <a:r>
-              <a:rPr lang="en-US" sz="1400" dirty="0" smtClean="0"/>
-              <a:t>.</a:t>
-            </a:r>
-            <a:endParaRPr lang="en-US" sz="1400" dirty="0"/>
-          </a:p>
-          <a:p>
-            <a:r>
-              <a:rPr lang="en-US" sz="1400" dirty="0"/>
-              <a:t>Public class </a:t>
-            </a:r>
-            <a:r>
-              <a:rPr lang="en-US" sz="1400" dirty="0" err="1"/>
-              <a:t>Gamedriver</a:t>
-            </a:r>
-            <a:r>
-              <a:rPr lang="en-US" sz="1400" dirty="0"/>
-              <a:t> extends </a:t>
-            </a:r>
-            <a:r>
-              <a:rPr lang="en-US" sz="1400" dirty="0" err="1"/>
-              <a:t>JFrame</a:t>
-            </a:r>
-            <a:r>
-              <a:rPr lang="en-US" sz="1400" dirty="0"/>
-              <a:t> </a:t>
-            </a:r>
-            <a:r>
-              <a:rPr lang="en-US" sz="1400" dirty="0" smtClean="0"/>
-              <a:t>{</a:t>
-            </a:r>
-            <a:endParaRPr lang="en-US" sz="1400" dirty="0"/>
-          </a:p>
-          <a:p>
-            <a:r>
-              <a:rPr lang="en-US" sz="1400" dirty="0" smtClean="0"/>
-              <a:t>Code </a:t>
-            </a:r>
-            <a:r>
-              <a:rPr lang="en-US" sz="1400" dirty="0"/>
-              <a:t>that initializes </a:t>
-            </a:r>
-            <a:r>
-              <a:rPr lang="en-US" sz="1400" dirty="0" err="1"/>
-              <a:t>JFrame</a:t>
-            </a:r>
-            <a:r>
-              <a:rPr lang="en-US" sz="1400" dirty="0"/>
-              <a:t>:</a:t>
-            </a:r>
-          </a:p>
-          <a:p>
-            <a:r>
-              <a:rPr lang="en-US" sz="1400" dirty="0" err="1"/>
-              <a:t>this.setTitle</a:t>
-            </a:r>
-            <a:r>
-              <a:rPr lang="en-US" sz="1400" dirty="0"/>
-              <a:t>(“TEKcamp Pong!”);</a:t>
-            </a:r>
-          </a:p>
-          <a:p>
-            <a:r>
-              <a:rPr lang="en-US" sz="1400" dirty="0" err="1"/>
-              <a:t>this.setSize</a:t>
-            </a:r>
-            <a:r>
-              <a:rPr lang="en-US" sz="1400" dirty="0"/>
-              <a:t>(</a:t>
-            </a:r>
-            <a:r>
-              <a:rPr lang="en-US" sz="1400" dirty="0" err="1"/>
-              <a:t>screenSize</a:t>
-            </a:r>
-            <a:r>
-              <a:rPr lang="en-US" sz="1400" dirty="0"/>
-              <a:t>);</a:t>
-            </a:r>
-          </a:p>
-          <a:p>
-            <a:r>
-              <a:rPr lang="en-US" sz="1400" dirty="0" err="1"/>
-              <a:t>this.setResizable</a:t>
-            </a:r>
-            <a:r>
-              <a:rPr lang="en-US" sz="1400" dirty="0"/>
-              <a:t>(false);</a:t>
-            </a:r>
-          </a:p>
-          <a:p>
-            <a:r>
-              <a:rPr lang="en-US" sz="1400" dirty="0" err="1"/>
-              <a:t>this.setVisible</a:t>
-            </a:r>
-            <a:r>
-              <a:rPr lang="en-US" sz="1400" dirty="0"/>
-              <a:t>(true);</a:t>
-            </a:r>
-          </a:p>
-          <a:p>
-            <a:r>
-              <a:rPr lang="en-US" sz="1400" dirty="0" err="1"/>
-              <a:t>this.setBackground</a:t>
-            </a:r>
-            <a:r>
-              <a:rPr lang="en-US" sz="1400" dirty="0"/>
-              <a:t>(</a:t>
-            </a:r>
-            <a:r>
-              <a:rPr lang="en-US" sz="1400" dirty="0" err="1"/>
-              <a:t>Color.CYAN</a:t>
-            </a:r>
-            <a:r>
-              <a:rPr lang="en-US" sz="1400" dirty="0"/>
-              <a:t>);</a:t>
-            </a:r>
-          </a:p>
-          <a:p>
-            <a:r>
-              <a:rPr lang="en-US" sz="1400" dirty="0" err="1"/>
-              <a:t>setDefaultCloseOperation</a:t>
-            </a:r>
-            <a:r>
-              <a:rPr lang="en-US" sz="1400" dirty="0"/>
-              <a:t>(</a:t>
-            </a:r>
-            <a:r>
-              <a:rPr lang="en-US" sz="1400" dirty="0" err="1"/>
-              <a:t>JFrame.EXIT_ON_CLOSE</a:t>
-            </a:r>
-            <a:r>
-              <a:rPr lang="en-US" sz="1400" dirty="0"/>
-              <a:t>);</a:t>
-            </a:r>
-          </a:p>
-          <a:p>
-            <a:endParaRPr lang="en-US" sz="1400" dirty="0"/>
-          </a:p>
-        </p:txBody>
-      </p:sp>
-    </p:spTree>
-    <p:extLst>
-      <p:ext uri="{BB962C8B-B14F-4D97-AF65-F5344CB8AC3E}">
-        <p14:creationId xmlns:p14="http://schemas.microsoft.com/office/powerpoint/2010/main" val="639105503"/>
-      </p:ext>
-    </p:extLst>
-  </p:cSld>
-  <p:clrMapOvr>
-    <a:masterClrMapping/>
-  </p:clrMapOvr>
-  <p:timing>
-    <p:tnLst>
-      <p:par>
-        <p:cTn xmlns:p14="http://schemas.microsoft.com/office/powerpoint/2010/main" id="1" dur="indefinite" restart="never" nodeType="tmRoot"/>
-      </p:par>
-    </p:tnLst>
-  </p:timing>
-</p:sld>
-</file>
-
-<file path=ppt/slides/slide25.xml><?xml version="1.0" encoding="utf-8"?>
-<p:sld xmlns:a="http://schemas.openxmlformats.org/drawingml/2006/main" xmlns:r="http://schemas.openxmlformats.org/officeDocument/2006/relationships" xmlns:p="http://schemas.openxmlformats.org/presentationml/2006/main">
-  <p:cSld>
-    <p:spTree>
-      <p:nvGrpSpPr>
-        <p:cNvPr id="1" name=""/>
-        <p:cNvGrpSpPr/>
-        <p:nvPr/>
-      </p:nvGrpSpPr>
-      <p:grpSpPr>
-        <a:xfrm>
-          <a:off x="0" y="0"/>
-          <a:ext cx="0" cy="0"/>
-          <a:chOff x="0" y="0"/>
-          <a:chExt cx="0" cy="0"/>
-        </a:xfrm>
-      </p:grpSpPr>
-      <p:sp>
-        <p:nvSpPr>
-          <p:cNvPr id="2" name="Title 1"/>
-          <p:cNvSpPr>
-            <a:spLocks noGrp="1"/>
-          </p:cNvSpPr>
-          <p:nvPr>
-            <p:ph type="title"/>
-          </p:nvPr>
-        </p:nvSpPr>
         <p:spPr>
           <a:xfrm>
             <a:off x="822960" y="91440"/>
@@ -8592,7 +8449,7 @@
 </p:sld>
 </file>
 
-<file path=ppt/slides/slide26.xml><?xml version="1.0" encoding="utf-8"?>
+<file path=ppt/slides/slide25.xml><?xml version="1.0" encoding="utf-8"?>
 <p:sld xmlns:a="http://schemas.openxmlformats.org/drawingml/2006/main" xmlns:r="http://schemas.openxmlformats.org/officeDocument/2006/relationships" xmlns:p="http://schemas.openxmlformats.org/presentationml/2006/main">
   <p:cSld>
     <p:spTree>
@@ -9152,10 +9009,10 @@
           <a:lstStyle/>
           <a:p>
             <a:r>
-              <a:rPr lang="en-US" sz="3600" dirty="0" smtClean="0"/>
-              <a:t>Customer Features Wish List</a:t>
-            </a:r>
-            <a:endParaRPr lang="en-US" sz="3600" dirty="0"/>
+              <a:rPr lang="en-US" dirty="0" smtClean="0"/>
+              <a:t>Challenges as the Developer </a:t>
+            </a:r>
+            <a:endParaRPr lang="en-US" dirty="0"/>
           </a:p>
         </p:txBody>
       </p:sp>
@@ -9171,8 +9028,8 @@
         </p:nvSpPr>
         <p:spPr>
           <a:xfrm>
-            <a:off x="692395" y="1100628"/>
-            <a:ext cx="7913024" cy="3967941"/>
+            <a:off x="549274" y="1849474"/>
+            <a:ext cx="8257927" cy="4343400"/>
           </a:xfrm>
         </p:spPr>
         <p:txBody>
@@ -9180,12 +9037,6 @@
             <a:normAutofit/>
           </a:bodyPr>
           <a:lstStyle/>
-          <a:p>
-            <a:r>
-              <a:rPr lang="en-US" sz="1800" dirty="0" smtClean="0"/>
-              <a:t>Current Features:</a:t>
-            </a:r>
-          </a:p>
           <a:p>
             <a:pPr>
               <a:buBlip>
@@ -9193,8 +9044,8 @@
               </a:buBlip>
             </a:pPr>
             <a:r>
-              <a:rPr lang="en-US" dirty="0" smtClean="0"/>
-              <a:t>2 or 4 Player Mode</a:t>
+              <a:rPr lang="en-US" sz="1800" dirty="0" smtClean="0"/>
+              <a:t> How can I complete my capstone successfully with my current skill and experience level?</a:t>
             </a:r>
           </a:p>
           <a:p>
@@ -9204,14 +9055,9 @@
               </a:buBlip>
             </a:pPr>
             <a:r>
-              <a:rPr lang="en-US" dirty="0" smtClean="0"/>
-              <a:t>Player Names display on </a:t>
-            </a:r>
-            <a:r>
-              <a:rPr lang="en-US" dirty="0" smtClean="0"/>
-              <a:t>the GUI</a:t>
-            </a:r>
-            <a:endParaRPr lang="en-US" dirty="0" smtClean="0"/>
+              <a:rPr lang="en-US" sz="1800" dirty="0" smtClean="0"/>
+              <a:t> How can I implement the core requirements into my project?</a:t>
+            </a:r>
           </a:p>
           <a:p>
             <a:pPr>
@@ -9220,20 +9066,8 @@
               </a:buBlip>
             </a:pPr>
             <a:r>
-              <a:rPr lang="en-US" dirty="0" smtClean="0"/>
-              <a:t>The Score </a:t>
-            </a:r>
-            <a:r>
-              <a:rPr lang="en-US" dirty="0" smtClean="0"/>
-              <a:t>displays on </a:t>
-            </a:r>
-            <a:r>
-              <a:rPr lang="en-US" dirty="0" smtClean="0"/>
-              <a:t>the GUI </a:t>
-            </a:r>
-            <a:r>
-              <a:rPr lang="en-US" dirty="0" smtClean="0"/>
-              <a:t>and increments in real time</a:t>
+              <a:rPr lang="en-US" sz="1800" dirty="0" smtClean="0"/>
+              <a:t> How can I prioritize my time so that I can maximize my productivity while meeting my other commitments?</a:t>
             </a:r>
           </a:p>
           <a:p>
@@ -9243,32 +9077,9 @@
               </a:buBlip>
             </a:pPr>
             <a:r>
-              <a:rPr lang="en-US" dirty="0" smtClean="0"/>
-              <a:t>The TEKcamp logo is </a:t>
-            </a:r>
-            <a:r>
-              <a:rPr lang="en-US" dirty="0" smtClean="0"/>
-              <a:t>displayed </a:t>
-            </a:r>
-            <a:r>
-              <a:rPr lang="en-US" dirty="0" smtClean="0"/>
-              <a:t>on the </a:t>
-            </a:r>
-            <a:r>
-              <a:rPr lang="en-US" dirty="0" smtClean="0"/>
-              <a:t>GUI and in dialogue boxes</a:t>
-            </a:r>
-          </a:p>
-          <a:p>
-            <a:r>
               <a:rPr lang="en-US" sz="1800" dirty="0" smtClean="0"/>
-              <a:t>Future Upgrades</a:t>
-            </a:r>
-            <a:r>
-              <a:rPr lang="en-US" sz="1800" dirty="0" smtClean="0"/>
-              <a:t>: </a:t>
-            </a:r>
-            <a:endParaRPr lang="en-US" sz="1800" dirty="0" smtClean="0"/>
+              <a:t> Where do I get the information I will need to complete my tasks?</a:t>
+            </a:r>
           </a:p>
           <a:p>
             <a:pPr>
@@ -9277,9 +9088,26 @@
               </a:buBlip>
             </a:pPr>
             <a:r>
-              <a:rPr lang="en-US" dirty="0" smtClean="0"/>
-              <a:t>Allow player to select levels of difficulty (paddle size, paddle speed, ball size, ball speed)</a:t>
-            </a:r>
+              <a:rPr lang="en-US" sz="1800" dirty="0" smtClean="0"/>
+              <a:t> It’s </a:t>
+            </a:r>
+            <a:r>
+              <a:rPr lang="en-US" sz="1800" dirty="0"/>
+              <a:t>not just about me </a:t>
+            </a:r>
+            <a:r>
+              <a:rPr lang="en-US" sz="1800" dirty="0" smtClean="0"/>
+              <a:t>– How can I help </a:t>
+            </a:r>
+            <a:r>
+              <a:rPr lang="en-US" sz="1800" dirty="0"/>
+              <a:t>my teammates to be successful by offering assistance with their soft </a:t>
+            </a:r>
+            <a:r>
+              <a:rPr lang="en-US" sz="1800" dirty="0" smtClean="0"/>
+              <a:t>skills?</a:t>
+            </a:r>
+            <a:endParaRPr lang="en-US" sz="1800" dirty="0"/>
           </a:p>
           <a:p>
             <a:pPr>
@@ -9287,32 +9115,6 @@
                 <a:blip r:embed="rId2"/>
               </a:buBlip>
             </a:pPr>
-            <a:r>
-              <a:rPr lang="en-US" dirty="0"/>
-              <a:t>Create a player library that includes their picture so if name matches, import picture to GUI also.</a:t>
-            </a:r>
-          </a:p>
-          <a:p>
-            <a:pPr>
-              <a:buBlip>
-                <a:blip r:embed="rId2"/>
-              </a:buBlip>
-            </a:pPr>
-            <a:r>
-              <a:rPr lang="en-US" dirty="0" smtClean="0"/>
-              <a:t>Keystroke </a:t>
-            </a:r>
-            <a:r>
-              <a:rPr lang="en-US" dirty="0"/>
-              <a:t>that allows individual player to toggle between paddle sizes </a:t>
-            </a:r>
-            <a:r>
-              <a:rPr lang="en-US" dirty="0" smtClean="0"/>
-              <a:t>independently.</a:t>
-            </a:r>
-            <a:endParaRPr lang="en-US" dirty="0"/>
-          </a:p>
-          <a:p>
             <a:endParaRPr lang="en-US" dirty="0"/>
           </a:p>
         </p:txBody>
@@ -9320,7 +9122,7 @@
     </p:spTree>
     <p:extLst>
       <p:ext uri="{BB962C8B-B14F-4D97-AF65-F5344CB8AC3E}">
-        <p14:creationId xmlns:p14="http://schemas.microsoft.com/office/powerpoint/2010/main" val="1826954315"/>
+        <p14:creationId xmlns:p14="http://schemas.microsoft.com/office/powerpoint/2010/main" val="332148540"/>
       </p:ext>
     </p:extLst>
   </p:cSld>
@@ -9371,7 +9173,7 @@
           <a:p>
             <a:r>
               <a:rPr lang="en-US" dirty="0" smtClean="0"/>
-              <a:t>Challenges as the Developer </a:t>
+              <a:t>2. Planning the Solution</a:t>
             </a:r>
             <a:endParaRPr lang="en-US" dirty="0"/>
           </a:p>
@@ -9389,8 +9191,8 @@
         </p:nvSpPr>
         <p:spPr>
           <a:xfrm>
-            <a:off x="549274" y="1849474"/>
-            <a:ext cx="8257927" cy="4343400"/>
+            <a:off x="549275" y="1064558"/>
+            <a:ext cx="8042276" cy="4343400"/>
           </a:xfrm>
         </p:spPr>
         <p:txBody>
@@ -9399,83 +9201,139 @@
           </a:bodyPr>
           <a:lstStyle/>
           <a:p>
-            <a:pPr>
+            <a:pPr marL="0" indent="0">
+              <a:buNone/>
+            </a:pPr>
+            <a:r>
+              <a:rPr lang="en-US" dirty="0" smtClean="0"/>
+              <a:t>	</a:t>
+            </a:r>
+          </a:p>
+          <a:p>
+            <a:pPr marL="285750" indent="-285750">
               <a:buBlip>
-                <a:blip r:embed="rId2"/>
+                <a:blip r:embed="rId3"/>
               </a:buBlip>
             </a:pPr>
             <a:r>
-              <a:rPr lang="en-US" sz="1800" dirty="0" smtClean="0"/>
-              <a:t> How can I complete my capstone successfully with my current skill and experience level?</a:t>
-            </a:r>
-          </a:p>
-          <a:p>
-            <a:pPr>
+              <a:rPr lang="en-US" dirty="0" smtClean="0"/>
+              <a:t>Interview client, define expectations, and obtain items needed to implement solution: </a:t>
+            </a:r>
+          </a:p>
+          <a:p>
+            <a:pPr marL="285750" indent="-285750">
               <a:buBlip>
-                <a:blip r:embed="rId2"/>
+                <a:blip r:embed="rId3"/>
               </a:buBlip>
             </a:pPr>
             <a:r>
-              <a:rPr lang="en-US" sz="1800" dirty="0" smtClean="0"/>
-              <a:t> How can I implement the core requirements into my project?</a:t>
-            </a:r>
-          </a:p>
-          <a:p>
-            <a:pPr>
+              <a:rPr lang="en-US" dirty="0" smtClean="0"/>
+              <a:t>TEKcamp Logo for GUI (supplied by classmate Abigail </a:t>
+            </a:r>
+            <a:r>
+              <a:rPr lang="en-US" dirty="0" err="1" smtClean="0"/>
+              <a:t>Swigert</a:t>
+            </a:r>
+            <a:r>
+              <a:rPr lang="en-US" dirty="0" smtClean="0"/>
+              <a:t>)</a:t>
+            </a:r>
+          </a:p>
+          <a:p>
+            <a:pPr marL="285750" indent="-285750">
               <a:buBlip>
-                <a:blip r:embed="rId2"/>
+                <a:blip r:embed="rId3"/>
               </a:buBlip>
             </a:pPr>
             <a:r>
-              <a:rPr lang="en-US" sz="1800" dirty="0" smtClean="0"/>
-              <a:t> How can I prioritize my time so that I can maximize my productivity while meeting my other commitments?</a:t>
-            </a:r>
-          </a:p>
-          <a:p>
-            <a:pPr>
+              <a:rPr lang="en-US" dirty="0" smtClean="0"/>
+              <a:t> Color Scheme and Layout: Customer Approved</a:t>
+            </a:r>
+          </a:p>
+          <a:p>
+            <a:pPr marL="285750" indent="-285750">
               <a:buBlip>
-                <a:blip r:embed="rId2"/>
+                <a:blip r:embed="rId3"/>
               </a:buBlip>
             </a:pPr>
             <a:r>
-              <a:rPr lang="en-US" sz="1800" dirty="0" smtClean="0"/>
-              <a:t> Where do I get the information I will need to complete my tasks?</a:t>
-            </a:r>
-          </a:p>
-          <a:p>
-            <a:pPr>
+              <a:rPr lang="en-US" dirty="0" smtClean="0"/>
+              <a:t> Review Features </a:t>
+            </a:r>
+            <a:r>
+              <a:rPr lang="en-US" dirty="0"/>
+              <a:t>W</a:t>
+            </a:r>
+            <a:r>
+              <a:rPr lang="en-US" dirty="0" smtClean="0"/>
+              <a:t>ish </a:t>
+            </a:r>
+            <a:r>
+              <a:rPr lang="en-US" dirty="0"/>
+              <a:t>L</a:t>
+            </a:r>
+            <a:r>
+              <a:rPr lang="en-US" dirty="0" smtClean="0"/>
+              <a:t>ist with customer and prioritize items</a:t>
+            </a:r>
+          </a:p>
+          <a:p>
+            <a:pPr marL="285750" indent="-285750">
               <a:buBlip>
-                <a:blip r:embed="rId2"/>
+                <a:blip r:embed="rId3"/>
               </a:buBlip>
             </a:pPr>
             <a:r>
-              <a:rPr lang="en-US" sz="1800" dirty="0" smtClean="0"/>
-              <a:t> It’s </a:t>
-            </a:r>
-            <a:r>
-              <a:rPr lang="en-US" sz="1800" dirty="0"/>
-              <a:t>not just about me </a:t>
-            </a:r>
-            <a:r>
-              <a:rPr lang="en-US" sz="1800" dirty="0" smtClean="0"/>
-              <a:t>– How can I help </a:t>
-            </a:r>
-            <a:r>
-              <a:rPr lang="en-US" sz="1800" dirty="0"/>
-              <a:t>my teammates to be successful by offering assistance with their soft </a:t>
-            </a:r>
-            <a:r>
-              <a:rPr lang="en-US" sz="1800" dirty="0" smtClean="0"/>
-              <a:t>skills?</a:t>
-            </a:r>
-            <a:endParaRPr lang="en-US" sz="1800" dirty="0"/>
-          </a:p>
-          <a:p>
-            <a:pPr>
+              <a:rPr lang="en-US" dirty="0" smtClean="0"/>
+              <a:t> GUI details to be displayed: Customer Approved </a:t>
+            </a:r>
+            <a:endParaRPr lang="en-US" dirty="0"/>
+          </a:p>
+          <a:p>
+            <a:pPr marL="285750" indent="-285750">
               <a:buBlip>
-                <a:blip r:embed="rId2"/>
+                <a:blip r:embed="rId3"/>
               </a:buBlip>
             </a:pPr>
+            <a:r>
+              <a:rPr lang="en-US" dirty="0" smtClean="0"/>
+              <a:t> Set realistic and achievable goals: Prioritize client </a:t>
+            </a:r>
+            <a:r>
+              <a:rPr lang="en-US" dirty="0"/>
+              <a:t>requests and </a:t>
+            </a:r>
+            <a:r>
+              <a:rPr lang="en-US" dirty="0" smtClean="0"/>
+              <a:t>identify </a:t>
+            </a:r>
+            <a:r>
+              <a:rPr lang="en-US" dirty="0"/>
+              <a:t>areas of difficulty that will need to be addressed while </a:t>
+            </a:r>
+            <a:r>
+              <a:rPr lang="en-US" dirty="0" smtClean="0"/>
+              <a:t>keeping in mind current level of technical expertise, resources available and time frame</a:t>
+            </a:r>
+          </a:p>
+          <a:p>
+            <a:pPr marL="285750" indent="-285750">
+              <a:buBlip>
+                <a:blip r:embed="rId3"/>
+              </a:buBlip>
+            </a:pPr>
+            <a:r>
+              <a:rPr lang="en-US" dirty="0" smtClean="0"/>
+              <a:t> Define specific times to provide soft skill training for teammates and incorporate into my schedule / provide a PowerPoint in the help channel on presentation tips that students can view in their own time</a:t>
+            </a:r>
+          </a:p>
+          <a:p>
+            <a:pPr marL="0" indent="0">
+              <a:buNone/>
+            </a:pPr>
+            <a:endParaRPr lang="en-US" dirty="0" smtClean="0"/>
+          </a:p>
+          <a:p>
             <a:endParaRPr lang="en-US" dirty="0"/>
           </a:p>
         </p:txBody>
@@ -9483,7 +9341,7 @@
     </p:spTree>
     <p:extLst>
       <p:ext uri="{BB962C8B-B14F-4D97-AF65-F5344CB8AC3E}">
-        <p14:creationId xmlns:p14="http://schemas.microsoft.com/office/powerpoint/2010/main" val="332148540"/>
+        <p14:creationId xmlns:p14="http://schemas.microsoft.com/office/powerpoint/2010/main" val="2345753407"/>
       </p:ext>
     </p:extLst>
   </p:cSld>
@@ -9533,10 +9391,10 @@
           <a:lstStyle/>
           <a:p>
             <a:r>
-              <a:rPr lang="en-US" dirty="0" smtClean="0"/>
-              <a:t>2. Planning the Solution</a:t>
-            </a:r>
-            <a:endParaRPr lang="en-US" dirty="0"/>
+              <a:rPr lang="en-US" sz="3200" dirty="0" smtClean="0"/>
+              <a:t>Customer Features Wish List</a:t>
+            </a:r>
+            <a:endParaRPr lang="en-US" sz="3200" dirty="0"/>
           </a:p>
         </p:txBody>
       </p:sp>
@@ -9552,8 +9410,8 @@
         </p:nvSpPr>
         <p:spPr>
           <a:xfrm>
-            <a:off x="549275" y="1064558"/>
-            <a:ext cx="8042276" cy="4343400"/>
+            <a:off x="692395" y="1100628"/>
+            <a:ext cx="7913024" cy="3967941"/>
           </a:xfrm>
         </p:spPr>
         <p:txBody>
@@ -9562,137 +9420,102 @@
           </a:bodyPr>
           <a:lstStyle/>
           <a:p>
-            <a:pPr marL="0" indent="0">
-              <a:buNone/>
-            </a:pPr>
-            <a:r>
-              <a:rPr lang="en-US" dirty="0" smtClean="0"/>
-              <a:t>	</a:t>
-            </a:r>
-          </a:p>
-          <a:p>
-            <a:pPr marL="285750" indent="-285750">
+            <a:r>
+              <a:rPr lang="en-US" sz="1800" dirty="0" smtClean="0"/>
+              <a:t>Requested Features:</a:t>
+            </a:r>
+          </a:p>
+          <a:p>
+            <a:pPr>
               <a:buBlip>
-                <a:blip r:embed="rId3"/>
+                <a:blip r:embed="rId2"/>
               </a:buBlip>
             </a:pPr>
             <a:r>
               <a:rPr lang="en-US" dirty="0" smtClean="0"/>
-              <a:t>Interview client, define expectations, and obtain items needed to implement solution: </a:t>
-            </a:r>
-          </a:p>
-          <a:p>
-            <a:pPr marL="285750" indent="-285750">
+              <a:t>2 or 4 Player Mode</a:t>
+            </a:r>
+          </a:p>
+          <a:p>
+            <a:pPr>
               <a:buBlip>
-                <a:blip r:embed="rId3"/>
+                <a:blip r:embed="rId2"/>
               </a:buBlip>
             </a:pPr>
             <a:r>
               <a:rPr lang="en-US" dirty="0" smtClean="0"/>
-              <a:t>TEKcamp Logo for GUI (supplied by classmate Abigail </a:t>
-            </a:r>
-            <a:r>
-              <a:rPr lang="en-US" dirty="0" err="1" smtClean="0"/>
-              <a:t>Swigert</a:t>
-            </a:r>
-            <a:r>
-              <a:rPr lang="en-US" dirty="0" smtClean="0"/>
-              <a:t>)</a:t>
-            </a:r>
-          </a:p>
-          <a:p>
-            <a:pPr marL="285750" indent="-285750">
+              <a:t>Player Names display on the GUI</a:t>
+            </a:r>
+          </a:p>
+          <a:p>
+            <a:pPr>
               <a:buBlip>
-                <a:blip r:embed="rId3"/>
+                <a:blip r:embed="rId2"/>
               </a:buBlip>
             </a:pPr>
             <a:r>
               <a:rPr lang="en-US" dirty="0" smtClean="0"/>
-              <a:t> Color Scheme and Layout: Customer Approved</a:t>
-            </a:r>
-          </a:p>
-          <a:p>
-            <a:pPr marL="285750" indent="-285750">
+              <a:t>The Score displays on the GUI and increments in real time</a:t>
+            </a:r>
+          </a:p>
+          <a:p>
+            <a:pPr>
               <a:buBlip>
-                <a:blip r:embed="rId3"/>
+                <a:blip r:embed="rId2"/>
               </a:buBlip>
             </a:pPr>
             <a:r>
               <a:rPr lang="en-US" dirty="0" smtClean="0"/>
-              <a:t> Review Features </a:t>
-            </a:r>
-            <a:r>
-              <a:rPr lang="en-US" dirty="0"/>
-              <a:t>W</a:t>
-            </a:r>
-            <a:r>
-              <a:rPr lang="en-US" dirty="0" smtClean="0"/>
-              <a:t>ish </a:t>
-            </a:r>
-            <a:r>
-              <a:rPr lang="en-US" dirty="0"/>
-              <a:t>L</a:t>
-            </a:r>
-            <a:r>
-              <a:rPr lang="en-US" dirty="0" smtClean="0"/>
-              <a:t>ist with customer and prioritize items</a:t>
-            </a:r>
-          </a:p>
-          <a:p>
-            <a:pPr marL="285750" indent="-285750">
+              <a:t>The TEKcamp logo is displayed on the GUI and in dialogue boxes</a:t>
+            </a:r>
+          </a:p>
+          <a:p>
+            <a:r>
+              <a:rPr lang="en-US" sz="1800" dirty="0" smtClean="0"/>
+              <a:t>Future Upgrades: </a:t>
+            </a:r>
+          </a:p>
+          <a:p>
+            <a:pPr>
               <a:buBlip>
-                <a:blip r:embed="rId3"/>
+                <a:blip r:embed="rId2"/>
               </a:buBlip>
             </a:pPr>
             <a:r>
               <a:rPr lang="en-US" dirty="0" smtClean="0"/>
-              <a:t> GUI details to be displayed: Customer Approved </a:t>
-            </a:r>
-            <a:endParaRPr lang="en-US" dirty="0"/>
-          </a:p>
-          <a:p>
-            <a:pPr marL="285750" indent="-285750">
+              <a:t>Allow player to select levels of difficulty (paddle size, paddle speed, ball size, ball speed)</a:t>
+            </a:r>
+          </a:p>
+          <a:p>
+            <a:pPr>
               <a:buBlip>
-                <a:blip r:embed="rId3"/>
+                <a:blip r:embed="rId2"/>
               </a:buBlip>
             </a:pPr>
             <a:r>
-              <a:rPr lang="en-US" dirty="0" smtClean="0"/>
-              <a:t> Set realistic and achievable goals: Prioritize client </a:t>
-            </a:r>
-            <a:r>
               <a:rPr lang="en-US" dirty="0"/>
-              <a:t>requests and </a:t>
-            </a:r>
-            <a:r>
-              <a:rPr lang="en-US" dirty="0" smtClean="0"/>
-              <a:t>identify </a:t>
-            </a:r>
-            <a:r>
-              <a:rPr lang="en-US" dirty="0"/>
-              <a:t>areas of difficulty that will need to be addressed while </a:t>
-            </a:r>
-            <a:r>
-              <a:rPr lang="en-US" dirty="0" smtClean="0"/>
-              <a:t>keeping in mind current level of technical expertise, resources available and time frame</a:t>
-            </a:r>
-          </a:p>
-          <a:p>
-            <a:pPr marL="285750" indent="-285750">
+              <a:t>Create a player library that includes their picture so if name matches, import picture to GUI also.</a:t>
+            </a:r>
+          </a:p>
+          <a:p>
+            <a:pPr>
               <a:buBlip>
-                <a:blip r:embed="rId3"/>
+                <a:blip r:embed="rId2"/>
               </a:buBlip>
             </a:pPr>
             <a:r>
               <a:rPr lang="en-US" dirty="0" smtClean="0"/>
-              <a:t> Define specific times to provide soft skill training for teammates and incorporate into my schedule / provide a PowerPoint in the help channel on presentation tips that students can view in their own time</a:t>
-            </a:r>
-          </a:p>
-          <a:p>
-            <a:pPr marL="0" indent="0">
-              <a:buNone/>
-            </a:pPr>
-            <a:endParaRPr lang="en-US" dirty="0" smtClean="0"/>
+              <a:t>Keystroke </a:t>
+            </a:r>
+            <a:r>
+              <a:rPr lang="en-US" dirty="0"/>
+              <a:t>that allows individual player to toggle between paddle sizes </a:t>
+            </a:r>
+            <a:r>
+              <a:rPr lang="en-US" dirty="0" smtClean="0"/>
+              <a:t>independently.</a:t>
+            </a:r>
+            <a:endParaRPr lang="en-US" dirty="0"/>
           </a:p>
           <a:p>
             <a:endParaRPr lang="en-US" dirty="0"/>
@@ -9702,7 +9525,7 @@
     </p:spTree>
     <p:extLst>
       <p:ext uri="{BB962C8B-B14F-4D97-AF65-F5344CB8AC3E}">
-        <p14:creationId xmlns:p14="http://schemas.microsoft.com/office/powerpoint/2010/main" val="2345753407"/>
+        <p14:creationId xmlns:p14="http://schemas.microsoft.com/office/powerpoint/2010/main" val="1826954315"/>
       </p:ext>
     </p:extLst>
   </p:cSld>

</xml_diff>

<commit_message>
final ppt for presentation
</commit_message>
<xml_diff>
--- a/Capstone_2.pptx
+++ b/Capstone_2.pptx
@@ -16,16 +16,16 @@
     <p:sldId id="261" r:id="rId7"/>
     <p:sldId id="278" r:id="rId8"/>
     <p:sldId id="271" r:id="rId9"/>
-    <p:sldId id="272" r:id="rId10"/>
-    <p:sldId id="269" r:id="rId11"/>
-    <p:sldId id="258" r:id="rId12"/>
-    <p:sldId id="268" r:id="rId13"/>
-    <p:sldId id="276" r:id="rId14"/>
-    <p:sldId id="281" r:id="rId15"/>
-    <p:sldId id="282" r:id="rId16"/>
-    <p:sldId id="283" r:id="rId17"/>
-    <p:sldId id="259" r:id="rId18"/>
-    <p:sldId id="270" r:id="rId19"/>
+    <p:sldId id="269" r:id="rId10"/>
+    <p:sldId id="258" r:id="rId11"/>
+    <p:sldId id="268" r:id="rId12"/>
+    <p:sldId id="276" r:id="rId13"/>
+    <p:sldId id="281" r:id="rId14"/>
+    <p:sldId id="282" r:id="rId15"/>
+    <p:sldId id="283" r:id="rId16"/>
+    <p:sldId id="259" r:id="rId17"/>
+    <p:sldId id="270" r:id="rId18"/>
+    <p:sldId id="272" r:id="rId19"/>
     <p:sldId id="289" r:id="rId20"/>
     <p:sldId id="280" r:id="rId21"/>
     <p:sldId id="284" r:id="rId22"/>
@@ -5461,228 +5461,150 @@
             <p:ph type="title"/>
           </p:nvPr>
         </p:nvSpPr>
+        <p:spPr/>
+        <p:txBody>
+          <a:bodyPr/>
+          <a:lstStyle/>
+          <a:p>
+            <a:r>
+              <a:rPr lang="en-US" dirty="0" smtClean="0"/>
+              <a:t>Tools/Resources Available</a:t>
+            </a:r>
+            <a:endParaRPr lang="en-US" dirty="0"/>
+          </a:p>
+        </p:txBody>
+      </p:sp>
+      <p:sp>
+        <p:nvSpPr>
+          <p:cNvPr id="3" name="Content Placeholder 2"/>
+          <p:cNvSpPr>
+            <a:spLocks noGrp="1"/>
+          </p:cNvSpPr>
+          <p:nvPr>
+            <p:ph idx="1"/>
+          </p:nvPr>
+        </p:nvSpPr>
         <p:spPr>
           <a:xfrm>
-            <a:off x="549275" y="-430097"/>
-            <a:ext cx="8042276" cy="1336956"/>
+            <a:off x="549275" y="1967571"/>
+            <a:ext cx="8042276" cy="4343400"/>
           </a:xfrm>
         </p:spPr>
         <p:txBody>
           <a:bodyPr/>
           <a:lstStyle/>
           <a:p>
-            <a:r>
-              <a:rPr lang="en-US" dirty="0" smtClean="0"/>
-              <a:t>Preliminary Planning</a:t>
-            </a:r>
-            <a:endParaRPr lang="en-US" dirty="0"/>
-          </a:p>
-        </p:txBody>
-      </p:sp>
-      <p:sp>
-        <p:nvSpPr>
-          <p:cNvPr id="3" name="Content Placeholder 2"/>
-          <p:cNvSpPr>
-            <a:spLocks noGrp="1"/>
-          </p:cNvSpPr>
-          <p:nvPr>
-            <p:ph idx="1"/>
-          </p:nvPr>
-        </p:nvSpPr>
-        <p:spPr>
-          <a:xfrm>
-            <a:off x="549275" y="443922"/>
-            <a:ext cx="8245757" cy="4343400"/>
-          </a:xfrm>
-        </p:spPr>
-        <p:txBody>
-          <a:bodyPr>
-            <a:noAutofit/>
-          </a:bodyPr>
-          <a:lstStyle/>
-          <a:p>
-            <a:pPr marL="0" indent="0">
-              <a:buNone/>
-            </a:pPr>
-            <a:r>
-              <a:rPr lang="en-US" sz="1600" b="1" dirty="0" smtClean="0"/>
-              <a:t>Projected Daily Goals:</a:t>
-            </a:r>
-          </a:p>
-          <a:p>
-            <a:pPr marL="285750" indent="-285750">
+            <a:pPr>
               <a:buBlip>
                 <a:blip r:embed="rId2"/>
               </a:buBlip>
             </a:pPr>
-            <a:r>
-              <a:rPr lang="en-US" sz="1600" b="1" dirty="0" smtClean="0"/>
-              <a:t>Day One: </a:t>
-            </a:r>
-            <a:r>
-              <a:rPr lang="en-US" sz="1600" dirty="0" smtClean="0"/>
-              <a:t>Review </a:t>
-            </a:r>
-            <a:r>
-              <a:rPr lang="en-US" sz="1600" dirty="0"/>
-              <a:t>Capstone Documentation provided by instructor. </a:t>
-            </a:r>
-            <a:r>
-              <a:rPr lang="en-US" sz="1600" dirty="0" smtClean="0"/>
-              <a:t>Research games and </a:t>
-            </a:r>
-            <a:r>
-              <a:rPr lang="en-US" dirty="0"/>
-              <a:t>e</a:t>
-            </a:r>
-            <a:r>
-              <a:rPr lang="en-US" sz="1600" dirty="0" smtClean="0"/>
-              <a:t>xamine existing code to understand how </a:t>
-            </a:r>
-            <a:r>
-              <a:rPr lang="en-US" dirty="0" smtClean="0"/>
-              <a:t>to implement functionality.</a:t>
-            </a:r>
-            <a:r>
-              <a:rPr lang="en-US" sz="1600" dirty="0" smtClean="0"/>
-              <a:t> Locate resources to aid in creating </a:t>
-            </a:r>
-            <a:r>
-              <a:rPr lang="en-US" dirty="0"/>
-              <a:t>game. </a:t>
-            </a:r>
-            <a:r>
-              <a:rPr lang="en-US" dirty="0" smtClean="0"/>
-              <a:t>Finalize </a:t>
-            </a:r>
-            <a:r>
-              <a:rPr lang="en-US" dirty="0"/>
-              <a:t>game selection. </a:t>
-            </a:r>
-            <a:endParaRPr lang="en-US" sz="1600" dirty="0" smtClean="0"/>
-          </a:p>
-          <a:p>
-            <a:pPr marL="285750" indent="-285750">
+            <a:endParaRPr lang="en-US" dirty="0" smtClean="0"/>
+          </a:p>
+          <a:p>
+            <a:pPr>
               <a:buBlip>
                 <a:blip r:embed="rId2"/>
               </a:buBlip>
             </a:pPr>
             <a:r>
-              <a:rPr lang="en-US" sz="1600" b="1" dirty="0" smtClean="0"/>
-              <a:t>Day Two: </a:t>
-            </a:r>
-            <a:r>
-              <a:rPr lang="en-US" sz="1600" dirty="0" smtClean="0"/>
-              <a:t>Define </a:t>
-            </a:r>
-            <a:r>
-              <a:rPr lang="en-US" sz="1600" dirty="0"/>
-              <a:t>problem and begin to plan how to solve it</a:t>
-            </a:r>
-            <a:r>
-              <a:rPr lang="en-US" sz="1600" dirty="0" smtClean="0"/>
-              <a:t>. Complete </a:t>
-            </a:r>
-            <a:r>
-              <a:rPr lang="en-US" sz="1600" dirty="0"/>
-              <a:t>Step One </a:t>
-            </a:r>
-            <a:r>
-              <a:rPr lang="en-US" sz="1600" dirty="0" smtClean="0"/>
-              <a:t>and Two of UPER. Work on OOP documentation per capstone requirements.</a:t>
-            </a:r>
-          </a:p>
-          <a:p>
-            <a:pPr marL="285750" indent="-285750">
+              <a:rPr lang="en-US" dirty="0" smtClean="0"/>
+              <a:t>Collaboration with other students/friends</a:t>
+            </a:r>
+          </a:p>
+          <a:p>
+            <a:pPr>
               <a:buBlip>
                 <a:blip r:embed="rId2"/>
               </a:buBlip>
             </a:pPr>
             <a:r>
-              <a:rPr lang="en-US" sz="1600" b="1" dirty="0" smtClean="0"/>
-              <a:t>Day Three: </a:t>
-            </a:r>
-            <a:r>
-              <a:rPr lang="en-US" sz="1600" dirty="0" smtClean="0"/>
-              <a:t>Review Feature List from Customer Requirements. Brainstorm Structure with </a:t>
-            </a:r>
-            <a:r>
-              <a:rPr lang="en-US" sz="1600" dirty="0"/>
-              <a:t>C</a:t>
-            </a:r>
-            <a:r>
-              <a:rPr lang="en-US" sz="1600" dirty="0" smtClean="0"/>
-              <a:t>lasses/Objects needed to fulfill MVP. Continue to work on OOP documentation. Research pong code and try to understand how it works. Identify trouble areas and research.</a:t>
-            </a:r>
-          </a:p>
-          <a:p>
-            <a:pPr marL="285750" indent="-285750">
+              <a:rPr lang="en-US" dirty="0" smtClean="0"/>
+              <a:t>Support Sessions led by TEKacademy Faculty</a:t>
+            </a:r>
+          </a:p>
+          <a:p>
+            <a:pPr>
               <a:buBlip>
                 <a:blip r:embed="rId2"/>
               </a:buBlip>
             </a:pPr>
             <a:r>
-              <a:rPr lang="en-US" sz="1600" b="1" dirty="0" smtClean="0"/>
-              <a:t>Day Four: Begin coding basic structure. </a:t>
-            </a:r>
-            <a:r>
-              <a:rPr lang="en-US" sz="1600" dirty="0" smtClean="0"/>
-              <a:t>identify problem areas and prioritize time according to what can be accomplished while waiting on resources needed to accomplish tasks in the queue. Research what is needed to accomplish Features Wish List</a:t>
-            </a:r>
-          </a:p>
-          <a:p>
-            <a:pPr marL="285750" indent="-285750">
+              <a:rPr lang="en-US" dirty="0" smtClean="0"/>
+              <a:t>Help Channel and Resources Channel on TEKacademy Slack</a:t>
+            </a:r>
+          </a:p>
+          <a:p>
+            <a:pPr>
               <a:buBlip>
                 <a:blip r:embed="rId2"/>
               </a:buBlip>
             </a:pPr>
             <a:r>
-              <a:rPr lang="en-US" sz="1600" b="1" dirty="0" smtClean="0"/>
-              <a:t>Day Five – Six: </a:t>
-            </a:r>
-            <a:r>
-              <a:rPr lang="en-US" sz="1600" dirty="0"/>
-              <a:t>C</a:t>
-            </a:r>
-            <a:r>
-              <a:rPr lang="en-US" sz="1600" dirty="0" smtClean="0"/>
-              <a:t>ontinue coding and </a:t>
-            </a:r>
-            <a:r>
               <a:rPr lang="en-US" dirty="0" smtClean="0"/>
-              <a:t>work </a:t>
+              <a:t>Extensive Online Documentation including many </a:t>
             </a:r>
             <a:r>
               <a:rPr lang="en-US" dirty="0"/>
-              <a:t>on coding items from Features Wish List in order of </a:t>
+              <a:t>O</a:t>
             </a:r>
             <a:r>
               <a:rPr lang="en-US" dirty="0" smtClean="0"/>
-              <a:t>priority. Work on refactoring and debugging.</a:t>
-            </a:r>
-          </a:p>
-          <a:p>
-            <a:pPr marL="285750" indent="-285750">
+              <a:t>nline </a:t>
+            </a:r>
+            <a:r>
+              <a:rPr lang="en-US" dirty="0"/>
+              <a:t>B</a:t>
+            </a:r>
+            <a:r>
+              <a:rPr lang="en-US" dirty="0" smtClean="0"/>
+              <a:t>log </a:t>
+            </a:r>
+            <a:r>
+              <a:rPr lang="en-US" dirty="0"/>
+              <a:t>A</a:t>
+            </a:r>
+            <a:r>
+              <a:rPr lang="en-US" dirty="0" smtClean="0"/>
+              <a:t>rticles by SW Developers, Stack Overflow, Geeks for Geeks, javadocs, and Udemy and You Tube tutorials </a:t>
+            </a:r>
+          </a:p>
+          <a:p>
+            <a:pPr>
               <a:buBlip>
                 <a:blip r:embed="rId2"/>
               </a:buBlip>
             </a:pPr>
             <a:r>
-              <a:rPr lang="en-US" sz="1600" b="1" dirty="0" smtClean="0"/>
-              <a:t>Day Seven: </a:t>
-            </a:r>
-            <a:r>
-              <a:rPr lang="en-US" sz="1600" dirty="0" smtClean="0"/>
-              <a:t>Address and Resolve any Coding Issues. Complete Documentation. Prepare slides from notes and practice presentation.</a:t>
-            </a:r>
-            <a:endParaRPr lang="en-US" sz="1600" dirty="0"/>
+              <a:rPr lang="en-US" dirty="0" smtClean="0"/>
+              <a:t>Previous </a:t>
+            </a:r>
+            <a:r>
+              <a:rPr lang="en-US" dirty="0" err="1" smtClean="0"/>
+              <a:t>TEKAcademy</a:t>
+            </a:r>
+            <a:r>
+              <a:rPr lang="en-US" dirty="0" smtClean="0"/>
+              <a:t> exercises that can be related to current task</a:t>
+            </a:r>
+          </a:p>
+          <a:p>
+            <a:pPr>
+              <a:buBlip>
+                <a:blip r:embed="rId2"/>
+              </a:buBlip>
+            </a:pPr>
+            <a:endParaRPr lang="en-US" dirty="0" smtClean="0"/>
+          </a:p>
+          <a:p>
+            <a:endParaRPr lang="en-US" dirty="0"/>
           </a:p>
         </p:txBody>
       </p:sp>
     </p:spTree>
     <p:extLst>
       <p:ext uri="{BB962C8B-B14F-4D97-AF65-F5344CB8AC3E}">
-        <p14:creationId xmlns:p14="http://schemas.microsoft.com/office/powerpoint/2010/main" val="785421245"/>
+        <p14:creationId xmlns:p14="http://schemas.microsoft.com/office/powerpoint/2010/main" val="1895834553"/>
       </p:ext>
     </p:extLst>
   </p:cSld>
@@ -5726,150 +5648,141 @@
             <p:ph type="title"/>
           </p:nvPr>
         </p:nvSpPr>
-        <p:spPr/>
-        <p:txBody>
-          <a:bodyPr/>
-          <a:lstStyle/>
-          <a:p>
-            <a:r>
-              <a:rPr lang="en-US" dirty="0" smtClean="0"/>
-              <a:t>Tools/Resources Available</a:t>
-            </a:r>
-            <a:endParaRPr lang="en-US" dirty="0"/>
-          </a:p>
-        </p:txBody>
-      </p:sp>
-      <p:sp>
-        <p:nvSpPr>
-          <p:cNvPr id="3" name="Content Placeholder 2"/>
-          <p:cNvSpPr>
-            <a:spLocks noGrp="1"/>
-          </p:cNvSpPr>
-          <p:nvPr>
-            <p:ph idx="1"/>
-          </p:nvPr>
-        </p:nvSpPr>
         <p:spPr>
           <a:xfrm>
-            <a:off x="549275" y="1967571"/>
-            <a:ext cx="8042276" cy="4343400"/>
+            <a:off x="549275" y="107576"/>
+            <a:ext cx="8042276" cy="1057510"/>
           </a:xfrm>
         </p:spPr>
         <p:txBody>
           <a:bodyPr/>
           <a:lstStyle/>
           <a:p>
-            <a:pPr>
-              <a:buBlip>
-                <a:blip r:embed="rId2"/>
-              </a:buBlip>
+            <a:r>
+              <a:rPr lang="en-US" dirty="0" smtClean="0"/>
+              <a:t>3. Executing the Plan</a:t>
+            </a:r>
+            <a:endParaRPr lang="en-US" dirty="0"/>
+          </a:p>
+        </p:txBody>
+      </p:sp>
+      <p:sp>
+        <p:nvSpPr>
+          <p:cNvPr id="3" name="Content Placeholder 2"/>
+          <p:cNvSpPr>
+            <a:spLocks noGrp="1"/>
+          </p:cNvSpPr>
+          <p:nvPr>
+            <p:ph idx="1"/>
+          </p:nvPr>
+        </p:nvSpPr>
+        <p:spPr>
+          <a:xfrm>
+            <a:off x="549275" y="1054667"/>
+            <a:ext cx="8042276" cy="5022945"/>
+          </a:xfrm>
+        </p:spPr>
+        <p:txBody>
+          <a:bodyPr>
+            <a:normAutofit/>
+          </a:bodyPr>
+          <a:lstStyle/>
+          <a:p>
+            <a:pPr marL="0" indent="0">
+              <a:buNone/>
             </a:pPr>
-            <a:endParaRPr lang="en-US" dirty="0" smtClean="0"/>
-          </a:p>
-          <a:p>
-            <a:pPr>
-              <a:buBlip>
-                <a:blip r:embed="rId2"/>
-              </a:buBlip>
+            <a:r>
+              <a:rPr lang="en-US" dirty="0" smtClean="0"/>
+              <a:t>My first exposure to java was two weeks ago and </a:t>
+            </a:r>
+            <a:r>
+              <a:rPr lang="en-US" dirty="0"/>
+              <a:t>m</a:t>
+            </a:r>
+            <a:r>
+              <a:rPr lang="en-US" dirty="0" smtClean="0"/>
+              <a:t>y learning curve for the software coding required was my biggest blocker. I prioritized my coding time (what I worked on) according to: </a:t>
+            </a:r>
+          </a:p>
+          <a:p>
+            <a:pPr marL="0" indent="0">
+              <a:buNone/>
             </a:pPr>
             <a:r>
               <a:rPr lang="en-US" dirty="0" smtClean="0"/>
-              <a:t>Collaboration with other students/friends</a:t>
-            </a:r>
-          </a:p>
-          <a:p>
-            <a:pPr>
-              <a:buBlip>
-                <a:blip r:embed="rId2"/>
-              </a:buBlip>
+              <a:t>A. MVP</a:t>
+            </a:r>
+          </a:p>
+          <a:p>
+            <a:pPr marL="0" indent="0">
+              <a:buNone/>
             </a:pPr>
             <a:r>
               <a:rPr lang="en-US" dirty="0" smtClean="0"/>
-              <a:t>Support Sessions led by TEKacademy Faculty</a:t>
-            </a:r>
-          </a:p>
-          <a:p>
-            <a:pPr>
-              <a:buBlip>
-                <a:blip r:embed="rId2"/>
-              </a:buBlip>
+              <a:t>B. Current technical ability and how much research required to implement the task</a:t>
+            </a:r>
+          </a:p>
+          <a:p>
+            <a:pPr marL="0" indent="0">
+              <a:buNone/>
             </a:pPr>
             <a:r>
               <a:rPr lang="en-US" dirty="0" smtClean="0"/>
-              <a:t>Help Channel and Resources Channel on TEKacademy Slack</a:t>
-            </a:r>
-          </a:p>
-          <a:p>
-            <a:pPr>
-              <a:buBlip>
-                <a:blip r:embed="rId2"/>
-              </a:buBlip>
+              <a:t>C. Length of time of blocker (which leads to D.)</a:t>
+            </a:r>
+          </a:p>
+          <a:p>
+            <a:pPr marL="0" indent="0">
+              <a:buNone/>
             </a:pPr>
             <a:r>
+              <a:rPr lang="en-US" dirty="0"/>
+              <a:t>D</a:t>
+            </a:r>
+            <a:r>
               <a:rPr lang="en-US" dirty="0" smtClean="0"/>
-              <a:t>Extensive Online Documentation including many </a:t>
-            </a:r>
-            <a:r>
-              <a:rPr lang="en-US" dirty="0"/>
-              <a:t>O</a:t>
-            </a:r>
+              <a:t>. Availability of support and other students for collaboration</a:t>
+            </a:r>
+          </a:p>
+          <a:p>
+            <a:pPr marL="0" indent="0"/>
             <a:r>
               <a:rPr lang="en-US" dirty="0" smtClean="0"/>
-              <a:t>nline </a:t>
-            </a:r>
-            <a:r>
-              <a:rPr lang="en-US" dirty="0"/>
-              <a:t>B</a:t>
-            </a:r>
-            <a:r>
-              <a:rPr lang="en-US" dirty="0" smtClean="0"/>
-              <a:t>log </a:t>
-            </a:r>
-            <a:r>
-              <a:rPr lang="en-US" dirty="0"/>
-              <a:t>A</a:t>
-            </a:r>
-            <a:r>
-              <a:rPr lang="en-US" dirty="0" smtClean="0"/>
-              <a:t>rticles by SW Developers, Stack Overflow, Geeks for Geeks, javadocs, and Udemy and You Tube tutorials </a:t>
-            </a:r>
-          </a:p>
-          <a:p>
-            <a:pPr>
-              <a:buBlip>
-                <a:blip r:embed="rId2"/>
-              </a:buBlip>
+              <a:t> </a:t>
+            </a:r>
+            <a:r>
+              <a:rPr lang="en-US" i="1" dirty="0" smtClean="0"/>
+              <a:t>Thank you to everyone at TEKacademy and our cohort – just as in Capstone 1,  the responsiveness of the TEKacademy faculty, the spirit of collaboration among students, and everyone’s desire to help each other succeed was amazing! I especially appreciate the folks from TEKsystems who offered their time and knowledge freely, well-past normal working hours, to anyone who needed help. </a:t>
+            </a:r>
+            <a:r>
+              <a:rPr lang="en-US" i="1" dirty="0"/>
+              <a:t>Special Thanks to my friend, </a:t>
+            </a:r>
+            <a:r>
+              <a:rPr lang="en-US" i="1" dirty="0" err="1"/>
+              <a:t>Jamil</a:t>
+            </a:r>
+            <a:r>
+              <a:rPr lang="en-US" i="1" dirty="0"/>
+              <a:t>, for his patience with all of my questions, his great explanations, and for his guidance as I worked on the code.</a:t>
+            </a:r>
+          </a:p>
+          <a:p>
+            <a:pPr marL="0" indent="0"/>
+            <a:endParaRPr lang="en-US" dirty="0"/>
+          </a:p>
+          <a:p>
+            <a:pPr marL="0" indent="0">
+              <a:buNone/>
             </a:pPr>
-            <a:r>
-              <a:rPr lang="en-US" dirty="0" smtClean="0"/>
-              <a:t>Previous </a:t>
-            </a:r>
-            <a:r>
-              <a:rPr lang="en-US" dirty="0" err="1" smtClean="0"/>
-              <a:t>TEKAcademy</a:t>
-            </a:r>
-            <a:r>
-              <a:rPr lang="en-US" dirty="0" smtClean="0"/>
-              <a:t> exercises that can be related to current task</a:t>
-            </a:r>
-          </a:p>
-          <a:p>
-            <a:pPr>
-              <a:buBlip>
-                <a:blip r:embed="rId2"/>
-              </a:buBlip>
-            </a:pPr>
-            <a:endParaRPr lang="en-US" dirty="0" smtClean="0"/>
-          </a:p>
-          <a:p>
-            <a:endParaRPr lang="en-US" dirty="0"/>
+            <a:endParaRPr lang="en-US" i="1" dirty="0"/>
           </a:p>
         </p:txBody>
       </p:sp>
     </p:spTree>
     <p:extLst>
       <p:ext uri="{BB962C8B-B14F-4D97-AF65-F5344CB8AC3E}">
-        <p14:creationId xmlns:p14="http://schemas.microsoft.com/office/powerpoint/2010/main" val="1895834553"/>
+        <p14:creationId xmlns:p14="http://schemas.microsoft.com/office/powerpoint/2010/main" val="2395010513"/>
       </p:ext>
     </p:extLst>
   </p:cSld>
@@ -5915,192 +5828,6 @@
         </p:nvSpPr>
         <p:spPr>
           <a:xfrm>
-            <a:off x="549275" y="107576"/>
-            <a:ext cx="8042276" cy="1057510"/>
-          </a:xfrm>
-        </p:spPr>
-        <p:txBody>
-          <a:bodyPr/>
-          <a:lstStyle/>
-          <a:p>
-            <a:r>
-              <a:rPr lang="en-US" dirty="0" smtClean="0"/>
-              <a:t>3. Executing the Plan</a:t>
-            </a:r>
-            <a:endParaRPr lang="en-US" dirty="0"/>
-          </a:p>
-        </p:txBody>
-      </p:sp>
-      <p:sp>
-        <p:nvSpPr>
-          <p:cNvPr id="3" name="Content Placeholder 2"/>
-          <p:cNvSpPr>
-            <a:spLocks noGrp="1"/>
-          </p:cNvSpPr>
-          <p:nvPr>
-            <p:ph idx="1"/>
-          </p:nvPr>
-        </p:nvSpPr>
-        <p:spPr>
-          <a:xfrm>
-            <a:off x="549275" y="1054667"/>
-            <a:ext cx="8042276" cy="5022945"/>
-          </a:xfrm>
-        </p:spPr>
-        <p:txBody>
-          <a:bodyPr>
-            <a:normAutofit/>
-          </a:bodyPr>
-          <a:lstStyle/>
-          <a:p>
-            <a:pPr marL="0" indent="0">
-              <a:buNone/>
-            </a:pPr>
-            <a:r>
-              <a:rPr lang="en-US" dirty="0" smtClean="0"/>
-              <a:t>My first exposure to java was two weeks ago and </a:t>
-            </a:r>
-            <a:r>
-              <a:rPr lang="en-US" dirty="0"/>
-              <a:t>m</a:t>
-            </a:r>
-            <a:r>
-              <a:rPr lang="en-US" dirty="0" smtClean="0"/>
-              <a:t>y learning curve for the software coding required was my biggest blocker. I prioritized my coding time (what I worked on) according to: </a:t>
-            </a:r>
-          </a:p>
-          <a:p>
-            <a:pPr marL="0" indent="0">
-              <a:buNone/>
-            </a:pPr>
-            <a:r>
-              <a:rPr lang="en-US" dirty="0" smtClean="0"/>
-              <a:t>A. MVP</a:t>
-            </a:r>
-          </a:p>
-          <a:p>
-            <a:pPr marL="0" indent="0">
-              <a:buNone/>
-            </a:pPr>
-            <a:r>
-              <a:rPr lang="en-US" dirty="0" smtClean="0"/>
-              <a:t>B. Current technical ability and how much research required to implement the task</a:t>
-            </a:r>
-          </a:p>
-          <a:p>
-            <a:pPr marL="0" indent="0">
-              <a:buNone/>
-            </a:pPr>
-            <a:r>
-              <a:rPr lang="en-US" dirty="0" smtClean="0"/>
-              <a:t>C. Length of time of blocker (which leads to D.)</a:t>
-            </a:r>
-          </a:p>
-          <a:p>
-            <a:pPr marL="0" indent="0">
-              <a:buNone/>
-            </a:pPr>
-            <a:r>
-              <a:rPr lang="en-US" dirty="0"/>
-              <a:t>D</a:t>
-            </a:r>
-            <a:r>
-              <a:rPr lang="en-US" dirty="0" smtClean="0"/>
-              <a:t>. Availability of support and other students for collaboration</a:t>
-            </a:r>
-          </a:p>
-          <a:p>
-            <a:pPr marL="0" indent="0"/>
-            <a:r>
-              <a:rPr lang="en-US" dirty="0" smtClean="0"/>
-              <a:t> </a:t>
-            </a:r>
-            <a:r>
-              <a:rPr lang="en-US" i="1" dirty="0" smtClean="0"/>
-              <a:t>Thank you to everyone at </a:t>
-            </a:r>
-            <a:r>
-              <a:rPr lang="en-US" i="1" dirty="0" smtClean="0"/>
-              <a:t>TEKacademy </a:t>
-            </a:r>
-            <a:r>
-              <a:rPr lang="en-US" i="1" dirty="0" smtClean="0"/>
-              <a:t>and our cohort – just as in Capstone 1,  the responsiveness of the TEKacademy faculty, the spirit of collaboration among students, and everyone’s desire to help each other succeed was amazing! I especially appreciate the folks from TEKsystems who offered their time and knowledge freely, well-past normal working hours, to anyone who needed help. </a:t>
-            </a:r>
-            <a:r>
-              <a:rPr lang="en-US" i="1" dirty="0"/>
-              <a:t>Special Thanks to my friend, </a:t>
-            </a:r>
-            <a:r>
-              <a:rPr lang="en-US" i="1" dirty="0" err="1"/>
-              <a:t>Jamil</a:t>
-            </a:r>
-            <a:r>
-              <a:rPr lang="en-US" i="1" dirty="0"/>
-              <a:t>, for his patience with all of my questions, his great explanations, and for his guidance as I worked on the code.</a:t>
-            </a:r>
-          </a:p>
-          <a:p>
-            <a:pPr marL="0" indent="0"/>
-            <a:endParaRPr lang="en-US" dirty="0"/>
-          </a:p>
-          <a:p>
-            <a:pPr marL="0" indent="0">
-              <a:buNone/>
-            </a:pPr>
-            <a:endParaRPr lang="en-US" i="1" dirty="0"/>
-          </a:p>
-        </p:txBody>
-      </p:sp>
-    </p:spTree>
-    <p:extLst>
-      <p:ext uri="{BB962C8B-B14F-4D97-AF65-F5344CB8AC3E}">
-        <p14:creationId xmlns:p14="http://schemas.microsoft.com/office/powerpoint/2010/main" val="2395010513"/>
-      </p:ext>
-    </p:extLst>
-  </p:cSld>
-  <p:clrMapOvr>
-    <a:masterClrMapping/>
-  </p:clrMapOvr>
-  <p:timing>
-    <p:tnLst>
-      <p:par>
-        <p:cTn xmlns:p14="http://schemas.microsoft.com/office/powerpoint/2010/main" id="1" dur="indefinite" restart="never" nodeType="tmRoot"/>
-      </p:par>
-    </p:tnLst>
-  </p:timing>
-</p:sld>
-</file>
-
-<file path=ppt/slides/slide13.xml><?xml version="1.0" encoding="utf-8"?>
-<p:sld xmlns:a="http://schemas.openxmlformats.org/drawingml/2006/main" xmlns:r="http://schemas.openxmlformats.org/officeDocument/2006/relationships" xmlns:p="http://schemas.openxmlformats.org/presentationml/2006/main">
-  <p:cSld>
-    <p:spTree>
-      <p:nvGrpSpPr>
-        <p:cNvPr id="1" name=""/>
-        <p:cNvGrpSpPr/>
-        <p:nvPr/>
-      </p:nvGrpSpPr>
-      <p:grpSpPr>
-        <a:xfrm>
-          <a:off x="0" y="0"/>
-          <a:ext cx="0" cy="0"/>
-          <a:chOff x="0" y="0"/>
-          <a:chExt cx="0" cy="0"/>
-        </a:xfrm>
-      </p:grpSpPr>
-      <p:sp>
-        <p:nvSpPr>
-          <p:cNvPr id="2" name="Title 1"/>
-          <p:cNvSpPr>
-            <a:spLocks noGrp="1"/>
-          </p:cNvSpPr>
-          <p:nvPr>
-            <p:ph type="title"/>
-          </p:nvPr>
-        </p:nvSpPr>
-        <p:spPr>
-          <a:xfrm>
             <a:off x="549275" y="239374"/>
             <a:ext cx="8042276" cy="569025"/>
           </a:xfrm>
@@ -6207,7 +5934,7 @@
 </p:sld>
 </file>
 
-<file path=ppt/slides/slide14.xml><?xml version="1.0" encoding="utf-8"?>
+<file path=ppt/slides/slide13.xml><?xml version="1.0" encoding="utf-8"?>
 <p:sld xmlns:a="http://schemas.openxmlformats.org/drawingml/2006/main" xmlns:r="http://schemas.openxmlformats.org/officeDocument/2006/relationships" xmlns:p="http://schemas.openxmlformats.org/presentationml/2006/main">
   <p:cSld>
     <p:spTree>
@@ -6392,7 +6119,7 @@
 </p:sld>
 </file>
 
-<file path=ppt/slides/slide15.xml><?xml version="1.0" encoding="utf-8"?>
+<file path=ppt/slides/slide14.xml><?xml version="1.0" encoding="utf-8"?>
 <p:sld xmlns:a="http://schemas.openxmlformats.org/drawingml/2006/main" xmlns:r="http://schemas.openxmlformats.org/officeDocument/2006/relationships" xmlns:p="http://schemas.openxmlformats.org/presentationml/2006/main">
   <p:cSld>
     <p:spTree>
@@ -6606,7 +6333,7 @@
 </p:sld>
 </file>
 
-<file path=ppt/slides/slide16.xml><?xml version="1.0" encoding="utf-8"?>
+<file path=ppt/slides/slide15.xml><?xml version="1.0" encoding="utf-8"?>
 <p:sld xmlns:a="http://schemas.openxmlformats.org/drawingml/2006/main" xmlns:r="http://schemas.openxmlformats.org/officeDocument/2006/relationships" xmlns:p="http://schemas.openxmlformats.org/presentationml/2006/main">
   <p:cSld>
     <p:spTree>
@@ -6739,6 +6466,150 @@
 </p:sld>
 </file>
 
+<file path=ppt/slides/slide16.xml><?xml version="1.0" encoding="utf-8"?>
+<p:sld xmlns:a="http://schemas.openxmlformats.org/drawingml/2006/main" xmlns:r="http://schemas.openxmlformats.org/officeDocument/2006/relationships" xmlns:p="http://schemas.openxmlformats.org/presentationml/2006/main">
+  <p:cSld>
+    <p:spTree>
+      <p:nvGrpSpPr>
+        <p:cNvPr id="1" name=""/>
+        <p:cNvGrpSpPr/>
+        <p:nvPr/>
+      </p:nvGrpSpPr>
+      <p:grpSpPr>
+        <a:xfrm>
+          <a:off x="0" y="0"/>
+          <a:ext cx="0" cy="0"/>
+          <a:chOff x="0" y="0"/>
+          <a:chExt cx="0" cy="0"/>
+        </a:xfrm>
+      </p:grpSpPr>
+      <p:sp>
+        <p:nvSpPr>
+          <p:cNvPr id="2" name="Title 1"/>
+          <p:cNvSpPr>
+            <a:spLocks noGrp="1"/>
+          </p:cNvSpPr>
+          <p:nvPr>
+            <p:ph type="title"/>
+          </p:nvPr>
+        </p:nvSpPr>
+        <p:spPr>
+          <a:xfrm>
+            <a:off x="370856" y="149280"/>
+            <a:ext cx="8042276" cy="954647"/>
+          </a:xfrm>
+        </p:spPr>
+        <p:txBody>
+          <a:bodyPr/>
+          <a:lstStyle/>
+          <a:p>
+            <a:r>
+              <a:rPr lang="en-US" dirty="0" smtClean="0"/>
+              <a:t>4. Reflection / Refactor</a:t>
+            </a:r>
+            <a:br>
+              <a:rPr lang="en-US" dirty="0" smtClean="0"/>
+            </a:br>
+            <a:endParaRPr lang="en-US" dirty="0"/>
+          </a:p>
+        </p:txBody>
+      </p:sp>
+      <p:sp>
+        <p:nvSpPr>
+          <p:cNvPr id="3" name="Content Placeholder 2"/>
+          <p:cNvSpPr>
+            <a:spLocks noGrp="1"/>
+          </p:cNvSpPr>
+          <p:nvPr>
+            <p:ph idx="1"/>
+          </p:nvPr>
+        </p:nvSpPr>
+        <p:spPr>
+          <a:xfrm>
+            <a:off x="549274" y="689287"/>
+            <a:ext cx="8341013" cy="5206151"/>
+          </a:xfrm>
+        </p:spPr>
+        <p:txBody>
+          <a:bodyPr>
+            <a:normAutofit/>
+          </a:bodyPr>
+          <a:lstStyle/>
+          <a:p>
+            <a:pPr marL="0" indent="0">
+              <a:buNone/>
+            </a:pPr>
+            <a:r>
+              <a:rPr lang="en-US" sz="1700" dirty="0" smtClean="0"/>
+              <a:t>Capstone 2 has been a great learning opportunity. The intensity of the boot camp doesn’t permit students the luxury of repetition on learning concepts  and to say these past weeks have been challenging is an understatement. But there is a lot to be said regarding being challenged. It is through challenges that we learn to find our strength, to dig deeper than we have in the past, and to persevere even when it hurts. It is also an opportunity to reach out and support and encourage those around us. I love people and I love technology and I got to deepen some relationships and begin new ones while beginning to learn a very fun new language. It has been an incredible experience.</a:t>
+            </a:r>
+            <a:endParaRPr lang="en-US" sz="1700" b="1" dirty="0" smtClean="0"/>
+          </a:p>
+          <a:p>
+            <a:pPr marL="0" indent="0">
+              <a:buNone/>
+            </a:pPr>
+            <a:r>
+              <a:rPr lang="en-US" sz="2800" b="1" dirty="0" smtClean="0"/>
+              <a:t>Measurable outcomes</a:t>
+            </a:r>
+          </a:p>
+          <a:p>
+            <a:pPr marL="0" indent="0">
+              <a:buNone/>
+            </a:pPr>
+            <a:r>
+              <a:rPr lang="en-US" sz="2200" b="1" dirty="0" smtClean="0"/>
+              <a:t>Tangible:</a:t>
+            </a:r>
+          </a:p>
+          <a:p>
+            <a:pPr marL="0" indent="0">
+              <a:buNone/>
+            </a:pPr>
+            <a:r>
+              <a:rPr lang="en-US" sz="1700" dirty="0" smtClean="0"/>
+              <a:t>Was the criteria set forth in the assignment met? The 2D terminal game Pong meets the basic criteria for the assignment. </a:t>
+            </a:r>
+          </a:p>
+          <a:p>
+            <a:pPr marL="0" indent="0">
+              <a:buNone/>
+            </a:pPr>
+            <a:r>
+              <a:rPr lang="en-US" sz="1700" dirty="0" smtClean="0"/>
+              <a:t>The Kliskey family is very happy at having a pong computer game that all four of their children can play simultaneously </a:t>
+            </a:r>
+            <a:r>
+              <a:rPr lang="en-US" sz="1700" dirty="0" smtClean="0">
+                <a:sym typeface="Wingdings"/>
+              </a:rPr>
+              <a:t></a:t>
+            </a:r>
+            <a:endParaRPr lang="en-US" sz="1700" dirty="0"/>
+          </a:p>
+        </p:txBody>
+      </p:sp>
+    </p:spTree>
+    <p:extLst>
+      <p:ext uri="{BB962C8B-B14F-4D97-AF65-F5344CB8AC3E}">
+        <p14:creationId xmlns:p14="http://schemas.microsoft.com/office/powerpoint/2010/main" val="2327609854"/>
+      </p:ext>
+    </p:extLst>
+  </p:cSld>
+  <p:clrMapOvr>
+    <a:masterClrMapping/>
+  </p:clrMapOvr>
+  <p:timing>
+    <p:tnLst>
+      <p:par>
+        <p:cTn xmlns:p14="http://schemas.microsoft.com/office/powerpoint/2010/main" id="1" dur="indefinite" restart="never" nodeType="tmRoot"/>
+      </p:par>
+    </p:tnLst>
+  </p:timing>
+</p:sld>
+</file>
+
 <file path=ppt/slides/slide17.xml><?xml version="1.0" encoding="utf-8"?>
 <p:sld xmlns:a="http://schemas.openxmlformats.org/drawingml/2006/main" xmlns:r="http://schemas.openxmlformats.org/officeDocument/2006/relationships" xmlns:p="http://schemas.openxmlformats.org/presentationml/2006/main">
   <p:cSld>
@@ -6768,8 +6639,8 @@
         </p:nvSpPr>
         <p:spPr>
           <a:xfrm>
-            <a:off x="370856" y="149280"/>
-            <a:ext cx="8042276" cy="954647"/>
+            <a:off x="465313" y="441682"/>
+            <a:ext cx="8042276" cy="1336956"/>
           </a:xfrm>
         </p:spPr>
         <p:txBody>
@@ -6777,12 +6648,20 @@
           <a:lstStyle/>
           <a:p>
             <a:r>
+              <a:rPr lang="en-US" dirty="0"/>
+              <a:t>4. Reflection / </a:t>
+            </a:r>
+            <a:r>
               <a:rPr lang="en-US" dirty="0" smtClean="0"/>
-              <a:t>4. Reflection / Refactor</a:t>
+              <a:t>Refactor</a:t>
             </a:r>
             <a:br>
               <a:rPr lang="en-US" dirty="0" smtClean="0"/>
             </a:br>
+            <a:r>
+              <a:rPr lang="en-US" dirty="0" smtClean="0"/>
+              <a:t>Continued</a:t>
+            </a:r>
             <a:endParaRPr lang="en-US" dirty="0"/>
           </a:p>
         </p:txBody>
@@ -6799,13 +6678,13 @@
         </p:nvSpPr>
         <p:spPr>
           <a:xfrm>
-            <a:off x="549274" y="689287"/>
-            <a:ext cx="8341013" cy="5206151"/>
+            <a:off x="549275" y="1680006"/>
+            <a:ext cx="8042276" cy="4343400"/>
           </a:xfrm>
         </p:spPr>
         <p:txBody>
           <a:bodyPr>
-            <a:normAutofit/>
+            <a:normAutofit lnSpcReduction="10000"/>
           </a:bodyPr>
           <a:lstStyle/>
           <a:p>
@@ -6813,27 +6692,55 @@
               <a:buNone/>
             </a:pPr>
             <a:r>
-              <a:rPr lang="en-US" sz="1700" dirty="0" smtClean="0"/>
-              <a:t>Capstone 2 has been a great learning opportunity. The intensity of the boot camp doesn’t permit students the luxury of repetition on learning concepts  and to say these past weeks have been challenging is an understatement. But there is a lot to be said regarding being challenged. It is through challenges that we learn to find our strength, to dig deeper than we have in the past, and to persevere even when it hurts. It is also an opportunity to reach out and support and encourage those around us. I love people and I love technology and I got to deepen some relationships and begin new ones while beginning to learn a very fun new language. It has been an incredible experience.</a:t>
-            </a:r>
-            <a:endParaRPr lang="en-US" sz="1700" b="1" dirty="0" smtClean="0"/>
+              <a:rPr lang="en-US" sz="2800" b="1" dirty="0"/>
+              <a:t>Intangible:</a:t>
+            </a:r>
+            <a:r>
+              <a:rPr lang="en-US" sz="2800" dirty="0"/>
+              <a:t> </a:t>
+            </a:r>
           </a:p>
           <a:p>
             <a:pPr marL="0" indent="0">
               <a:buNone/>
             </a:pPr>
             <a:r>
-              <a:rPr lang="en-US" sz="2800" b="1" dirty="0" smtClean="0"/>
-              <a:t>Measurable outcomes</a:t>
-            </a:r>
+              <a:rPr lang="en-US" dirty="0"/>
+              <a:t>It was a tremendous learning opportunity that also has me very excited about future learning and growth</a:t>
+            </a:r>
+            <a:r>
+              <a:rPr lang="en-US" dirty="0" smtClean="0"/>
+              <a:t>. The relationships I have already formed in TEKcamp deepened and </a:t>
+            </a:r>
+            <a:r>
+              <a:rPr lang="en-US" dirty="0"/>
+              <a:t>I made some </a:t>
+            </a:r>
+            <a:r>
+              <a:rPr lang="en-US" dirty="0" smtClean="0"/>
+              <a:t>new wonderful </a:t>
+            </a:r>
+            <a:r>
+              <a:rPr lang="en-US" dirty="0"/>
+              <a:t>relationships </a:t>
+            </a:r>
+            <a:r>
+              <a:rPr lang="en-US" dirty="0" smtClean="0"/>
+              <a:t>as well.</a:t>
+            </a:r>
+            <a:endParaRPr lang="en-US" dirty="0"/>
           </a:p>
           <a:p>
             <a:pPr marL="0" indent="0">
               <a:buNone/>
             </a:pPr>
             <a:r>
-              <a:rPr lang="en-US" sz="2200" b="1" dirty="0" smtClean="0"/>
-              <a:t>Tangible:</a:t>
+              <a:rPr lang="en-US" dirty="0" smtClean="0"/>
+              <a:t>I have to say it again because it is so true...“</a:t>
+            </a:r>
+            <a:r>
+              <a:rPr lang="en-US" dirty="0"/>
+              <a:t>If you don’t know it’s simply awful, if you do know, it’s awfully simple.” I will never forget this experience. It was challenging, exhausting, exhilarating, frustrating, exciting. I also found that I had reserves within me that I didn’t know existed when it came time to make a choice of persevering or giving up. The right answer always is: If I don’t know, I can find out.</a:t>
             </a:r>
           </a:p>
           <a:p>
@@ -6841,32 +6748,43 @@
               <a:buNone/>
             </a:pPr>
             <a:r>
-              <a:rPr lang="en-US" sz="1700" dirty="0" smtClean="0"/>
-              <a:t>Was the criteria set forth in the assignment met? The 2D terminal game Pong meets the basic criteria for the assignment. </a:t>
-            </a:r>
-          </a:p>
-          <a:p>
-            <a:pPr marL="0" indent="0">
-              <a:buNone/>
-            </a:pPr>
-            <a:r>
-              <a:rPr lang="en-US" sz="1700" dirty="0" smtClean="0"/>
-              <a:t>The Kliskey family is very happy at having a pong computer game that all four of their children can play simultaneously </a:t>
-            </a:r>
-            <a:r>
-              <a:rPr lang="en-US" sz="1700" dirty="0" smtClean="0">
-                <a:sym typeface="Wingdings"/>
-              </a:rPr>
-              <a:t></a:t>
-            </a:r>
-            <a:endParaRPr lang="en-US" sz="1700" dirty="0"/>
+              <a:rPr lang="en-US" dirty="0"/>
+              <a:t>What would I do different? Not so much different but I will definitely continue to learn, continue to grow, and continue to develop relationships so that we can help each other to succeed. I know that the code I wrote this week is not the code I will be able to write next week, the week after, or two years from now. Having a flexible mindset and learning from my mistakes is a lifelong characteristic I will try my best to cultivate. I will not settle for ordinary but in regards to my rather ordinary-looking </a:t>
+            </a:r>
+            <a:r>
+              <a:rPr lang="en-US" dirty="0" smtClean="0"/>
+              <a:t>2D game, </a:t>
+            </a:r>
+            <a:r>
+              <a:rPr lang="en-US" dirty="0"/>
+              <a:t>I have much to celebrate regarding the learning, the investment by other students and TEK Academy faculty </a:t>
+            </a:r>
+            <a:r>
+              <a:rPr lang="en-US" dirty="0" smtClean="0"/>
+              <a:t>and friends that </a:t>
+            </a:r>
+            <a:r>
+              <a:rPr lang="en-US" dirty="0"/>
+              <a:t>brought me to a place I could never have imagined a scant </a:t>
+            </a:r>
+            <a:r>
+              <a:rPr lang="en-US" dirty="0" smtClean="0"/>
+              <a:t>nine </a:t>
+            </a:r>
+            <a:r>
+              <a:rPr lang="en-US" dirty="0"/>
+              <a:t>weeks ago.</a:t>
+            </a:r>
+          </a:p>
+          <a:p>
+            <a:endParaRPr lang="en-US" dirty="0"/>
           </a:p>
         </p:txBody>
       </p:sp>
     </p:spTree>
     <p:extLst>
       <p:ext uri="{BB962C8B-B14F-4D97-AF65-F5344CB8AC3E}">
-        <p14:creationId xmlns:p14="http://schemas.microsoft.com/office/powerpoint/2010/main" val="2327609854"/>
+        <p14:creationId xmlns:p14="http://schemas.microsoft.com/office/powerpoint/2010/main" val="3853384013"/>
       </p:ext>
     </p:extLst>
   </p:cSld>
@@ -6912,8 +6830,8 @@
         </p:nvSpPr>
         <p:spPr>
           <a:xfrm>
-            <a:off x="465313" y="441682"/>
-            <a:ext cx="8042276" cy="1336956"/>
+            <a:off x="97699" y="0"/>
+            <a:ext cx="4384516" cy="953898"/>
           </a:xfrm>
         </p:spPr>
         <p:txBody>
@@ -6922,20 +6840,8 @@
           <a:p>
             <a:r>
               <a:rPr lang="en-US" dirty="0"/>
-              <a:t>4. Reflection / </a:t>
-            </a:r>
-            <a:r>
-              <a:rPr lang="en-US" dirty="0" smtClean="0"/>
-              <a:t>Refactor</a:t>
-            </a:r>
-            <a:br>
-              <a:rPr lang="en-US" dirty="0" smtClean="0"/>
-            </a:br>
-            <a:r>
-              <a:rPr lang="en-US" dirty="0" smtClean="0"/>
-              <a:t>Continued</a:t>
-            </a:r>
-            <a:endParaRPr lang="en-US" dirty="0"/>
+              <a:t>Preliminary Planning</a:t>
+            </a:r>
           </a:p>
         </p:txBody>
       </p:sp>
@@ -6951,13 +6857,13 @@
         </p:nvSpPr>
         <p:spPr>
           <a:xfrm>
-            <a:off x="549275" y="1680006"/>
+            <a:off x="549275" y="1327298"/>
             <a:ext cx="8042276" cy="4343400"/>
           </a:xfrm>
         </p:spPr>
         <p:txBody>
           <a:bodyPr>
-            <a:normAutofit lnSpcReduction="10000"/>
+            <a:normAutofit/>
           </a:bodyPr>
           <a:lstStyle/>
           <a:p>
@@ -6965,99 +6871,51 @@
               <a:buNone/>
             </a:pPr>
             <a:r>
-              <a:rPr lang="en-US" sz="2800" b="1" dirty="0"/>
-              <a:t>Intangible:</a:t>
-            </a:r>
-            <a:r>
-              <a:rPr lang="en-US" sz="2800" dirty="0"/>
-              <a:t> </a:t>
-            </a:r>
-          </a:p>
-          <a:p>
-            <a:pPr marL="0" indent="0">
-              <a:buNone/>
-            </a:pPr>
-            <a:r>
-              <a:rPr lang="en-US" dirty="0"/>
-              <a:t>It was a tremendous learning opportunity that also has me very excited about future learning and growth</a:t>
-            </a:r>
-            <a:r>
-              <a:rPr lang="en-US" dirty="0" smtClean="0"/>
-              <a:t>. The relationships I have already formed in TEKcamp deepened and </a:t>
-            </a:r>
-            <a:r>
-              <a:rPr lang="en-US" dirty="0"/>
-              <a:t>I made some </a:t>
-            </a:r>
-            <a:r>
-              <a:rPr lang="en-US" dirty="0" smtClean="0"/>
-              <a:t>new wonderful </a:t>
-            </a:r>
-            <a:r>
-              <a:rPr lang="en-US" dirty="0"/>
-              <a:t>relationships </a:t>
-            </a:r>
-            <a:r>
-              <a:rPr lang="en-US" dirty="0" smtClean="0"/>
-              <a:t>as well.</a:t>
-            </a:r>
-            <a:endParaRPr lang="en-US" dirty="0"/>
-          </a:p>
-          <a:p>
-            <a:pPr marL="0" indent="0">
-              <a:buNone/>
-            </a:pPr>
-            <a:r>
-              <a:rPr lang="en-US" dirty="0" smtClean="0"/>
-              <a:t>I have to say it again because it is so true...“</a:t>
-            </a:r>
-            <a:r>
-              <a:rPr lang="en-US" dirty="0"/>
-              <a:t>If you don’t know it’s simply awful, if you do know, it’s awfully simple.” I will never forget this experience. It was challenging, exhausting, exhilarating, frustrating, exciting. I also found that I had reserves within me that I didn’t know existed when it came time to make a choice of persevering or giving up. The right answer always is: If I don’t know, I can find out.</a:t>
-            </a:r>
-          </a:p>
-          <a:p>
-            <a:pPr marL="0" indent="0">
-              <a:buNone/>
-            </a:pPr>
-            <a:r>
-              <a:rPr lang="en-US" dirty="0"/>
-              <a:t>What would I do different? Not so much different but I will definitely continue to learn, continue to grow, and continue to develop relationships so that we can help each other to succeed. I know that the code I wrote this week is not the code I will be able to write next week, the week after, or two years from now. Having a flexible mindset and learning from my mistakes is a lifelong characteristic I will try my best to cultivate. I will not settle for ordinary but in regards to my rather ordinary-looking </a:t>
-            </a:r>
-            <a:r>
-              <a:rPr lang="en-US" dirty="0" smtClean="0"/>
-              <a:t>2D game, </a:t>
-            </a:r>
-            <a:r>
-              <a:rPr lang="en-US" dirty="0"/>
-              <a:t>I have much to celebrate regarding the learning, the investment by other students and TEK Academy faculty </a:t>
-            </a:r>
-            <a:r>
-              <a:rPr lang="en-US" dirty="0" smtClean="0"/>
-              <a:t>and friends that </a:t>
-            </a:r>
-            <a:r>
-              <a:rPr lang="en-US" dirty="0"/>
-              <a:t>brought me to a place I could never have imagined a scant </a:t>
-            </a:r>
-            <a:r>
-              <a:rPr lang="en-US" dirty="0" smtClean="0"/>
-              <a:t>nine </a:t>
-            </a:r>
-            <a:r>
-              <a:rPr lang="en-US" dirty="0"/>
-              <a:t>weeks ago.</a:t>
-            </a:r>
-          </a:p>
-          <a:p>
-            <a:endParaRPr lang="en-US" dirty="0"/>
-          </a:p>
-        </p:txBody>
-      </p:sp>
+              <a:rPr lang="en-US" sz="2000" dirty="0" smtClean="0"/>
+              <a:t>Program Flowchart</a:t>
+            </a:r>
+            <a:r>
+              <a:rPr lang="en-US" sz="2000" b="1" dirty="0" smtClean="0"/>
+              <a:t>:</a:t>
+            </a:r>
+            <a:endParaRPr lang="en-US" sz="2000" dirty="0"/>
+          </a:p>
+        </p:txBody>
+      </p:sp>
+      <p:pic>
+        <p:nvPicPr>
+          <p:cNvPr id="4" name="Picture 3" descr="Screen Shot 2020-07-13 at 11.20.16 AM.png"/>
+          <p:cNvPicPr>
+            <a:picLocks noChangeAspect="1"/>
+          </p:cNvPicPr>
+          <p:nvPr/>
+        </p:nvPicPr>
+        <p:blipFill>
+          <a:blip r:embed="rId2">
+            <a:extLst>
+              <a:ext uri="{28A0092B-C50C-407E-A947-70E740481C1C}">
+                <a14:useLocalDpi xmlns:a14="http://schemas.microsoft.com/office/drawing/2010/main" val="0"/>
+              </a:ext>
+            </a:extLst>
+          </a:blip>
+          <a:stretch>
+            <a:fillRect/>
+          </a:stretch>
+        </p:blipFill>
+        <p:spPr>
+          <a:xfrm>
+            <a:off x="4234442" y="256430"/>
+            <a:ext cx="4647182" cy="6360621"/>
+          </a:xfrm>
+          <a:prstGeom prst="rect">
+            <a:avLst/>
+          </a:prstGeom>
+        </p:spPr>
+      </p:pic>
     </p:spTree>
     <p:extLst>
       <p:ext uri="{BB962C8B-B14F-4D97-AF65-F5344CB8AC3E}">
-        <p14:creationId xmlns:p14="http://schemas.microsoft.com/office/powerpoint/2010/main" val="3853384013"/>
+        <p14:creationId xmlns:p14="http://schemas.microsoft.com/office/powerpoint/2010/main" val="4100643274"/>
       </p:ext>
     </p:extLst>
   </p:cSld>
@@ -9746,8 +9604,8 @@
         </p:nvSpPr>
         <p:spPr>
           <a:xfrm>
-            <a:off x="97699" y="0"/>
-            <a:ext cx="4384516" cy="953898"/>
+            <a:off x="549275" y="-430097"/>
+            <a:ext cx="8042276" cy="1336956"/>
           </a:xfrm>
         </p:spPr>
         <p:txBody>
@@ -9755,9 +9613,10 @@
           <a:lstStyle/>
           <a:p>
             <a:r>
-              <a:rPr lang="en-US" dirty="0"/>
+              <a:rPr lang="en-US" dirty="0" smtClean="0"/>
               <a:t>Preliminary Planning</a:t>
             </a:r>
+            <a:endParaRPr lang="en-US" dirty="0"/>
           </a:p>
         </p:txBody>
       </p:sp>
@@ -9773,13 +9632,13 @@
         </p:nvSpPr>
         <p:spPr>
           <a:xfrm>
-            <a:off x="549275" y="1327298"/>
-            <a:ext cx="8042276" cy="4343400"/>
+            <a:off x="549275" y="443922"/>
+            <a:ext cx="8245757" cy="4343400"/>
           </a:xfrm>
         </p:spPr>
         <p:txBody>
           <a:bodyPr>
-            <a:normAutofit/>
+            <a:noAutofit/>
           </a:bodyPr>
           <a:lstStyle/>
           <a:p>
@@ -9787,51 +9646,184 @@
               <a:buNone/>
             </a:pPr>
             <a:r>
-              <a:rPr lang="en-US" sz="2000" dirty="0" smtClean="0"/>
-              <a:t>Program Flowchart</a:t>
-            </a:r>
-            <a:r>
-              <a:rPr lang="en-US" sz="2000" b="1" dirty="0" smtClean="0"/>
-              <a:t>:</a:t>
-            </a:r>
-            <a:endParaRPr lang="en-US" sz="2000" dirty="0"/>
-          </a:p>
-        </p:txBody>
-      </p:sp>
-      <p:pic>
-        <p:nvPicPr>
-          <p:cNvPr id="4" name="Picture 3" descr="Screen Shot 2020-07-13 at 11.20.16 AM.png"/>
-          <p:cNvPicPr>
-            <a:picLocks noChangeAspect="1"/>
-          </p:cNvPicPr>
-          <p:nvPr/>
-        </p:nvPicPr>
-        <p:blipFill>
-          <a:blip r:embed="rId2">
-            <a:extLst>
-              <a:ext uri="{28A0092B-C50C-407E-A947-70E740481C1C}">
-                <a14:useLocalDpi xmlns:a14="http://schemas.microsoft.com/office/drawing/2010/main" val="0"/>
-              </a:ext>
-            </a:extLst>
-          </a:blip>
-          <a:stretch>
-            <a:fillRect/>
-          </a:stretch>
-        </p:blipFill>
-        <p:spPr>
-          <a:xfrm>
-            <a:off x="4234442" y="256430"/>
-            <a:ext cx="4647182" cy="6360621"/>
-          </a:xfrm>
-          <a:prstGeom prst="rect">
-            <a:avLst/>
-          </a:prstGeom>
-        </p:spPr>
-      </p:pic>
+              <a:rPr lang="en-US" sz="1600" b="1" dirty="0" smtClean="0"/>
+              <a:t>Projected Daily Goals:</a:t>
+            </a:r>
+          </a:p>
+          <a:p>
+            <a:pPr marL="285750" indent="-285750">
+              <a:buBlip>
+                <a:blip r:embed="rId2"/>
+              </a:buBlip>
+            </a:pPr>
+            <a:r>
+              <a:rPr lang="en-US" sz="1600" b="1" dirty="0" smtClean="0"/>
+              <a:t>Day One: </a:t>
+            </a:r>
+            <a:r>
+              <a:rPr lang="en-US" sz="1600" dirty="0" smtClean="0"/>
+              <a:t>Review </a:t>
+            </a:r>
+            <a:r>
+              <a:rPr lang="en-US" sz="1600" dirty="0"/>
+              <a:t>Capstone Documentation provided by instructor. </a:t>
+            </a:r>
+            <a:r>
+              <a:rPr lang="en-US" sz="1600" dirty="0" smtClean="0"/>
+              <a:t>Research games and </a:t>
+            </a:r>
+            <a:r>
+              <a:rPr lang="en-US" dirty="0"/>
+              <a:t>e</a:t>
+            </a:r>
+            <a:r>
+              <a:rPr lang="en-US" sz="1600" dirty="0" smtClean="0"/>
+              <a:t>xamine existing code to understand how </a:t>
+            </a:r>
+            <a:r>
+              <a:rPr lang="en-US" dirty="0" smtClean="0"/>
+              <a:t>to implement functionality.</a:t>
+            </a:r>
+            <a:r>
+              <a:rPr lang="en-US" sz="1600" dirty="0" smtClean="0"/>
+              <a:t> Locate resources to aid in creating </a:t>
+            </a:r>
+            <a:r>
+              <a:rPr lang="en-US" dirty="0"/>
+              <a:t>game. </a:t>
+            </a:r>
+            <a:r>
+              <a:rPr lang="en-US" dirty="0" smtClean="0"/>
+              <a:t>Finalize </a:t>
+            </a:r>
+            <a:r>
+              <a:rPr lang="en-US" dirty="0"/>
+              <a:t>game selection. </a:t>
+            </a:r>
+            <a:endParaRPr lang="en-US" sz="1600" dirty="0" smtClean="0"/>
+          </a:p>
+          <a:p>
+            <a:pPr marL="285750" indent="-285750">
+              <a:buBlip>
+                <a:blip r:embed="rId2"/>
+              </a:buBlip>
+            </a:pPr>
+            <a:r>
+              <a:rPr lang="en-US" sz="1600" b="1" dirty="0" smtClean="0"/>
+              <a:t>Day Two: </a:t>
+            </a:r>
+            <a:r>
+              <a:rPr lang="en-US" sz="1600" dirty="0" smtClean="0"/>
+              <a:t>Define </a:t>
+            </a:r>
+            <a:r>
+              <a:rPr lang="en-US" sz="1600" dirty="0"/>
+              <a:t>problem and begin to plan how to solve it</a:t>
+            </a:r>
+            <a:r>
+              <a:rPr lang="en-US" sz="1600" dirty="0" smtClean="0"/>
+              <a:t>. Complete </a:t>
+            </a:r>
+            <a:r>
+              <a:rPr lang="en-US" sz="1600" dirty="0"/>
+              <a:t>Step One </a:t>
+            </a:r>
+            <a:r>
+              <a:rPr lang="en-US" sz="1600" dirty="0" smtClean="0"/>
+              <a:t>and Two of UPER. Work on OOP documentation per capstone requirements.</a:t>
+            </a:r>
+          </a:p>
+          <a:p>
+            <a:pPr marL="285750" indent="-285750">
+              <a:buBlip>
+                <a:blip r:embed="rId2"/>
+              </a:buBlip>
+            </a:pPr>
+            <a:r>
+              <a:rPr lang="en-US" sz="1600" b="1" dirty="0" smtClean="0"/>
+              <a:t>Day Three: </a:t>
+            </a:r>
+            <a:r>
+              <a:rPr lang="en-US" sz="1600" dirty="0" smtClean="0"/>
+              <a:t>Review Feature List from Customer Requirements. Brainstorm Structure with </a:t>
+            </a:r>
+            <a:r>
+              <a:rPr lang="en-US" sz="1600" dirty="0"/>
+              <a:t>C</a:t>
+            </a:r>
+            <a:r>
+              <a:rPr lang="en-US" sz="1600" dirty="0" smtClean="0"/>
+              <a:t>lasses/Objects needed to fulfill MVP. Continue to work on OOP documentation. Research pong code and try to understand how it works. Identify trouble areas and research.</a:t>
+            </a:r>
+          </a:p>
+          <a:p>
+            <a:pPr marL="285750" indent="-285750">
+              <a:buBlip>
+                <a:blip r:embed="rId2"/>
+              </a:buBlip>
+            </a:pPr>
+            <a:r>
+              <a:rPr lang="en-US" sz="1600" b="1" dirty="0" smtClean="0"/>
+              <a:t>Day Four: Begin coding basic structure. </a:t>
+            </a:r>
+            <a:r>
+              <a:rPr lang="en-US" sz="1600" dirty="0" smtClean="0"/>
+              <a:t>identify problem areas and prioritize time according to what can be accomplished while waiting on resources needed to accomplish tasks in the queue. Research what is needed to accomplish Features Wish List</a:t>
+            </a:r>
+          </a:p>
+          <a:p>
+            <a:pPr marL="285750" indent="-285750">
+              <a:buBlip>
+                <a:blip r:embed="rId2"/>
+              </a:buBlip>
+            </a:pPr>
+            <a:r>
+              <a:rPr lang="en-US" sz="1600" b="1" dirty="0" smtClean="0"/>
+              <a:t>Day Five – Six: </a:t>
+            </a:r>
+            <a:r>
+              <a:rPr lang="en-US" sz="1600" dirty="0"/>
+              <a:t>C</a:t>
+            </a:r>
+            <a:r>
+              <a:rPr lang="en-US" sz="1600" dirty="0" smtClean="0"/>
+              <a:t>ontinue coding and </a:t>
+            </a:r>
+            <a:r>
+              <a:rPr lang="en-US" dirty="0" smtClean="0"/>
+              <a:t>work </a:t>
+            </a:r>
+            <a:r>
+              <a:rPr lang="en-US" dirty="0"/>
+              <a:t>on coding items from Features Wish List in order of </a:t>
+            </a:r>
+            <a:r>
+              <a:rPr lang="en-US" dirty="0" smtClean="0"/>
+              <a:t>priority. Work on refactoring and debugging.</a:t>
+            </a:r>
+          </a:p>
+          <a:p>
+            <a:pPr marL="285750" indent="-285750">
+              <a:buBlip>
+                <a:blip r:embed="rId2"/>
+              </a:buBlip>
+            </a:pPr>
+            <a:r>
+              <a:rPr lang="en-US" sz="1600" b="1" dirty="0" smtClean="0"/>
+              <a:t>Day Seven: </a:t>
+            </a:r>
+            <a:r>
+              <a:rPr lang="en-US" sz="1600" dirty="0" smtClean="0"/>
+              <a:t>Address and Resolve any Coding Issues. Complete Documentation. Prepare slides from notes and practice presentation.</a:t>
+            </a:r>
+            <a:endParaRPr lang="en-US" sz="1600" dirty="0"/>
+          </a:p>
+        </p:txBody>
+      </p:sp>
     </p:spTree>
     <p:extLst>
       <p:ext uri="{BB962C8B-B14F-4D97-AF65-F5344CB8AC3E}">
-        <p14:creationId xmlns:p14="http://schemas.microsoft.com/office/powerpoint/2010/main" val="4100643274"/>
+        <p14:creationId xmlns:p14="http://schemas.microsoft.com/office/powerpoint/2010/main" val="785421245"/>
       </p:ext>
     </p:extLst>
   </p:cSld>

</xml_diff>